<commit_message>
Algunos retoques de la revisión.
</commit_message>
<xml_diff>
--- a/TFG_AlejandroCarrion.pptx
+++ b/TFG_AlejandroCarrion.pptx
@@ -5,7 +5,7 @@
     <p:sldMasterId id="2147483658" r:id="rId1"/>
   </p:sldMasterIdLst>
   <p:notesMasterIdLst>
-    <p:notesMasterId r:id="rId38"/>
+    <p:notesMasterId r:id="rId37"/>
   </p:notesMasterIdLst>
   <p:sldIdLst>
     <p:sldId id="256" r:id="rId2"/>
@@ -36,34 +36,33 @@
     <p:sldId id="326" r:id="rId27"/>
     <p:sldId id="317" r:id="rId28"/>
     <p:sldId id="316" r:id="rId29"/>
-    <p:sldId id="321" r:id="rId30"/>
-    <p:sldId id="322" r:id="rId31"/>
-    <p:sldId id="297" r:id="rId32"/>
-    <p:sldId id="277" r:id="rId33"/>
-    <p:sldId id="298" r:id="rId34"/>
-    <p:sldId id="318" r:id="rId35"/>
-    <p:sldId id="320" r:id="rId36"/>
-    <p:sldId id="319" r:id="rId37"/>
+    <p:sldId id="322" r:id="rId30"/>
+    <p:sldId id="297" r:id="rId31"/>
+    <p:sldId id="277" r:id="rId32"/>
+    <p:sldId id="298" r:id="rId33"/>
+    <p:sldId id="318" r:id="rId34"/>
+    <p:sldId id="320" r:id="rId35"/>
+    <p:sldId id="319" r:id="rId36"/>
   </p:sldIdLst>
   <p:sldSz cx="9144000" cy="5143500" type="screen16x9"/>
   <p:notesSz cx="6858000" cy="9144000"/>
   <p:embeddedFontLst>
     <p:embeddedFont>
       <p:font typeface="Calibri" panose="020F0502020204030204" pitchFamily="34" charset="0"/>
-      <p:regular r:id="rId39"/>
-      <p:bold r:id="rId40"/>
-      <p:italic r:id="rId41"/>
-      <p:boldItalic r:id="rId42"/>
+      <p:regular r:id="rId38"/>
+      <p:bold r:id="rId39"/>
+      <p:italic r:id="rId40"/>
+      <p:boldItalic r:id="rId41"/>
     </p:embeddedFont>
     <p:embeddedFont>
       <p:font typeface="Catamaran" panose="020B0604020202020204" charset="0"/>
-      <p:regular r:id="rId43"/>
-      <p:bold r:id="rId44"/>
+      <p:regular r:id="rId42"/>
+      <p:bold r:id="rId43"/>
     </p:embeddedFont>
     <p:embeddedFont>
       <p:font typeface="Catamaran Thin" panose="020B0604020202020204" charset="0"/>
-      <p:regular r:id="rId45"/>
-      <p:bold r:id="rId46"/>
+      <p:regular r:id="rId44"/>
+      <p:bold r:id="rId45"/>
     </p:embeddedFont>
   </p:embeddedFontLst>
   <p:defaultTextStyle>
@@ -306,7 +305,7 @@
 <file path=ppt/revisionInfo.xml><?xml version="1.0" encoding="utf-8"?>
 <p1510:revInfo xmlns:a="http://schemas.openxmlformats.org/drawingml/2006/main" xmlns:r="http://schemas.openxmlformats.org/officeDocument/2006/relationships" xmlns:p1510="http://schemas.microsoft.com/office/powerpoint/2015/10/main">
   <p1510:revLst>
-    <p1510:client id="{ECF2C08A-1D63-4443-908D-B3C4743D2FCA}" v="72" dt="2021-09-02T19:05:01.713"/>
+    <p1510:client id="{ECF2C08A-1D63-4443-908D-B3C4743D2FCA}" v="74" dt="2021-09-04T09:00:31.803"/>
   </p1510:revLst>
 </p1510:revInfo>
 </file>
@@ -316,7 +315,7 @@
   <pc:docChgLst>
     <pc:chgData name="Alejandro Carrión" userId="757439b461449c9e" providerId="LiveId" clId="{ECF2C08A-1D63-4443-908D-B3C4743D2FCA}"/>
     <pc:docChg chg="undo redo custSel addSld delSld modSld sldOrd">
-      <pc:chgData name="Alejandro Carrión" userId="757439b461449c9e" providerId="LiveId" clId="{ECF2C08A-1D63-4443-908D-B3C4743D2FCA}" dt="2021-09-02T19:05:01.713" v="5692"/>
+      <pc:chgData name="Alejandro Carrión" userId="757439b461449c9e" providerId="LiveId" clId="{ECF2C08A-1D63-4443-908D-B3C4743D2FCA}" dt="2021-09-04T09:01:10.987" v="5793" actId="20577"/>
       <pc:docMkLst>
         <pc:docMk/>
       </pc:docMkLst>
@@ -1551,7 +1550,7 @@
         </pc:picChg>
       </pc:sldChg>
       <pc:sldChg chg="addSp delSp modSp new add del mod modClrScheme chgLayout">
-        <pc:chgData name="Alejandro Carrión" userId="757439b461449c9e" providerId="LiveId" clId="{ECF2C08A-1D63-4443-908D-B3C4743D2FCA}" dt="2021-08-30T18:32:15.215" v="1872" actId="14100"/>
+        <pc:chgData name="Alejandro Carrión" userId="757439b461449c9e" providerId="LiveId" clId="{ECF2C08A-1D63-4443-908D-B3C4743D2FCA}" dt="2021-09-04T08:50:39.585" v="5759" actId="14100"/>
         <pc:sldMkLst>
           <pc:docMk/>
           <pc:sldMk cId="695939527" sldId="305"/>
@@ -1602,6 +1601,14 @@
             <pc:docMk/>
             <pc:sldMk cId="695939527" sldId="305"/>
             <ac:picMk id="6" creationId="{FE2835EA-8806-42E1-B050-440CAD2C1887}"/>
+          </ac:picMkLst>
+        </pc:picChg>
+        <pc:picChg chg="mod">
+          <ac:chgData name="Alejandro Carrión" userId="757439b461449c9e" providerId="LiveId" clId="{ECF2C08A-1D63-4443-908D-B3C4743D2FCA}" dt="2021-09-04T08:50:39.585" v="5759" actId="14100"/>
+          <ac:picMkLst>
+            <pc:docMk/>
+            <pc:sldMk cId="695939527" sldId="305"/>
+            <ac:picMk id="1026" creationId="{C5B14513-AC22-49C2-A6E7-D1B32F10D16A}"/>
           </ac:picMkLst>
         </pc:picChg>
         <pc:picChg chg="mod">
@@ -1692,8 +1699,8 @@
             <ac:picMk id="23554" creationId="{F19DAF85-BB61-4B24-8089-0CEE3DC60A52}"/>
           </ac:picMkLst>
         </pc:picChg>
-        <pc:picChg chg="mod modCrop">
-          <ac:chgData name="Alejandro Carrión" userId="757439b461449c9e" providerId="LiveId" clId="{ECF2C08A-1D63-4443-908D-B3C4743D2FCA}" dt="2021-08-30T18:19:12.596" v="1800" actId="1076"/>
+        <pc:picChg chg="del mod modCrop">
+          <ac:chgData name="Alejandro Carrión" userId="757439b461449c9e" providerId="LiveId" clId="{ECF2C08A-1D63-4443-908D-B3C4743D2FCA}" dt="2021-09-04T08:50:23.439" v="5748" actId="478"/>
           <ac:picMkLst>
             <pc:docMk/>
             <pc:sldMk cId="695939527" sldId="305"/>
@@ -1836,6 +1843,21 @@
             <pc:docMk/>
             <pc:sldMk cId="1942491338" sldId="305"/>
             <ac:picMk id="25602" creationId="{16766E72-485E-4F29-9E22-26838D7F9832}"/>
+          </ac:picMkLst>
+        </pc:picChg>
+      </pc:sldChg>
+      <pc:sldChg chg="addSp">
+        <pc:chgData name="Alejandro Carrión" userId="757439b461449c9e" providerId="LiveId" clId="{ECF2C08A-1D63-4443-908D-B3C4743D2FCA}" dt="2021-09-04T08:50:24.001" v="5749"/>
+        <pc:sldMkLst>
+          <pc:docMk/>
+          <pc:sldMk cId="1977333874" sldId="305"/>
+        </pc:sldMkLst>
+        <pc:picChg chg="add">
+          <ac:chgData name="Alejandro Carrión" userId="757439b461449c9e" providerId="LiveId" clId="{ECF2C08A-1D63-4443-908D-B3C4743D2FCA}" dt="2021-09-04T08:50:24.001" v="5749"/>
+          <ac:picMkLst>
+            <pc:docMk/>
+            <pc:sldMk cId="1977333874" sldId="305"/>
+            <ac:picMk id="1026" creationId="{C5B14513-AC22-49C2-A6E7-D1B32F10D16A}"/>
           </ac:picMkLst>
         </pc:picChg>
       </pc:sldChg>
@@ -2201,7 +2223,7 @@
         </pc:picChg>
       </pc:sldChg>
       <pc:sldChg chg="addSp delSp modSp add mod">
-        <pc:chgData name="Alejandro Carrión" userId="757439b461449c9e" providerId="LiveId" clId="{ECF2C08A-1D63-4443-908D-B3C4743D2FCA}" dt="2021-08-30T19:27:51.537" v="2615" actId="20577"/>
+        <pc:chgData name="Alejandro Carrión" userId="757439b461449c9e" providerId="LiveId" clId="{ECF2C08A-1D63-4443-908D-B3C4743D2FCA}" dt="2021-09-04T08:49:19.202" v="5747" actId="2710"/>
         <pc:sldMkLst>
           <pc:docMk/>
           <pc:sldMk cId="1817353308" sldId="309"/>
@@ -2215,7 +2237,7 @@
           </ac:spMkLst>
         </pc:spChg>
         <pc:spChg chg="mod">
-          <ac:chgData name="Alejandro Carrión" userId="757439b461449c9e" providerId="LiveId" clId="{ECF2C08A-1D63-4443-908D-B3C4743D2FCA}" dt="2021-08-30T19:27:51.537" v="2615" actId="20577"/>
+          <ac:chgData name="Alejandro Carrión" userId="757439b461449c9e" providerId="LiveId" clId="{ECF2C08A-1D63-4443-908D-B3C4743D2FCA}" dt="2021-09-04T08:49:19.202" v="5747" actId="2710"/>
           <ac:spMkLst>
             <pc:docMk/>
             <pc:sldMk cId="1817353308" sldId="309"/>
@@ -2364,13 +2386,13 @@
         </pc:picChg>
       </pc:sldChg>
       <pc:sldChg chg="addSp delSp modSp add mod ord chgLayout">
-        <pc:chgData name="Alejandro Carrión" userId="757439b461449c9e" providerId="LiveId" clId="{ECF2C08A-1D63-4443-908D-B3C4743D2FCA}" dt="2021-08-31T17:46:27.664" v="3319" actId="20577"/>
+        <pc:chgData name="Alejandro Carrión" userId="757439b461449c9e" providerId="LiveId" clId="{ECF2C08A-1D63-4443-908D-B3C4743D2FCA}" dt="2021-09-04T08:51:06.534" v="5765" actId="6549"/>
         <pc:sldMkLst>
           <pc:docMk/>
           <pc:sldMk cId="805546150" sldId="314"/>
         </pc:sldMkLst>
         <pc:spChg chg="add del mod ord">
-          <ac:chgData name="Alejandro Carrión" userId="757439b461449c9e" providerId="LiveId" clId="{ECF2C08A-1D63-4443-908D-B3C4743D2FCA}" dt="2021-08-31T17:46:27.664" v="3319" actId="20577"/>
+          <ac:chgData name="Alejandro Carrión" userId="757439b461449c9e" providerId="LiveId" clId="{ECF2C08A-1D63-4443-908D-B3C4743D2FCA}" dt="2021-09-04T08:51:06.534" v="5765" actId="6549"/>
           <ac:spMkLst>
             <pc:docMk/>
             <pc:sldMk cId="805546150" sldId="314"/>
@@ -2378,7 +2400,7 @@
           </ac:spMkLst>
         </pc:spChg>
         <pc:spChg chg="mod ord">
-          <ac:chgData name="Alejandro Carrión" userId="757439b461449c9e" providerId="LiveId" clId="{ECF2C08A-1D63-4443-908D-B3C4743D2FCA}" dt="2021-08-31T17:45:23.832" v="3309" actId="14100"/>
+          <ac:chgData name="Alejandro Carrión" userId="757439b461449c9e" providerId="LiveId" clId="{ECF2C08A-1D63-4443-908D-B3C4743D2FCA}" dt="2021-09-04T08:51:04.237" v="5763" actId="20577"/>
           <ac:spMkLst>
             <pc:docMk/>
             <pc:sldMk cId="805546150" sldId="314"/>
@@ -2394,7 +2416,7 @@
           </ac:spMkLst>
         </pc:spChg>
         <pc:spChg chg="add mod">
-          <ac:chgData name="Alejandro Carrión" userId="757439b461449c9e" providerId="LiveId" clId="{ECF2C08A-1D63-4443-908D-B3C4743D2FCA}" dt="2021-08-31T17:45:44.783" v="3313" actId="1076"/>
+          <ac:chgData name="Alejandro Carrión" userId="757439b461449c9e" providerId="LiveId" clId="{ECF2C08A-1D63-4443-908D-B3C4743D2FCA}" dt="2021-09-04T08:51:05.002" v="5764" actId="20577"/>
           <ac:spMkLst>
             <pc:docMk/>
             <pc:sldMk cId="805546150" sldId="314"/>
@@ -2441,14 +2463,14 @@
           </ac:spMkLst>
         </pc:spChg>
       </pc:sldChg>
-      <pc:sldChg chg="modSp add mod">
-        <pc:chgData name="Alejandro Carrión" userId="757439b461449c9e" providerId="LiveId" clId="{ECF2C08A-1D63-4443-908D-B3C4743D2FCA}" dt="2021-08-31T18:15:43.101" v="4279" actId="113"/>
+      <pc:sldChg chg="addSp modSp add mod">
+        <pc:chgData name="Alejandro Carrión" userId="757439b461449c9e" providerId="LiveId" clId="{ECF2C08A-1D63-4443-908D-B3C4743D2FCA}" dt="2021-09-04T09:00:52.209" v="5788" actId="20577"/>
         <pc:sldMkLst>
           <pc:docMk/>
           <pc:sldMk cId="159887170" sldId="316"/>
         </pc:sldMkLst>
         <pc:spChg chg="mod">
-          <ac:chgData name="Alejandro Carrión" userId="757439b461449c9e" providerId="LiveId" clId="{ECF2C08A-1D63-4443-908D-B3C4743D2FCA}" dt="2021-08-31T18:14:56.992" v="4258" actId="14100"/>
+          <ac:chgData name="Alejandro Carrión" userId="757439b461449c9e" providerId="LiveId" clId="{ECF2C08A-1D63-4443-908D-B3C4743D2FCA}" dt="2021-09-04T09:00:37.912" v="5786" actId="14100"/>
           <ac:spMkLst>
             <pc:docMk/>
             <pc:sldMk cId="159887170" sldId="316"/>
@@ -2456,13 +2478,21 @@
           </ac:spMkLst>
         </pc:spChg>
         <pc:spChg chg="mod">
-          <ac:chgData name="Alejandro Carrión" userId="757439b461449c9e" providerId="LiveId" clId="{ECF2C08A-1D63-4443-908D-B3C4743D2FCA}" dt="2021-08-31T18:15:43.101" v="4279" actId="113"/>
+          <ac:chgData name="Alejandro Carrión" userId="757439b461449c9e" providerId="LiveId" clId="{ECF2C08A-1D63-4443-908D-B3C4743D2FCA}" dt="2021-09-04T09:00:52.209" v="5788" actId="20577"/>
           <ac:spMkLst>
             <pc:docMk/>
             <pc:sldMk cId="159887170" sldId="316"/>
             <ac:spMk id="4" creationId="{BF52B7DE-5887-4E0E-A1E2-39957FD5F9FF}"/>
           </ac:spMkLst>
         </pc:spChg>
+        <pc:picChg chg="add mod">
+          <ac:chgData name="Alejandro Carrión" userId="757439b461449c9e" providerId="LiveId" clId="{ECF2C08A-1D63-4443-908D-B3C4743D2FCA}" dt="2021-09-04T09:00:34.849" v="5785" actId="1076"/>
+          <ac:picMkLst>
+            <pc:docMk/>
+            <pc:sldMk cId="159887170" sldId="316"/>
+            <ac:picMk id="5" creationId="{5B9A4227-2553-4039-BEAB-2E62997C6BE7}"/>
+          </ac:picMkLst>
+        </pc:picChg>
       </pc:sldChg>
       <pc:sldChg chg="addSp modSp add mod">
         <pc:chgData name="Alejandro Carrión" userId="757439b461449c9e" providerId="LiveId" clId="{ECF2C08A-1D63-4443-908D-B3C4743D2FCA}" dt="2021-08-31T18:23:31.664" v="4697" actId="2710"/>
@@ -2496,13 +2526,13 @@
         </pc:picChg>
       </pc:sldChg>
       <pc:sldChg chg="modSp add mod ord">
-        <pc:chgData name="Alejandro Carrión" userId="757439b461449c9e" providerId="LiveId" clId="{ECF2C08A-1D63-4443-908D-B3C4743D2FCA}" dt="2021-08-31T18:06:21.493" v="3708" actId="255"/>
+        <pc:chgData name="Alejandro Carrión" userId="757439b461449c9e" providerId="LiveId" clId="{ECF2C08A-1D63-4443-908D-B3C4743D2FCA}" dt="2021-09-04T08:54:41.415" v="5780" actId="2710"/>
         <pc:sldMkLst>
           <pc:docMk/>
           <pc:sldMk cId="1083794317" sldId="318"/>
         </pc:sldMkLst>
         <pc:spChg chg="mod">
-          <ac:chgData name="Alejandro Carrión" userId="757439b461449c9e" providerId="LiveId" clId="{ECF2C08A-1D63-4443-908D-B3C4743D2FCA}" dt="2021-08-31T18:06:21.493" v="3708" actId="255"/>
+          <ac:chgData name="Alejandro Carrión" userId="757439b461449c9e" providerId="LiveId" clId="{ECF2C08A-1D63-4443-908D-B3C4743D2FCA}" dt="2021-09-04T08:54:41.415" v="5780" actId="2710"/>
           <ac:spMkLst>
             <pc:docMk/>
             <pc:sldMk cId="1083794317" sldId="318"/>
@@ -2588,8 +2618,8 @@
           </ac:spMkLst>
         </pc:spChg>
       </pc:sldChg>
-      <pc:sldChg chg="addSp delSp modSp add mod">
-        <pc:chgData name="Alejandro Carrión" userId="757439b461449c9e" providerId="LiveId" clId="{ECF2C08A-1D63-4443-908D-B3C4743D2FCA}" dt="2021-08-31T18:24:15.163" v="4704" actId="14100"/>
+      <pc:sldChg chg="addSp delSp modSp add del mod">
+        <pc:chgData name="Alejandro Carrión" userId="757439b461449c9e" providerId="LiveId" clId="{ECF2C08A-1D63-4443-908D-B3C4743D2FCA}" dt="2021-09-04T09:01:05.206" v="5789" actId="47"/>
         <pc:sldMkLst>
           <pc:docMk/>
           <pc:sldMk cId="4010743008" sldId="321"/>
@@ -2610,8 +2640,8 @@
             <ac:spMk id="4" creationId="{BF52B7DE-5887-4E0E-A1E2-39957FD5F9FF}"/>
           </ac:spMkLst>
         </pc:spChg>
-        <pc:picChg chg="add mod">
-          <ac:chgData name="Alejandro Carrión" userId="757439b461449c9e" providerId="LiveId" clId="{ECF2C08A-1D63-4443-908D-B3C4743D2FCA}" dt="2021-08-31T18:24:15.163" v="4704" actId="14100"/>
+        <pc:picChg chg="add del mod">
+          <ac:chgData name="Alejandro Carrión" userId="757439b461449c9e" providerId="LiveId" clId="{ECF2C08A-1D63-4443-908D-B3C4743D2FCA}" dt="2021-09-04T09:00:30.303" v="5783" actId="21"/>
           <ac:picMkLst>
             <pc:docMk/>
             <pc:sldMk cId="4010743008" sldId="321"/>
@@ -2620,13 +2650,13 @@
         </pc:picChg>
       </pc:sldChg>
       <pc:sldChg chg="modSp add mod ord">
-        <pc:chgData name="Alejandro Carrión" userId="757439b461449c9e" providerId="LiveId" clId="{ECF2C08A-1D63-4443-908D-B3C4743D2FCA}" dt="2021-08-31T18:18:45.506" v="4556" actId="20577"/>
+        <pc:chgData name="Alejandro Carrión" userId="757439b461449c9e" providerId="LiveId" clId="{ECF2C08A-1D63-4443-908D-B3C4743D2FCA}" dt="2021-09-04T09:01:10.987" v="5793" actId="20577"/>
         <pc:sldMkLst>
           <pc:docMk/>
           <pc:sldMk cId="2415125095" sldId="322"/>
         </pc:sldMkLst>
         <pc:spChg chg="mod">
-          <ac:chgData name="Alejandro Carrión" userId="757439b461449c9e" providerId="LiveId" clId="{ECF2C08A-1D63-4443-908D-B3C4743D2FCA}" dt="2021-08-31T18:18:45.506" v="4556" actId="20577"/>
+          <ac:chgData name="Alejandro Carrión" userId="757439b461449c9e" providerId="LiveId" clId="{ECF2C08A-1D63-4443-908D-B3C4743D2FCA}" dt="2021-09-04T08:55:34.883" v="5781" actId="2710"/>
           <ac:spMkLst>
             <pc:docMk/>
             <pc:sldMk cId="2415125095" sldId="322"/>
@@ -2634,7 +2664,7 @@
           </ac:spMkLst>
         </pc:spChg>
         <pc:spChg chg="mod">
-          <ac:chgData name="Alejandro Carrión" userId="757439b461449c9e" providerId="LiveId" clId="{ECF2C08A-1D63-4443-908D-B3C4743D2FCA}" dt="2021-08-31T18:17:37.992" v="4358" actId="14100"/>
+          <ac:chgData name="Alejandro Carrión" userId="757439b461449c9e" providerId="LiveId" clId="{ECF2C08A-1D63-4443-908D-B3C4743D2FCA}" dt="2021-09-04T09:01:10.987" v="5793" actId="20577"/>
           <ac:spMkLst>
             <pc:docMk/>
             <pc:sldMk cId="2415125095" sldId="322"/>
@@ -2666,13 +2696,13 @@
         </pc:spChg>
       </pc:sldChg>
       <pc:sldChg chg="modSp add mod">
-        <pc:chgData name="Alejandro Carrión" userId="757439b461449c9e" providerId="LiveId" clId="{ECF2C08A-1D63-4443-908D-B3C4743D2FCA}" dt="2021-09-02T18:59:09.389" v="5511" actId="20577"/>
+        <pc:chgData name="Alejandro Carrión" userId="757439b461449c9e" providerId="LiveId" clId="{ECF2C08A-1D63-4443-908D-B3C4743D2FCA}" dt="2021-09-04T08:55:48.283" v="5782" actId="2710"/>
         <pc:sldMkLst>
           <pc:docMk/>
           <pc:sldMk cId="1460749720" sldId="324"/>
         </pc:sldMkLst>
         <pc:spChg chg="mod">
-          <ac:chgData name="Alejandro Carrión" userId="757439b461449c9e" providerId="LiveId" clId="{ECF2C08A-1D63-4443-908D-B3C4743D2FCA}" dt="2021-09-02T18:59:09.389" v="5511" actId="20577"/>
+          <ac:chgData name="Alejandro Carrión" userId="757439b461449c9e" providerId="LiveId" clId="{ECF2C08A-1D63-4443-908D-B3C4743D2FCA}" dt="2021-09-04T08:55:48.283" v="5782" actId="2710"/>
           <ac:spMkLst>
             <pc:docMk/>
             <pc:sldMk cId="1460749720" sldId="324"/>
@@ -17148,42 +17178,6 @@
       </p:pic>
       <p:pic>
         <p:nvPicPr>
-          <p:cNvPr id="24578" name="Picture 2" descr="Logotipo&#10;&#10;Descripción generada automáticamente">
-            <a:extLst>
-              <a:ext uri="{FF2B5EF4-FFF2-40B4-BE49-F238E27FC236}">
-                <a16:creationId xmlns:a16="http://schemas.microsoft.com/office/drawing/2014/main" id="{0D5C7D47-2FAE-4B75-8EBD-F411BC151AC0}"/>
-              </a:ext>
-            </a:extLst>
-          </p:cNvPr>
-          <p:cNvPicPr>
-            <a:picLocks noChangeAspect="1" noChangeArrowheads="1"/>
-          </p:cNvPicPr>
-          <p:nvPr/>
-        </p:nvPicPr>
-        <p:blipFill rotWithShape="1">
-          <a:blip r:embed="rId4">
-            <a:extLst>
-              <a:ext uri="{28A0092B-C50C-407E-A947-70E740481C1C}">
-                <a14:useLocalDpi xmlns:a14="http://schemas.microsoft.com/office/drawing/2010/main" val="0"/>
-              </a:ext>
-            </a:extLst>
-          </a:blip>
-          <a:srcRect l="5856" t="15652" r="66328" b="15704"/>
-          <a:stretch/>
-        </p:blipFill>
-        <p:spPr bwMode="auto">
-          <a:xfrm>
-            <a:off x="6809214" y="1473482"/>
-            <a:ext cx="1671370" cy="1646236"/>
-          </a:xfrm>
-          <a:prstGeom prst="rect">
-            <a:avLst/>
-          </a:prstGeom>
-          <a:noFill/>
-        </p:spPr>
-      </p:pic>
-      <p:pic>
-        <p:nvPicPr>
           <p:cNvPr id="28674" name="Picture 2" descr="Icono&#10;&#10;Descripción generada automáticamente">
             <a:extLst>
               <a:ext uri="{FF2B5EF4-FFF2-40B4-BE49-F238E27FC236}">
@@ -17197,7 +17191,7 @@
           <p:nvPr/>
         </p:nvPicPr>
         <p:blipFill rotWithShape="1">
-          <a:blip r:embed="rId5">
+          <a:blip r:embed="rId4">
             <a:extLst>
               <a:ext uri="{28A0092B-C50C-407E-A947-70E740481C1C}">
                 <a14:useLocalDpi xmlns:a14="http://schemas.microsoft.com/office/drawing/2010/main" val="0"/>
@@ -17233,7 +17227,7 @@
           <p:nvPr/>
         </p:nvPicPr>
         <p:blipFill>
-          <a:blip r:embed="rId6">
+          <a:blip r:embed="rId5">
             <a:extLst>
               <a:ext uri="{28A0092B-C50C-407E-A947-70E740481C1C}">
                 <a14:useLocalDpi xmlns:a14="http://schemas.microsoft.com/office/drawing/2010/main" val="0"/>
@@ -17304,6 +17298,44 @@
           </a:p>
         </p:txBody>
       </p:sp>
+      <p:pic>
+        <p:nvPicPr>
+          <p:cNvPr id="1026" name="Picture 2" descr="Logotipo&#10;&#10;Descripción generada automáticamente">
+            <a:extLst>
+              <a:ext uri="{FF2B5EF4-FFF2-40B4-BE49-F238E27FC236}">
+                <a16:creationId xmlns:a16="http://schemas.microsoft.com/office/drawing/2014/main" id="{C5B14513-AC22-49C2-A6E7-D1B32F10D16A}"/>
+              </a:ext>
+            </a:extLst>
+          </p:cNvPr>
+          <p:cNvPicPr>
+            <a:picLocks noChangeAspect="1" noChangeArrowheads="1"/>
+          </p:cNvPicPr>
+          <p:nvPr/>
+        </p:nvPicPr>
+        <p:blipFill>
+          <a:blip r:embed="rId6">
+            <a:extLst>
+              <a:ext uri="{28A0092B-C50C-407E-A947-70E740481C1C}">
+                <a14:useLocalDpi xmlns:a14="http://schemas.microsoft.com/office/drawing/2010/main" val="0"/>
+              </a:ext>
+            </a:extLst>
+          </a:blip>
+          <a:srcRect/>
+          <a:stretch>
+            <a:fillRect/>
+          </a:stretch>
+        </p:blipFill>
+        <p:spPr bwMode="auto">
+          <a:xfrm>
+            <a:off x="6066736" y="1034150"/>
+            <a:ext cx="2457956" cy="2193918"/>
+          </a:xfrm>
+          <a:prstGeom prst="rect">
+            <a:avLst/>
+          </a:prstGeom>
+          <a:noFill/>
+        </p:spPr>
+      </p:pic>
     </p:spTree>
     <p:extLst>
       <p:ext uri="{BB962C8B-B14F-4D97-AF65-F5344CB8AC3E}">
@@ -17926,19 +17958,7 @@
             </a:r>
             <a:r>
               <a:rPr lang="es-ES" b="0" dirty="0"/>
-              <a:t> – </a:t>
-            </a:r>
-            <a:r>
-              <a:rPr lang="es-ES" b="0" dirty="0" err="1"/>
-              <a:t>RFs</a:t>
-            </a:r>
-            <a:r>
-              <a:rPr lang="es-ES" b="0" dirty="0"/>
-              <a:t> y </a:t>
-            </a:r>
-            <a:r>
-              <a:rPr lang="es-ES" b="0" dirty="0" err="1"/>
-              <a:t>RNFs</a:t>
+              <a:t> – RF y RNF</a:t>
             </a:r>
             <a:endParaRPr lang="es-ES" dirty="0"/>
           </a:p>
@@ -17982,27 +18002,8 @@
                   </a:schemeClr>
                 </a:solidFill>
               </a:rPr>
-              <a:t>Otros </a:t>
+              <a:t>Otros RF</a:t>
             </a:r>
-            <a:r>
-              <a:rPr lang="es-ES" dirty="0" err="1">
-                <a:solidFill>
-                  <a:schemeClr val="accent1">
-                    <a:lumMod val="40000"/>
-                    <a:lumOff val="60000"/>
-                  </a:schemeClr>
-                </a:solidFill>
-              </a:rPr>
-              <a:t>RFs</a:t>
-            </a:r>
-            <a:endParaRPr lang="es-ES" dirty="0">
-              <a:solidFill>
-                <a:schemeClr val="accent1">
-                  <a:lumMod val="40000"/>
-                  <a:lumOff val="60000"/>
-                </a:schemeClr>
-              </a:solidFill>
-            </a:endParaRPr>
           </a:p>
           <a:p>
             <a:r>
@@ -18399,7 +18400,7 @@
               <a:buNone/>
             </a:pPr>
             <a:r>
-              <a:rPr lang="es-ES" dirty="0" err="1">
+              <a:rPr lang="es-ES" dirty="0">
                 <a:solidFill>
                   <a:schemeClr val="accent1">
                     <a:lumMod val="40000"/>
@@ -18407,16 +18408,8 @@
                   </a:schemeClr>
                 </a:solidFill>
               </a:rPr>
-              <a:t>RNFs</a:t>
+              <a:t>RNF</a:t>
             </a:r>
-            <a:endParaRPr lang="es-ES" dirty="0">
-              <a:solidFill>
-                <a:schemeClr val="accent1">
-                  <a:lumMod val="40000"/>
-                  <a:lumOff val="60000"/>
-                </a:schemeClr>
-              </a:solidFill>
-            </a:endParaRPr>
           </a:p>
           <a:p>
             <a:r>
@@ -19103,7 +19096,11 @@
             </a:r>
           </a:p>
           <a:p>
-            <a:pPr lvl="1"/>
+            <a:pPr lvl="1">
+              <a:lnSpc>
+                <a:spcPct val="100000"/>
+              </a:lnSpc>
+            </a:pPr>
             <a:r>
               <a:rPr lang="es-ES" dirty="0"/>
               <a:t>Códigos de error: 404, 502 y 504</a:t>
@@ -19764,7 +19761,7 @@
           <a:p>
             <a:r>
               <a:rPr lang="es-ES" dirty="0"/>
-              <a:t>Metodología (1/3)</a:t>
+              <a:t>Metodología (1/2)</a:t>
             </a:r>
             <a:r>
               <a:rPr lang="es-ES" b="0" dirty="0"/>
@@ -19791,8 +19788,8 @@
         </p:nvSpPr>
         <p:spPr>
           <a:xfrm>
-            <a:off x="779099" y="1503550"/>
-            <a:ext cx="7437053" cy="2884200"/>
+            <a:off x="779100" y="1503550"/>
+            <a:ext cx="6146136" cy="2884200"/>
           </a:xfrm>
         </p:spPr>
         <p:txBody>
@@ -19801,13 +19798,8 @@
           <a:p>
             <a:r>
               <a:rPr lang="es-ES" dirty="0"/>
-              <a:t>Organización de las tareas en </a:t>
+              <a:t>Organización de las tareas en UT</a:t>
             </a:r>
-            <a:r>
-              <a:rPr lang="es-ES" dirty="0" err="1"/>
-              <a:t>UTs</a:t>
-            </a:r>
-            <a:endParaRPr lang="es-ES" dirty="0"/>
           </a:p>
           <a:p>
             <a:r>
@@ -19829,13 +19821,8 @@
           <a:p>
             <a:r>
               <a:rPr lang="es-ES" dirty="0"/>
-              <a:t>Definición de </a:t>
+              <a:t>Definición de PA</a:t>
             </a:r>
-            <a:r>
-              <a:rPr lang="es-ES" dirty="0" err="1"/>
-              <a:t>PAs</a:t>
-            </a:r>
-            <a:endParaRPr lang="es-ES" dirty="0"/>
           </a:p>
           <a:p>
             <a:r>
@@ -19901,6 +19888,36 @@
           </a:p>
         </p:txBody>
       </p:sp>
+      <p:pic>
+        <p:nvPicPr>
+          <p:cNvPr id="5" name="Imagen 4" descr="Interfaz de usuario gráfica, Aplicación&#10;&#10;Descripción generada automáticamente">
+            <a:extLst>
+              <a:ext uri="{FF2B5EF4-FFF2-40B4-BE49-F238E27FC236}">
+                <a16:creationId xmlns:a16="http://schemas.microsoft.com/office/drawing/2014/main" id="{5B9A4227-2553-4039-BEAB-2E62997C6BE7}"/>
+              </a:ext>
+            </a:extLst>
+          </p:cNvPr>
+          <p:cNvPicPr>
+            <a:picLocks noChangeAspect="1"/>
+          </p:cNvPicPr>
+          <p:nvPr/>
+        </p:nvPicPr>
+        <p:blipFill>
+          <a:blip r:embed="rId2"/>
+          <a:stretch>
+            <a:fillRect/>
+          </a:stretch>
+        </p:blipFill>
+        <p:spPr>
+          <a:xfrm>
+            <a:off x="7039535" y="133276"/>
+            <a:ext cx="1580029" cy="4876948"/>
+          </a:xfrm>
+          <a:prstGeom prst="rect">
+            <a:avLst/>
+          </a:prstGeom>
+        </p:spPr>
+      </p:pic>
     </p:spTree>
     <p:extLst>
       <p:ext uri="{BB962C8B-B14F-4D97-AF65-F5344CB8AC3E}">
@@ -19949,317 +19966,6 @@
         </p:nvSpPr>
         <p:spPr>
           <a:xfrm>
-            <a:off x="779100" y="836000"/>
-            <a:ext cx="4303888" cy="396300"/>
-          </a:xfrm>
-        </p:spPr>
-        <p:txBody>
-          <a:bodyPr anchor="t"/>
-          <a:lstStyle/>
-          <a:p>
-            <a:r>
-              <a:rPr lang="es-ES" dirty="0"/>
-              <a:t>Metodología (2/3)</a:t>
-            </a:r>
-            <a:r>
-              <a:rPr lang="es-ES" b="0" dirty="0"/>
-              <a:t> – Plan de trabajo</a:t>
-            </a:r>
-          </a:p>
-        </p:txBody>
-      </p:sp>
-      <p:sp>
-        <p:nvSpPr>
-          <p:cNvPr id="6" name="Google Shape;342;p24">
-            <a:extLst>
-              <a:ext uri="{FF2B5EF4-FFF2-40B4-BE49-F238E27FC236}">
-                <a16:creationId xmlns:a16="http://schemas.microsoft.com/office/drawing/2014/main" id="{57CD6963-C021-4F2A-B2B3-BC2173F77F80}"/>
-              </a:ext>
-            </a:extLst>
-          </p:cNvPr>
-          <p:cNvSpPr txBox="1">
-            <a:spLocks noGrp="1"/>
-          </p:cNvSpPr>
-          <p:nvPr>
-            <p:ph type="sldNum" idx="12"/>
-          </p:nvPr>
-        </p:nvSpPr>
-        <p:spPr>
-          <a:prstGeom prst="rect">
-            <a:avLst/>
-          </a:prstGeom>
-        </p:spPr>
-        <p:txBody>
-          <a:bodyPr spcFirstLastPara="1" wrap="square" lIns="0" tIns="0" rIns="0" bIns="0" anchor="ctr" anchorCtr="0">
-            <a:noAutofit/>
-          </a:bodyPr>
-          <a:lstStyle/>
-          <a:p>
-            <a:pPr marL="0" lvl="0" indent="0" algn="r" rtl="0">
-              <a:spcBef>
-                <a:spcPts val="0"/>
-              </a:spcBef>
-              <a:spcAft>
-                <a:spcPts val="0"/>
-              </a:spcAft>
-              <a:buNone/>
-            </a:pPr>
-            <a:fld id="{00000000-1234-1234-1234-123412341234}" type="slidenum">
-              <a:rPr lang="en"/>
-              <a:t>29</a:t>
-            </a:fld>
-            <a:endParaRPr dirty="0"/>
-          </a:p>
-        </p:txBody>
-      </p:sp>
-      <p:pic>
-        <p:nvPicPr>
-          <p:cNvPr id="5" name="Imagen 4" descr="Interfaz de usuario gráfica, Aplicación&#10;&#10;Descripción generada automáticamente">
-            <a:extLst>
-              <a:ext uri="{FF2B5EF4-FFF2-40B4-BE49-F238E27FC236}">
-                <a16:creationId xmlns:a16="http://schemas.microsoft.com/office/drawing/2014/main" id="{31823D6F-4008-4C63-AF88-632EED87648F}"/>
-              </a:ext>
-            </a:extLst>
-          </p:cNvPr>
-          <p:cNvPicPr>
-            <a:picLocks noChangeAspect="1"/>
-          </p:cNvPicPr>
-          <p:nvPr/>
-        </p:nvPicPr>
-        <p:blipFill>
-          <a:blip r:embed="rId2"/>
-          <a:stretch>
-            <a:fillRect/>
-          </a:stretch>
-        </p:blipFill>
-        <p:spPr>
-          <a:xfrm>
-            <a:off x="5748617" y="133276"/>
-            <a:ext cx="1580029" cy="4876948"/>
-          </a:xfrm>
-          <a:prstGeom prst="rect">
-            <a:avLst/>
-          </a:prstGeom>
-        </p:spPr>
-      </p:pic>
-    </p:spTree>
-    <p:extLst>
-      <p:ext uri="{BB962C8B-B14F-4D97-AF65-F5344CB8AC3E}">
-        <p14:creationId xmlns:p14="http://schemas.microsoft.com/office/powerpoint/2010/main" val="4010743008"/>
-      </p:ext>
-    </p:extLst>
-  </p:cSld>
-  <p:clrMapOvr>
-    <a:masterClrMapping/>
-  </p:clrMapOvr>
-</p:sld>
-</file>
-
-<file path=ppt/slides/slide3.xml><?xml version="1.0" encoding="utf-8"?>
-<p:sld xmlns:a="http://schemas.openxmlformats.org/drawingml/2006/main" xmlns:r="http://schemas.openxmlformats.org/officeDocument/2006/relationships" xmlns:p="http://schemas.openxmlformats.org/presentationml/2006/main">
-  <p:cSld>
-    <p:spTree>
-      <p:nvGrpSpPr>
-        <p:cNvPr id="1" name="Shape 225"/>
-        <p:cNvGrpSpPr/>
-        <p:nvPr/>
-      </p:nvGrpSpPr>
-      <p:grpSpPr>
-        <a:xfrm>
-          <a:off x="0" y="0"/>
-          <a:ext cx="0" cy="0"/>
-          <a:chOff x="0" y="0"/>
-          <a:chExt cx="0" cy="0"/>
-        </a:xfrm>
-      </p:grpSpPr>
-      <p:sp>
-        <p:nvSpPr>
-          <p:cNvPr id="226" name="Google Shape;226;p15"/>
-          <p:cNvSpPr txBox="1">
-            <a:spLocks noGrp="1"/>
-          </p:cNvSpPr>
-          <p:nvPr>
-            <p:ph type="ctrTitle"/>
-          </p:nvPr>
-        </p:nvSpPr>
-        <p:spPr>
-          <a:xfrm>
-            <a:off x="2305150" y="2884378"/>
-            <a:ext cx="5811000" cy="475800"/>
-          </a:xfrm>
-          <a:prstGeom prst="rect">
-            <a:avLst/>
-          </a:prstGeom>
-        </p:spPr>
-        <p:txBody>
-          <a:bodyPr spcFirstLastPara="1" wrap="square" lIns="0" tIns="0" rIns="0" bIns="0" anchor="ctr" anchorCtr="0">
-            <a:noAutofit/>
-          </a:bodyPr>
-          <a:lstStyle/>
-          <a:p>
-            <a:pPr marL="0" lvl="0" indent="0" algn="l" rtl="0">
-              <a:spcBef>
-                <a:spcPts val="0"/>
-              </a:spcBef>
-              <a:spcAft>
-                <a:spcPts val="0"/>
-              </a:spcAft>
-              <a:buNone/>
-            </a:pPr>
-            <a:r>
-              <a:rPr lang="en" dirty="0"/>
-              <a:t>INTRODUCCIÓN</a:t>
-            </a:r>
-            <a:endParaRPr dirty="0"/>
-          </a:p>
-        </p:txBody>
-      </p:sp>
-      <p:sp>
-        <p:nvSpPr>
-          <p:cNvPr id="227" name="Google Shape;227;p15"/>
-          <p:cNvSpPr txBox="1">
-            <a:spLocks noGrp="1"/>
-          </p:cNvSpPr>
-          <p:nvPr>
-            <p:ph type="subTitle" idx="1"/>
-          </p:nvPr>
-        </p:nvSpPr>
-        <p:spPr>
-          <a:xfrm>
-            <a:off x="2305150" y="3385436"/>
-            <a:ext cx="5811000" cy="410700"/>
-          </a:xfrm>
-          <a:prstGeom prst="rect">
-            <a:avLst/>
-          </a:prstGeom>
-        </p:spPr>
-        <p:txBody>
-          <a:bodyPr spcFirstLastPara="1" wrap="square" lIns="0" tIns="0" rIns="0" bIns="0" anchor="t" anchorCtr="0">
-            <a:noAutofit/>
-          </a:bodyPr>
-          <a:lstStyle/>
-          <a:p>
-            <a:pPr marL="0" lvl="0" indent="0" algn="l" rtl="0">
-              <a:spcBef>
-                <a:spcPts val="0"/>
-              </a:spcBef>
-              <a:spcAft>
-                <a:spcPts val="800"/>
-              </a:spcAft>
-              <a:buNone/>
-            </a:pPr>
-            <a:r>
-              <a:rPr lang="en" dirty="0"/>
-              <a:t>Motivación y objetivos</a:t>
-            </a:r>
-            <a:endParaRPr dirty="0"/>
-          </a:p>
-        </p:txBody>
-      </p:sp>
-      <p:sp>
-        <p:nvSpPr>
-          <p:cNvPr id="228" name="Google Shape;228;p15"/>
-          <p:cNvSpPr txBox="1"/>
-          <p:nvPr/>
-        </p:nvSpPr>
-        <p:spPr>
-          <a:xfrm>
-            <a:off x="77600" y="2201325"/>
-            <a:ext cx="2004000" cy="2201400"/>
-          </a:xfrm>
-          <a:prstGeom prst="rect">
-            <a:avLst/>
-          </a:prstGeom>
-          <a:noFill/>
-          <a:ln>
-            <a:noFill/>
-          </a:ln>
-        </p:spPr>
-        <p:txBody>
-          <a:bodyPr spcFirstLastPara="1" wrap="square" lIns="91425" tIns="91425" rIns="91425" bIns="91425" anchor="ctr" anchorCtr="0">
-            <a:noAutofit/>
-          </a:bodyPr>
-          <a:lstStyle/>
-          <a:p>
-            <a:pPr marL="0" marR="0" lvl="0" indent="0" algn="ctr" rtl="0">
-              <a:lnSpc>
-                <a:spcPct val="90000"/>
-              </a:lnSpc>
-              <a:spcBef>
-                <a:spcPts val="0"/>
-              </a:spcBef>
-              <a:spcAft>
-                <a:spcPts val="0"/>
-              </a:spcAft>
-              <a:buNone/>
-            </a:pPr>
-            <a:r>
-              <a:rPr lang="en" sz="9600" b="1">
-                <a:solidFill>
-                  <a:schemeClr val="lt1"/>
-                </a:solidFill>
-                <a:latin typeface="Catamaran"/>
-                <a:ea typeface="Catamaran"/>
-                <a:cs typeface="Catamaran"/>
-                <a:sym typeface="Catamaran"/>
-              </a:rPr>
-              <a:t>1</a:t>
-            </a:r>
-            <a:endParaRPr sz="9600" b="1">
-              <a:solidFill>
-                <a:schemeClr val="lt1"/>
-              </a:solidFill>
-              <a:latin typeface="Catamaran"/>
-              <a:ea typeface="Catamaran"/>
-              <a:cs typeface="Catamaran"/>
-              <a:sym typeface="Catamaran"/>
-            </a:endParaRPr>
-          </a:p>
-        </p:txBody>
-      </p:sp>
-    </p:spTree>
-  </p:cSld>
-  <p:clrMapOvr>
-    <a:masterClrMapping/>
-  </p:clrMapOvr>
-</p:sld>
-</file>
-
-<file path=ppt/slides/slide30.xml><?xml version="1.0" encoding="utf-8"?>
-<p:sld xmlns:a="http://schemas.openxmlformats.org/drawingml/2006/main" xmlns:r="http://schemas.openxmlformats.org/officeDocument/2006/relationships" xmlns:p="http://schemas.openxmlformats.org/presentationml/2006/main">
-  <p:cSld>
-    <p:spTree>
-      <p:nvGrpSpPr>
-        <p:cNvPr id="1" name=""/>
-        <p:cNvGrpSpPr/>
-        <p:nvPr/>
-      </p:nvGrpSpPr>
-      <p:grpSpPr>
-        <a:xfrm>
-          <a:off x="0" y="0"/>
-          <a:ext cx="0" cy="0"/>
-          <a:chOff x="0" y="0"/>
-          <a:chExt cx="0" cy="0"/>
-        </a:xfrm>
-      </p:grpSpPr>
-      <p:sp>
-        <p:nvSpPr>
-          <p:cNvPr id="4" name="Título 3">
-            <a:extLst>
-              <a:ext uri="{FF2B5EF4-FFF2-40B4-BE49-F238E27FC236}">
-                <a16:creationId xmlns:a16="http://schemas.microsoft.com/office/drawing/2014/main" id="{BF52B7DE-5887-4E0E-A1E2-39957FD5F9FF}"/>
-              </a:ext>
-            </a:extLst>
-          </p:cNvPr>
-          <p:cNvSpPr>
-            <a:spLocks noGrp="1"/>
-          </p:cNvSpPr>
-          <p:nvPr>
-            <p:ph type="title"/>
-          </p:nvPr>
-        </p:nvSpPr>
-        <p:spPr>
-          <a:xfrm>
             <a:off x="779099" y="836000"/>
             <a:ext cx="7605141" cy="396300"/>
           </a:xfrm>
@@ -20270,7 +19976,7 @@
           <a:p>
             <a:r>
               <a:rPr lang="es-ES" dirty="0"/>
-              <a:t>Metodología (3/3)</a:t>
+              <a:t>Metodología (2/2)</a:t>
             </a:r>
             <a:r>
               <a:rPr lang="es-ES" b="0" dirty="0"/>
@@ -20317,7 +20023,11 @@
             </a:r>
           </a:p>
           <a:p>
-            <a:pPr lvl="1"/>
+            <a:pPr lvl="1">
+              <a:lnSpc>
+                <a:spcPct val="100000"/>
+              </a:lnSpc>
+            </a:pPr>
             <a:r>
               <a:rPr lang="es-ES" dirty="0"/>
               <a:t>Construcción de prototipos</a:t>
@@ -20390,7 +20100,7 @@
             </a:pPr>
             <a:fld id="{00000000-1234-1234-1234-123412341234}" type="slidenum">
               <a:rPr lang="en"/>
-              <a:t>30</a:t>
+              <a:t>29</a:t>
             </a:fld>
             <a:endParaRPr dirty="0"/>
           </a:p>
@@ -20409,7 +20119,7 @@
 </p:sld>
 </file>
 
-<file path=ppt/slides/slide31.xml><?xml version="1.0" encoding="utf-8"?>
+<file path=ppt/slides/slide3.xml><?xml version="1.0" encoding="utf-8"?>
 <p:sld xmlns:a="http://schemas.openxmlformats.org/drawingml/2006/main" xmlns:r="http://schemas.openxmlformats.org/officeDocument/2006/relationships" xmlns:p="http://schemas.openxmlformats.org/presentationml/2006/main">
   <p:cSld>
     <p:spTree>
@@ -20462,6 +20172,176 @@
             </a:pPr>
             <a:r>
               <a:rPr lang="en" dirty="0"/>
+              <a:t>INTRODUCCIÓN</a:t>
+            </a:r>
+            <a:endParaRPr dirty="0"/>
+          </a:p>
+        </p:txBody>
+      </p:sp>
+      <p:sp>
+        <p:nvSpPr>
+          <p:cNvPr id="227" name="Google Shape;227;p15"/>
+          <p:cNvSpPr txBox="1">
+            <a:spLocks noGrp="1"/>
+          </p:cNvSpPr>
+          <p:nvPr>
+            <p:ph type="subTitle" idx="1"/>
+          </p:nvPr>
+        </p:nvSpPr>
+        <p:spPr>
+          <a:xfrm>
+            <a:off x="2305150" y="3385436"/>
+            <a:ext cx="5811000" cy="410700"/>
+          </a:xfrm>
+          <a:prstGeom prst="rect">
+            <a:avLst/>
+          </a:prstGeom>
+        </p:spPr>
+        <p:txBody>
+          <a:bodyPr spcFirstLastPara="1" wrap="square" lIns="0" tIns="0" rIns="0" bIns="0" anchor="t" anchorCtr="0">
+            <a:noAutofit/>
+          </a:bodyPr>
+          <a:lstStyle/>
+          <a:p>
+            <a:pPr marL="0" lvl="0" indent="0" algn="l" rtl="0">
+              <a:spcBef>
+                <a:spcPts val="0"/>
+              </a:spcBef>
+              <a:spcAft>
+                <a:spcPts val="800"/>
+              </a:spcAft>
+              <a:buNone/>
+            </a:pPr>
+            <a:r>
+              <a:rPr lang="en" dirty="0"/>
+              <a:t>Motivación y objetivos</a:t>
+            </a:r>
+            <a:endParaRPr dirty="0"/>
+          </a:p>
+        </p:txBody>
+      </p:sp>
+      <p:sp>
+        <p:nvSpPr>
+          <p:cNvPr id="228" name="Google Shape;228;p15"/>
+          <p:cNvSpPr txBox="1"/>
+          <p:nvPr/>
+        </p:nvSpPr>
+        <p:spPr>
+          <a:xfrm>
+            <a:off x="77600" y="2201325"/>
+            <a:ext cx="2004000" cy="2201400"/>
+          </a:xfrm>
+          <a:prstGeom prst="rect">
+            <a:avLst/>
+          </a:prstGeom>
+          <a:noFill/>
+          <a:ln>
+            <a:noFill/>
+          </a:ln>
+        </p:spPr>
+        <p:txBody>
+          <a:bodyPr spcFirstLastPara="1" wrap="square" lIns="91425" tIns="91425" rIns="91425" bIns="91425" anchor="ctr" anchorCtr="0">
+            <a:noAutofit/>
+          </a:bodyPr>
+          <a:lstStyle/>
+          <a:p>
+            <a:pPr marL="0" marR="0" lvl="0" indent="0" algn="ctr" rtl="0">
+              <a:lnSpc>
+                <a:spcPct val="90000"/>
+              </a:lnSpc>
+              <a:spcBef>
+                <a:spcPts val="0"/>
+              </a:spcBef>
+              <a:spcAft>
+                <a:spcPts val="0"/>
+              </a:spcAft>
+              <a:buNone/>
+            </a:pPr>
+            <a:r>
+              <a:rPr lang="en" sz="9600" b="1">
+                <a:solidFill>
+                  <a:schemeClr val="lt1"/>
+                </a:solidFill>
+                <a:latin typeface="Catamaran"/>
+                <a:ea typeface="Catamaran"/>
+                <a:cs typeface="Catamaran"/>
+                <a:sym typeface="Catamaran"/>
+              </a:rPr>
+              <a:t>1</a:t>
+            </a:r>
+            <a:endParaRPr sz="9600" b="1">
+              <a:solidFill>
+                <a:schemeClr val="lt1"/>
+              </a:solidFill>
+              <a:latin typeface="Catamaran"/>
+              <a:ea typeface="Catamaran"/>
+              <a:cs typeface="Catamaran"/>
+              <a:sym typeface="Catamaran"/>
+            </a:endParaRPr>
+          </a:p>
+        </p:txBody>
+      </p:sp>
+    </p:spTree>
+  </p:cSld>
+  <p:clrMapOvr>
+    <a:masterClrMapping/>
+  </p:clrMapOvr>
+</p:sld>
+</file>
+
+<file path=ppt/slides/slide30.xml><?xml version="1.0" encoding="utf-8"?>
+<p:sld xmlns:a="http://schemas.openxmlformats.org/drawingml/2006/main" xmlns:r="http://schemas.openxmlformats.org/officeDocument/2006/relationships" xmlns:p="http://schemas.openxmlformats.org/presentationml/2006/main">
+  <p:cSld>
+    <p:spTree>
+      <p:nvGrpSpPr>
+        <p:cNvPr id="1" name="Shape 225"/>
+        <p:cNvGrpSpPr/>
+        <p:nvPr/>
+      </p:nvGrpSpPr>
+      <p:grpSpPr>
+        <a:xfrm>
+          <a:off x="0" y="0"/>
+          <a:ext cx="0" cy="0"/>
+          <a:chOff x="0" y="0"/>
+          <a:chExt cx="0" cy="0"/>
+        </a:xfrm>
+      </p:grpSpPr>
+      <p:sp>
+        <p:nvSpPr>
+          <p:cNvPr id="226" name="Google Shape;226;p15"/>
+          <p:cNvSpPr txBox="1">
+            <a:spLocks noGrp="1"/>
+          </p:cNvSpPr>
+          <p:nvPr>
+            <p:ph type="ctrTitle"/>
+          </p:nvPr>
+        </p:nvSpPr>
+        <p:spPr>
+          <a:xfrm>
+            <a:off x="2305150" y="2884378"/>
+            <a:ext cx="5811000" cy="475800"/>
+          </a:xfrm>
+          <a:prstGeom prst="rect">
+            <a:avLst/>
+          </a:prstGeom>
+        </p:spPr>
+        <p:txBody>
+          <a:bodyPr spcFirstLastPara="1" wrap="square" lIns="0" tIns="0" rIns="0" bIns="0" anchor="ctr" anchorCtr="0">
+            <a:noAutofit/>
+          </a:bodyPr>
+          <a:lstStyle/>
+          <a:p>
+            <a:pPr marL="0" lvl="0" indent="0" algn="l" rtl="0">
+              <a:spcBef>
+                <a:spcPts val="0"/>
+              </a:spcBef>
+              <a:spcAft>
+                <a:spcPts val="0"/>
+              </a:spcAft>
+              <a:buNone/>
+            </a:pPr>
+            <a:r>
+              <a:rPr lang="en" dirty="0"/>
               <a:t>DEMO</a:t>
             </a:r>
             <a:endParaRPr dirty="0"/>
@@ -20542,7 +20422,7 @@
 </p:sld>
 </file>
 
-<file path=ppt/slides/slide32.xml><?xml version="1.0" encoding="utf-8"?>
+<file path=ppt/slides/slide31.xml><?xml version="1.0" encoding="utf-8"?>
 <p:sld xmlns:a="http://schemas.openxmlformats.org/drawingml/2006/main" xmlns:r="http://schemas.openxmlformats.org/officeDocument/2006/relationships" xmlns:p="http://schemas.openxmlformats.org/presentationml/2006/main">
   <p:cSld>
     <p:bg>
@@ -20607,7 +20487,7 @@
                   <a:schemeClr val="lt1"/>
                 </a:solidFill>
               </a:rPr>
-              <a:t>32</a:t>
+              <a:t>31</a:t>
             </a:fld>
             <a:endParaRPr>
               <a:solidFill>
@@ -20996,7 +20876,7 @@
 </p:sld>
 </file>
 
-<file path=ppt/slides/slide33.xml><?xml version="1.0" encoding="utf-8"?>
+<file path=ppt/slides/slide32.xml><?xml version="1.0" encoding="utf-8"?>
 <p:sld xmlns:a="http://schemas.openxmlformats.org/drawingml/2006/main" xmlns:r="http://schemas.openxmlformats.org/officeDocument/2006/relationships" xmlns:p="http://schemas.openxmlformats.org/presentationml/2006/main">
   <p:cSld>
     <p:spTree>
@@ -21136,7 +21016,7 @@
 </p:sld>
 </file>
 
-<file path=ppt/slides/slide34.xml><?xml version="1.0" encoding="utf-8"?>
+<file path=ppt/slides/slide33.xml><?xml version="1.0" encoding="utf-8"?>
 <p:sld xmlns:a="http://schemas.openxmlformats.org/drawingml/2006/main" xmlns:r="http://schemas.openxmlformats.org/officeDocument/2006/relationships" xmlns:p="http://schemas.openxmlformats.org/presentationml/2006/main">
   <p:cSld>
     <p:spTree>
@@ -21232,7 +21112,7 @@
           <a:p>
             <a:r>
               <a:rPr lang="es-ES" sz="2200" dirty="0"/>
-              <a:t>Aspectos negativos</a:t>
+              <a:t>Algunos aspectos negativos</a:t>
             </a:r>
           </a:p>
           <a:p>
@@ -21242,7 +21122,11 @@
             </a:r>
           </a:p>
           <a:p>
-            <a:pPr lvl="1"/>
+            <a:pPr lvl="1">
+              <a:lnSpc>
+                <a:spcPct val="100000"/>
+              </a:lnSpc>
+            </a:pPr>
             <a:r>
               <a:rPr lang="es-ES" sz="2200" dirty="0"/>
               <a:t>Previos: metodología, sistemas en red, modelado</a:t>
@@ -21301,7 +21185,7 @@
             </a:pPr>
             <a:fld id="{00000000-1234-1234-1234-123412341234}" type="slidenum">
               <a:rPr lang="en"/>
-              <a:t>34</a:t>
+              <a:t>33</a:t>
             </a:fld>
             <a:endParaRPr dirty="0"/>
           </a:p>
@@ -21320,7 +21204,7 @@
 </p:sld>
 </file>
 
-<file path=ppt/slides/slide35.xml><?xml version="1.0" encoding="utf-8"?>
+<file path=ppt/slides/slide34.xml><?xml version="1.0" encoding="utf-8"?>
 <p:sld xmlns:a="http://schemas.openxmlformats.org/drawingml/2006/main" xmlns:r="http://schemas.openxmlformats.org/officeDocument/2006/relationships" xmlns:p="http://schemas.openxmlformats.org/presentationml/2006/main">
   <p:cSld>
     <p:spTree>
@@ -21470,7 +21354,7 @@
             </a:pPr>
             <a:fld id="{00000000-1234-1234-1234-123412341234}" type="slidenum">
               <a:rPr lang="en"/>
-              <a:t>35</a:t>
+              <a:t>34</a:t>
             </a:fld>
             <a:endParaRPr dirty="0"/>
           </a:p>
@@ -21489,7 +21373,7 @@
 </p:sld>
 </file>
 
-<file path=ppt/slides/slide36.xml><?xml version="1.0" encoding="utf-8"?>
+<file path=ppt/slides/slide35.xml><?xml version="1.0" encoding="utf-8"?>
 <p:sld xmlns:a="http://schemas.openxmlformats.org/drawingml/2006/main" xmlns:r="http://schemas.openxmlformats.org/officeDocument/2006/relationships" xmlns:p="http://schemas.openxmlformats.org/presentationml/2006/main">
   <p:cSld>
     <p:spTree>
@@ -23166,12 +23050,41 @@
           <a:bodyPr/>
           <a:lstStyle/>
           <a:p>
+            <a:pPr>
+              <a:lnSpc>
+                <a:spcPct val="100000"/>
+              </a:lnSpc>
+            </a:pPr>
+            <a:r>
+              <a:rPr lang="es-ES" dirty="0"/>
+              <a:t>Construir un </a:t>
+            </a:r>
+            <a:r>
+              <a:rPr lang="es-ES" i="1" dirty="0"/>
+              <a:t>proxy</a:t>
+            </a:r>
+            <a:r>
+              <a:rPr lang="es-ES" dirty="0"/>
+              <a:t> inverso:</a:t>
+            </a:r>
+          </a:p>
+          <a:p>
+            <a:pPr lvl="1">
+              <a:lnSpc>
+                <a:spcPct val="150000"/>
+              </a:lnSpc>
+            </a:pPr>
             <a:r>
               <a:rPr lang="es-ES" dirty="0"/>
               <a:t>Ocultar los microservicios</a:t>
             </a:r>
           </a:p>
           <a:p>
+            <a:pPr lvl="1">
+              <a:lnSpc>
+                <a:spcPct val="150000"/>
+              </a:lnSpc>
+            </a:pPr>
             <a:r>
               <a:rPr lang="es-ES" dirty="0" err="1"/>
               <a:t>Multiinstanciar</a:t>
@@ -23182,9 +23095,9 @@
             </a:r>
           </a:p>
           <a:p>
-            <a:pPr lvl="1">
+            <a:pPr lvl="2">
               <a:lnSpc>
-                <a:spcPct val="150000"/>
+                <a:spcPct val="100000"/>
               </a:lnSpc>
               <a:buFont typeface="Wingdings" panose="05000000000000000000" pitchFamily="2" charset="2"/>
               <a:buChar char="q"/>
@@ -23195,9 +23108,9 @@
             </a:r>
           </a:p>
           <a:p>
-            <a:pPr lvl="1">
+            <a:pPr lvl="2">
               <a:lnSpc>
-                <a:spcPct val="200000"/>
+                <a:spcPct val="150000"/>
               </a:lnSpc>
             </a:pPr>
             <a:r>
@@ -23206,7 +23119,11 @@
             </a:r>
           </a:p>
           <a:p>
-            <a:pPr lvl="1"/>
+            <a:pPr lvl="2">
+              <a:lnSpc>
+                <a:spcPct val="100000"/>
+              </a:lnSpc>
+            </a:pPr>
             <a:r>
               <a:rPr lang="es-ES" dirty="0"/>
               <a:t>Aumentar eficiencia</a:t>

</xml_diff>

<commit_message>
Linea temporal Cronología del proyecto.
</commit_message>
<xml_diff>
--- a/TFG_AlejandroCarrion.pptx
+++ b/TFG_AlejandroCarrion.pptx
@@ -36,7 +36,7 @@
     <p:sldId id="326" r:id="rId27"/>
     <p:sldId id="317" r:id="rId28"/>
     <p:sldId id="316" r:id="rId29"/>
-    <p:sldId id="322" r:id="rId30"/>
+    <p:sldId id="328" r:id="rId30"/>
     <p:sldId id="297" r:id="rId31"/>
     <p:sldId id="277" r:id="rId32"/>
     <p:sldId id="298" r:id="rId33"/>
@@ -305,7 +305,7 @@
 <file path=ppt/revisionInfo.xml><?xml version="1.0" encoding="utf-8"?>
 <p1510:revInfo xmlns:a="http://schemas.openxmlformats.org/drawingml/2006/main" xmlns:r="http://schemas.openxmlformats.org/officeDocument/2006/relationships" xmlns:p1510="http://schemas.microsoft.com/office/powerpoint/2015/10/main">
   <p1510:revLst>
-    <p1510:client id="{ECF2C08A-1D63-4443-908D-B3C4743D2FCA}" v="74" dt="2021-09-04T09:00:31.803"/>
+    <p1510:client id="{ECF2C08A-1D63-4443-908D-B3C4743D2FCA}" v="92" dt="2021-09-04T09:48:34.240"/>
   </p1510:revLst>
 </p1510:revInfo>
 </file>
@@ -315,7 +315,7 @@
   <pc:docChgLst>
     <pc:chgData name="Alejandro Carrión" userId="757439b461449c9e" providerId="LiveId" clId="{ECF2C08A-1D63-4443-908D-B3C4743D2FCA}"/>
     <pc:docChg chg="undo redo custSel addSld delSld modSld sldOrd">
-      <pc:chgData name="Alejandro Carrión" userId="757439b461449c9e" providerId="LiveId" clId="{ECF2C08A-1D63-4443-908D-B3C4743D2FCA}" dt="2021-09-04T09:01:10.987" v="5793" actId="20577"/>
+      <pc:chgData name="Alejandro Carrión" userId="757439b461449c9e" providerId="LiveId" clId="{ECF2C08A-1D63-4443-908D-B3C4743D2FCA}" dt="2021-09-04T09:49:21.390" v="6142" actId="6559"/>
       <pc:docMkLst>
         <pc:docMk/>
       </pc:docMkLst>
@@ -2649,8 +2649,8 @@
           </ac:picMkLst>
         </pc:picChg>
       </pc:sldChg>
-      <pc:sldChg chg="modSp add mod ord">
-        <pc:chgData name="Alejandro Carrión" userId="757439b461449c9e" providerId="LiveId" clId="{ECF2C08A-1D63-4443-908D-B3C4743D2FCA}" dt="2021-09-04T09:01:10.987" v="5793" actId="20577"/>
+      <pc:sldChg chg="modSp add del mod ord">
+        <pc:chgData name="Alejandro Carrión" userId="757439b461449c9e" providerId="LiveId" clId="{ECF2C08A-1D63-4443-908D-B3C4743D2FCA}" dt="2021-09-04T09:48:25.456" v="6104" actId="47"/>
         <pc:sldMkLst>
           <pc:docMk/>
           <pc:sldMk cId="2415125095" sldId="322"/>
@@ -2771,6 +2771,612 @@
             <ac:picMk id="5" creationId="{BEB1A286-BACF-4DA3-B599-9FE8E34525E6}"/>
           </ac:picMkLst>
         </pc:picChg>
+      </pc:sldChg>
+      <pc:sldChg chg="addSp delSp modSp add del mod">
+        <pc:chgData name="Alejandro Carrión" userId="757439b461449c9e" providerId="LiveId" clId="{ECF2C08A-1D63-4443-908D-B3C4743D2FCA}" dt="2021-09-04T09:48:09.431" v="6103" actId="47"/>
+        <pc:sldMkLst>
+          <pc:docMk/>
+          <pc:sldMk cId="2532926159" sldId="327"/>
+        </pc:sldMkLst>
+        <pc:spChg chg="del mod">
+          <ac:chgData name="Alejandro Carrión" userId="757439b461449c9e" providerId="LiveId" clId="{ECF2C08A-1D63-4443-908D-B3C4743D2FCA}" dt="2021-09-04T09:38:23.166" v="5796" actId="478"/>
+          <ac:spMkLst>
+            <pc:docMk/>
+            <pc:sldMk cId="2532926159" sldId="327"/>
+            <ac:spMk id="2" creationId="{00E721FB-67D7-4442-B14A-9203B4ACCB73}"/>
+          </ac:spMkLst>
+        </pc:spChg>
+        <pc:spChg chg="add del mod">
+          <ac:chgData name="Alejandro Carrión" userId="757439b461449c9e" providerId="LiveId" clId="{ECF2C08A-1D63-4443-908D-B3C4743D2FCA}" dt="2021-09-04T09:39:24.158" v="5798" actId="478"/>
+          <ac:spMkLst>
+            <pc:docMk/>
+            <pc:sldMk cId="2532926159" sldId="327"/>
+            <ac:spMk id="5" creationId="{7E41CC4B-2E3A-4B29-A2C6-FA87846EB114}"/>
+          </ac:spMkLst>
+        </pc:spChg>
+        <pc:spChg chg="add del mod">
+          <ac:chgData name="Alejandro Carrión" userId="757439b461449c9e" providerId="LiveId" clId="{ECF2C08A-1D63-4443-908D-B3C4743D2FCA}" dt="2021-09-04T09:39:24.158" v="5798" actId="478"/>
+          <ac:spMkLst>
+            <pc:docMk/>
+            <pc:sldMk cId="2532926159" sldId="327"/>
+            <ac:spMk id="7" creationId="{C91ED263-766B-4D6E-AEA3-AB874FBD5056}"/>
+          </ac:spMkLst>
+        </pc:spChg>
+        <pc:spChg chg="add del mod">
+          <ac:chgData name="Alejandro Carrión" userId="757439b461449c9e" providerId="LiveId" clId="{ECF2C08A-1D63-4443-908D-B3C4743D2FCA}" dt="2021-09-04T09:39:24.158" v="5798" actId="478"/>
+          <ac:spMkLst>
+            <pc:docMk/>
+            <pc:sldMk cId="2532926159" sldId="327"/>
+            <ac:spMk id="8" creationId="{E369E080-AF92-476C-83BE-90555AB864BF}"/>
+          </ac:spMkLst>
+        </pc:spChg>
+        <pc:spChg chg="add del mod">
+          <ac:chgData name="Alejandro Carrión" userId="757439b461449c9e" providerId="LiveId" clId="{ECF2C08A-1D63-4443-908D-B3C4743D2FCA}" dt="2021-09-04T09:39:24.158" v="5798" actId="478"/>
+          <ac:spMkLst>
+            <pc:docMk/>
+            <pc:sldMk cId="2532926159" sldId="327"/>
+            <ac:spMk id="9" creationId="{A49E6866-1810-4963-88A6-58D5D4BB7956}"/>
+          </ac:spMkLst>
+        </pc:spChg>
+        <pc:spChg chg="add del mod">
+          <ac:chgData name="Alejandro Carrión" userId="757439b461449c9e" providerId="LiveId" clId="{ECF2C08A-1D63-4443-908D-B3C4743D2FCA}" dt="2021-09-04T09:39:24.158" v="5798" actId="478"/>
+          <ac:spMkLst>
+            <pc:docMk/>
+            <pc:sldMk cId="2532926159" sldId="327"/>
+            <ac:spMk id="10" creationId="{1D601909-EBD6-4318-B0E7-B16F18238074}"/>
+          </ac:spMkLst>
+        </pc:spChg>
+        <pc:spChg chg="add del mod">
+          <ac:chgData name="Alejandro Carrión" userId="757439b461449c9e" providerId="LiveId" clId="{ECF2C08A-1D63-4443-908D-B3C4743D2FCA}" dt="2021-09-04T09:39:25.924" v="5799" actId="478"/>
+          <ac:spMkLst>
+            <pc:docMk/>
+            <pc:sldMk cId="2532926159" sldId="327"/>
+            <ac:spMk id="11" creationId="{0A0DA2E9-C7CE-48EB-BFE9-48E80A5CA6BC}"/>
+          </ac:spMkLst>
+        </pc:spChg>
+        <pc:spChg chg="add mod">
+          <ac:chgData name="Alejandro Carrión" userId="757439b461449c9e" providerId="LiveId" clId="{ECF2C08A-1D63-4443-908D-B3C4743D2FCA}" dt="2021-09-04T09:41:46.585" v="5856" actId="14100"/>
+          <ac:spMkLst>
+            <pc:docMk/>
+            <pc:sldMk cId="2532926159" sldId="327"/>
+            <ac:spMk id="12" creationId="{8CFDED87-45B8-45FC-A4E5-2BD13CE62230}"/>
+          </ac:spMkLst>
+        </pc:spChg>
+        <pc:spChg chg="add del mod">
+          <ac:chgData name="Alejandro Carrión" userId="757439b461449c9e" providerId="LiveId" clId="{ECF2C08A-1D63-4443-908D-B3C4743D2FCA}" dt="2021-09-04T09:40:23.522" v="5821" actId="478"/>
+          <ac:spMkLst>
+            <pc:docMk/>
+            <pc:sldMk cId="2532926159" sldId="327"/>
+            <ac:spMk id="13" creationId="{0136F817-97C0-47E7-BE57-400828BF3799}"/>
+          </ac:spMkLst>
+        </pc:spChg>
+        <pc:spChg chg="add del mod">
+          <ac:chgData name="Alejandro Carrión" userId="757439b461449c9e" providerId="LiveId" clId="{ECF2C08A-1D63-4443-908D-B3C4743D2FCA}" dt="2021-09-04T09:40:53.528" v="5836" actId="478"/>
+          <ac:spMkLst>
+            <pc:docMk/>
+            <pc:sldMk cId="2532926159" sldId="327"/>
+            <ac:spMk id="14" creationId="{06D2B3AF-9DFC-46E4-9A1F-761C72035750}"/>
+          </ac:spMkLst>
+        </pc:spChg>
+        <pc:spChg chg="add del mod">
+          <ac:chgData name="Alejandro Carrión" userId="757439b461449c9e" providerId="LiveId" clId="{ECF2C08A-1D63-4443-908D-B3C4743D2FCA}" dt="2021-09-04T09:40:54.034" v="5837" actId="478"/>
+          <ac:spMkLst>
+            <pc:docMk/>
+            <pc:sldMk cId="2532926159" sldId="327"/>
+            <ac:spMk id="15" creationId="{8E7D4ABA-97A6-42DF-962C-67B6A475F22E}"/>
+          </ac:spMkLst>
+        </pc:spChg>
+        <pc:spChg chg="add del mod">
+          <ac:chgData name="Alejandro Carrión" userId="757439b461449c9e" providerId="LiveId" clId="{ECF2C08A-1D63-4443-908D-B3C4743D2FCA}" dt="2021-09-04T09:40:54.034" v="5837" actId="478"/>
+          <ac:spMkLst>
+            <pc:docMk/>
+            <pc:sldMk cId="2532926159" sldId="327"/>
+            <ac:spMk id="16" creationId="{98246925-4CB2-4627-9A9B-B72D9D964EAF}"/>
+          </ac:spMkLst>
+        </pc:spChg>
+        <pc:spChg chg="add del mod">
+          <ac:chgData name="Alejandro Carrión" userId="757439b461449c9e" providerId="LiveId" clId="{ECF2C08A-1D63-4443-908D-B3C4743D2FCA}" dt="2021-09-04T09:40:54.034" v="5837" actId="478"/>
+          <ac:spMkLst>
+            <pc:docMk/>
+            <pc:sldMk cId="2532926159" sldId="327"/>
+            <ac:spMk id="17" creationId="{6F383EE9-7788-41B6-9B9C-035638AEBA9D}"/>
+          </ac:spMkLst>
+        </pc:spChg>
+        <pc:spChg chg="add mod">
+          <ac:chgData name="Alejandro Carrión" userId="757439b461449c9e" providerId="LiveId" clId="{ECF2C08A-1D63-4443-908D-B3C4743D2FCA}" dt="2021-09-04T09:38:28.267" v="5797"/>
+          <ac:spMkLst>
+            <pc:docMk/>
+            <pc:sldMk cId="2532926159" sldId="327"/>
+            <ac:spMk id="19" creationId="{D7C615E7-2584-4803-BB3A-C03B599BD934}"/>
+          </ac:spMkLst>
+        </pc:spChg>
+        <pc:spChg chg="add mod">
+          <ac:chgData name="Alejandro Carrión" userId="757439b461449c9e" providerId="LiveId" clId="{ECF2C08A-1D63-4443-908D-B3C4743D2FCA}" dt="2021-09-04T09:38:28.267" v="5797"/>
+          <ac:spMkLst>
+            <pc:docMk/>
+            <pc:sldMk cId="2532926159" sldId="327"/>
+            <ac:spMk id="21" creationId="{04D672C4-DEC4-481A-9124-340155F75CF4}"/>
+          </ac:spMkLst>
+        </pc:spChg>
+        <pc:spChg chg="add mod">
+          <ac:chgData name="Alejandro Carrión" userId="757439b461449c9e" providerId="LiveId" clId="{ECF2C08A-1D63-4443-908D-B3C4743D2FCA}" dt="2021-09-04T09:38:28.267" v="5797"/>
+          <ac:spMkLst>
+            <pc:docMk/>
+            <pc:sldMk cId="2532926159" sldId="327"/>
+            <ac:spMk id="23" creationId="{13D80241-D689-4636-89D9-A361CC437869}"/>
+          </ac:spMkLst>
+        </pc:spChg>
+        <pc:spChg chg="add del mod">
+          <ac:chgData name="Alejandro Carrión" userId="757439b461449c9e" providerId="LiveId" clId="{ECF2C08A-1D63-4443-908D-B3C4743D2FCA}" dt="2021-09-04T09:39:24.158" v="5798" actId="478"/>
+          <ac:spMkLst>
+            <pc:docMk/>
+            <pc:sldMk cId="2532926159" sldId="327"/>
+            <ac:spMk id="25" creationId="{AB293072-B745-4A3D-841C-3ABA40E585FB}"/>
+          </ac:spMkLst>
+        </pc:spChg>
+        <pc:spChg chg="add del mod">
+          <ac:chgData name="Alejandro Carrión" userId="757439b461449c9e" providerId="LiveId" clId="{ECF2C08A-1D63-4443-908D-B3C4743D2FCA}" dt="2021-09-04T09:39:24.158" v="5798" actId="478"/>
+          <ac:spMkLst>
+            <pc:docMk/>
+            <pc:sldMk cId="2532926159" sldId="327"/>
+            <ac:spMk id="27" creationId="{1FBE296F-EBA9-40FC-8FEB-D0A6672048C9}"/>
+          </ac:spMkLst>
+        </pc:spChg>
+        <pc:spChg chg="add del mod">
+          <ac:chgData name="Alejandro Carrión" userId="757439b461449c9e" providerId="LiveId" clId="{ECF2C08A-1D63-4443-908D-B3C4743D2FCA}" dt="2021-09-04T09:39:24.158" v="5798" actId="478"/>
+          <ac:spMkLst>
+            <pc:docMk/>
+            <pc:sldMk cId="2532926159" sldId="327"/>
+            <ac:spMk id="29" creationId="{071DE5BA-E116-47BD-B76C-1D5369A148C5}"/>
+          </ac:spMkLst>
+        </pc:spChg>
+        <pc:spChg chg="add mod">
+          <ac:chgData name="Alejandro Carrión" userId="757439b461449c9e" providerId="LiveId" clId="{ECF2C08A-1D63-4443-908D-B3C4743D2FCA}" dt="2021-09-04T09:38:28.267" v="5797"/>
+          <ac:spMkLst>
+            <pc:docMk/>
+            <pc:sldMk cId="2532926159" sldId="327"/>
+            <ac:spMk id="31" creationId="{D75C1EA0-423E-425A-BC8E-B07FD8C19E7D}"/>
+          </ac:spMkLst>
+        </pc:spChg>
+        <pc:spChg chg="add mod">
+          <ac:chgData name="Alejandro Carrión" userId="757439b461449c9e" providerId="LiveId" clId="{ECF2C08A-1D63-4443-908D-B3C4743D2FCA}" dt="2021-09-04T09:38:28.267" v="5797"/>
+          <ac:spMkLst>
+            <pc:docMk/>
+            <pc:sldMk cId="2532926159" sldId="327"/>
+            <ac:spMk id="33" creationId="{CCE07770-7643-4C77-96E1-200FE361A00A}"/>
+          </ac:spMkLst>
+        </pc:spChg>
+        <pc:spChg chg="add mod">
+          <ac:chgData name="Alejandro Carrión" userId="757439b461449c9e" providerId="LiveId" clId="{ECF2C08A-1D63-4443-908D-B3C4743D2FCA}" dt="2021-09-04T09:38:28.267" v="5797"/>
+          <ac:spMkLst>
+            <pc:docMk/>
+            <pc:sldMk cId="2532926159" sldId="327"/>
+            <ac:spMk id="35" creationId="{4F3B4FA6-1366-41A0-9B24-636373A82789}"/>
+          </ac:spMkLst>
+        </pc:spChg>
+        <pc:spChg chg="add del mod">
+          <ac:chgData name="Alejandro Carrión" userId="757439b461449c9e" providerId="LiveId" clId="{ECF2C08A-1D63-4443-908D-B3C4743D2FCA}" dt="2021-09-04T09:39:24.158" v="5798" actId="478"/>
+          <ac:spMkLst>
+            <pc:docMk/>
+            <pc:sldMk cId="2532926159" sldId="327"/>
+            <ac:spMk id="37" creationId="{F7F48D1C-5E19-43D9-A47A-F7A6AF0B8805}"/>
+          </ac:spMkLst>
+        </pc:spChg>
+        <pc:spChg chg="add del mod">
+          <ac:chgData name="Alejandro Carrión" userId="757439b461449c9e" providerId="LiveId" clId="{ECF2C08A-1D63-4443-908D-B3C4743D2FCA}" dt="2021-09-04T09:39:24.158" v="5798" actId="478"/>
+          <ac:spMkLst>
+            <pc:docMk/>
+            <pc:sldMk cId="2532926159" sldId="327"/>
+            <ac:spMk id="39" creationId="{A374CB5F-B9A4-4136-ACA8-B4AF215A0DB8}"/>
+          </ac:spMkLst>
+        </pc:spChg>
+        <pc:spChg chg="add del mod">
+          <ac:chgData name="Alejandro Carrión" userId="757439b461449c9e" providerId="LiveId" clId="{ECF2C08A-1D63-4443-908D-B3C4743D2FCA}" dt="2021-09-04T09:39:24.158" v="5798" actId="478"/>
+          <ac:spMkLst>
+            <pc:docMk/>
+            <pc:sldMk cId="2532926159" sldId="327"/>
+            <ac:spMk id="41" creationId="{CD915744-0B34-4CFA-A6F4-3D376D82CCC7}"/>
+          </ac:spMkLst>
+        </pc:spChg>
+        <pc:spChg chg="add del mod">
+          <ac:chgData name="Alejandro Carrión" userId="757439b461449c9e" providerId="LiveId" clId="{ECF2C08A-1D63-4443-908D-B3C4743D2FCA}" dt="2021-09-04T09:41:46.585" v="5856" actId="14100"/>
+          <ac:spMkLst>
+            <pc:docMk/>
+            <pc:sldMk cId="2532926159" sldId="327"/>
+            <ac:spMk id="42" creationId="{DBEC68AC-D140-4811-868C-4FE6DA0843EB}"/>
+          </ac:spMkLst>
+        </pc:spChg>
+        <pc:spChg chg="add mod">
+          <ac:chgData name="Alejandro Carrión" userId="757439b461449c9e" providerId="LiveId" clId="{ECF2C08A-1D63-4443-908D-B3C4743D2FCA}" dt="2021-09-04T09:41:46.585" v="5856" actId="14100"/>
+          <ac:spMkLst>
+            <pc:docMk/>
+            <pc:sldMk cId="2532926159" sldId="327"/>
+            <ac:spMk id="43" creationId="{5C7A3052-3E88-450C-86E8-1A80D381E97E}"/>
+          </ac:spMkLst>
+        </pc:spChg>
+        <pc:spChg chg="add mod">
+          <ac:chgData name="Alejandro Carrión" userId="757439b461449c9e" providerId="LiveId" clId="{ECF2C08A-1D63-4443-908D-B3C4743D2FCA}" dt="2021-09-04T09:41:46.585" v="5856" actId="14100"/>
+          <ac:spMkLst>
+            <pc:docMk/>
+            <pc:sldMk cId="2532926159" sldId="327"/>
+            <ac:spMk id="44" creationId="{30312589-568A-460D-AA81-D78C174E7293}"/>
+          </ac:spMkLst>
+        </pc:spChg>
+        <pc:spChg chg="add mod">
+          <ac:chgData name="Alejandro Carrión" userId="757439b461449c9e" providerId="LiveId" clId="{ECF2C08A-1D63-4443-908D-B3C4743D2FCA}" dt="2021-09-04T09:41:46.585" v="5856" actId="14100"/>
+          <ac:spMkLst>
+            <pc:docMk/>
+            <pc:sldMk cId="2532926159" sldId="327"/>
+            <ac:spMk id="45" creationId="{DBD1F82C-53EA-42C3-B1D7-CDD6B7806EA7}"/>
+          </ac:spMkLst>
+        </pc:spChg>
+        <pc:spChg chg="add mod">
+          <ac:chgData name="Alejandro Carrión" userId="757439b461449c9e" providerId="LiveId" clId="{ECF2C08A-1D63-4443-908D-B3C4743D2FCA}" dt="2021-09-04T09:41:46.585" v="5856" actId="14100"/>
+          <ac:spMkLst>
+            <pc:docMk/>
+            <pc:sldMk cId="2532926159" sldId="327"/>
+            <ac:spMk id="46" creationId="{2629B164-F50E-4DD9-BDDF-E56C8B751D84}"/>
+          </ac:spMkLst>
+        </pc:spChg>
+        <pc:spChg chg="add del mod">
+          <ac:chgData name="Alejandro Carrión" userId="757439b461449c9e" providerId="LiveId" clId="{ECF2C08A-1D63-4443-908D-B3C4743D2FCA}" dt="2021-09-04T09:44:00.789" v="5882"/>
+          <ac:spMkLst>
+            <pc:docMk/>
+            <pc:sldMk cId="2532926159" sldId="327"/>
+            <ac:spMk id="47" creationId="{125F68E5-1766-41CC-9F77-3F8BEE45A399}"/>
+          </ac:spMkLst>
+        </pc:spChg>
+        <pc:cxnChg chg="add mod">
+          <ac:chgData name="Alejandro Carrión" userId="757439b461449c9e" providerId="LiveId" clId="{ECF2C08A-1D63-4443-908D-B3C4743D2FCA}" dt="2021-09-04T09:38:28.267" v="5797"/>
+          <ac:cxnSpMkLst>
+            <pc:docMk/>
+            <pc:sldMk cId="2532926159" sldId="327"/>
+            <ac:cxnSpMk id="18" creationId="{0ACDEAFF-98B5-427A-9F48-A7A34C5E557E}"/>
+          </ac:cxnSpMkLst>
+        </pc:cxnChg>
+        <pc:cxnChg chg="add mod">
+          <ac:chgData name="Alejandro Carrión" userId="757439b461449c9e" providerId="LiveId" clId="{ECF2C08A-1D63-4443-908D-B3C4743D2FCA}" dt="2021-09-04T09:38:28.267" v="5797"/>
+          <ac:cxnSpMkLst>
+            <pc:docMk/>
+            <pc:sldMk cId="2532926159" sldId="327"/>
+            <ac:cxnSpMk id="20" creationId="{7A61DE52-F6DB-4EA9-9782-9328958A1AC6}"/>
+          </ac:cxnSpMkLst>
+        </pc:cxnChg>
+        <pc:cxnChg chg="add mod">
+          <ac:chgData name="Alejandro Carrión" userId="757439b461449c9e" providerId="LiveId" clId="{ECF2C08A-1D63-4443-908D-B3C4743D2FCA}" dt="2021-09-04T09:38:28.267" v="5797"/>
+          <ac:cxnSpMkLst>
+            <pc:docMk/>
+            <pc:sldMk cId="2532926159" sldId="327"/>
+            <ac:cxnSpMk id="22" creationId="{C6CEC6F6-4587-4594-B731-9703163624D7}"/>
+          </ac:cxnSpMkLst>
+        </pc:cxnChg>
+        <pc:cxnChg chg="add del mod">
+          <ac:chgData name="Alejandro Carrión" userId="757439b461449c9e" providerId="LiveId" clId="{ECF2C08A-1D63-4443-908D-B3C4743D2FCA}" dt="2021-09-04T09:39:24.158" v="5798" actId="478"/>
+          <ac:cxnSpMkLst>
+            <pc:docMk/>
+            <pc:sldMk cId="2532926159" sldId="327"/>
+            <ac:cxnSpMk id="24" creationId="{A12EBE8B-672F-4A37-A179-FB1C12872B07}"/>
+          </ac:cxnSpMkLst>
+        </pc:cxnChg>
+        <pc:cxnChg chg="add del mod">
+          <ac:chgData name="Alejandro Carrión" userId="757439b461449c9e" providerId="LiveId" clId="{ECF2C08A-1D63-4443-908D-B3C4743D2FCA}" dt="2021-09-04T09:39:24.158" v="5798" actId="478"/>
+          <ac:cxnSpMkLst>
+            <pc:docMk/>
+            <pc:sldMk cId="2532926159" sldId="327"/>
+            <ac:cxnSpMk id="26" creationId="{AB4AE2C5-2A24-467D-A4E9-426FD8302783}"/>
+          </ac:cxnSpMkLst>
+        </pc:cxnChg>
+        <pc:cxnChg chg="add del mod">
+          <ac:chgData name="Alejandro Carrión" userId="757439b461449c9e" providerId="LiveId" clId="{ECF2C08A-1D63-4443-908D-B3C4743D2FCA}" dt="2021-09-04T09:39:24.158" v="5798" actId="478"/>
+          <ac:cxnSpMkLst>
+            <pc:docMk/>
+            <pc:sldMk cId="2532926159" sldId="327"/>
+            <ac:cxnSpMk id="28" creationId="{C6ACF750-F9EE-4AEF-A205-0C73E10B8D00}"/>
+          </ac:cxnSpMkLst>
+        </pc:cxnChg>
+        <pc:cxnChg chg="add mod">
+          <ac:chgData name="Alejandro Carrión" userId="757439b461449c9e" providerId="LiveId" clId="{ECF2C08A-1D63-4443-908D-B3C4743D2FCA}" dt="2021-09-04T09:38:28.267" v="5797"/>
+          <ac:cxnSpMkLst>
+            <pc:docMk/>
+            <pc:sldMk cId="2532926159" sldId="327"/>
+            <ac:cxnSpMk id="30" creationId="{2EC73D98-E435-40B7-B4EB-C5D5E9DE64D0}"/>
+          </ac:cxnSpMkLst>
+        </pc:cxnChg>
+        <pc:cxnChg chg="add mod">
+          <ac:chgData name="Alejandro Carrión" userId="757439b461449c9e" providerId="LiveId" clId="{ECF2C08A-1D63-4443-908D-B3C4743D2FCA}" dt="2021-09-04T09:38:28.267" v="5797"/>
+          <ac:cxnSpMkLst>
+            <pc:docMk/>
+            <pc:sldMk cId="2532926159" sldId="327"/>
+            <ac:cxnSpMk id="32" creationId="{3A37662F-3B3D-41FC-81AD-93B111C1F545}"/>
+          </ac:cxnSpMkLst>
+        </pc:cxnChg>
+        <pc:cxnChg chg="add mod">
+          <ac:chgData name="Alejandro Carrión" userId="757439b461449c9e" providerId="LiveId" clId="{ECF2C08A-1D63-4443-908D-B3C4743D2FCA}" dt="2021-09-04T09:38:28.267" v="5797"/>
+          <ac:cxnSpMkLst>
+            <pc:docMk/>
+            <pc:sldMk cId="2532926159" sldId="327"/>
+            <ac:cxnSpMk id="34" creationId="{2952BCBC-4AB6-42D5-BCF6-329CC93CF14A}"/>
+          </ac:cxnSpMkLst>
+        </pc:cxnChg>
+        <pc:cxnChg chg="add del mod">
+          <ac:chgData name="Alejandro Carrión" userId="757439b461449c9e" providerId="LiveId" clId="{ECF2C08A-1D63-4443-908D-B3C4743D2FCA}" dt="2021-09-04T09:39:24.158" v="5798" actId="478"/>
+          <ac:cxnSpMkLst>
+            <pc:docMk/>
+            <pc:sldMk cId="2532926159" sldId="327"/>
+            <ac:cxnSpMk id="36" creationId="{BF1DF799-829C-45A2-97A0-FE1FC9DADD98}"/>
+          </ac:cxnSpMkLst>
+        </pc:cxnChg>
+        <pc:cxnChg chg="add del mod">
+          <ac:chgData name="Alejandro Carrión" userId="757439b461449c9e" providerId="LiveId" clId="{ECF2C08A-1D63-4443-908D-B3C4743D2FCA}" dt="2021-09-04T09:39:24.158" v="5798" actId="478"/>
+          <ac:cxnSpMkLst>
+            <pc:docMk/>
+            <pc:sldMk cId="2532926159" sldId="327"/>
+            <ac:cxnSpMk id="38" creationId="{A63360B9-B87A-4F4C-B242-6F10C8AF0FE9}"/>
+          </ac:cxnSpMkLst>
+        </pc:cxnChg>
+        <pc:cxnChg chg="add del mod">
+          <ac:chgData name="Alejandro Carrión" userId="757439b461449c9e" providerId="LiveId" clId="{ECF2C08A-1D63-4443-908D-B3C4743D2FCA}" dt="2021-09-04T09:39:24.158" v="5798" actId="478"/>
+          <ac:cxnSpMkLst>
+            <pc:docMk/>
+            <pc:sldMk cId="2532926159" sldId="327"/>
+            <ac:cxnSpMk id="40" creationId="{EC6B3B7A-860B-46C0-B63A-1C4B0165CD60}"/>
+          </ac:cxnSpMkLst>
+        </pc:cxnChg>
+      </pc:sldChg>
+      <pc:sldChg chg="addSp delSp modSp add mod">
+        <pc:chgData name="Alejandro Carrión" userId="757439b461449c9e" providerId="LiveId" clId="{ECF2C08A-1D63-4443-908D-B3C4743D2FCA}" dt="2021-09-04T09:49:21.390" v="6142" actId="6559"/>
+        <pc:sldMkLst>
+          <pc:docMk/>
+          <pc:sldMk cId="1191438269" sldId="328"/>
+        </pc:sldMkLst>
+        <pc:spChg chg="mod">
+          <ac:chgData name="Alejandro Carrión" userId="757439b461449c9e" providerId="LiveId" clId="{ECF2C08A-1D63-4443-908D-B3C4743D2FCA}" dt="2021-09-04T09:48:03.634" v="6102" actId="1076"/>
+          <ac:spMkLst>
+            <pc:docMk/>
+            <pc:sldMk cId="1191438269" sldId="328"/>
+            <ac:spMk id="12" creationId="{8CFDED87-45B8-45FC-A4E5-2BD13CE62230}"/>
+          </ac:spMkLst>
+        </pc:spChg>
+        <pc:spChg chg="del">
+          <ac:chgData name="Alejandro Carrión" userId="757439b461449c9e" providerId="LiveId" clId="{ECF2C08A-1D63-4443-908D-B3C4743D2FCA}" dt="2021-09-04T09:41:58.804" v="5859" actId="478"/>
+          <ac:spMkLst>
+            <pc:docMk/>
+            <pc:sldMk cId="1191438269" sldId="328"/>
+            <ac:spMk id="19" creationId="{D7C615E7-2584-4803-BB3A-C03B599BD934}"/>
+          </ac:spMkLst>
+        </pc:spChg>
+        <pc:spChg chg="del">
+          <ac:chgData name="Alejandro Carrión" userId="757439b461449c9e" providerId="LiveId" clId="{ECF2C08A-1D63-4443-908D-B3C4743D2FCA}" dt="2021-09-04T09:41:58.804" v="5859" actId="478"/>
+          <ac:spMkLst>
+            <pc:docMk/>
+            <pc:sldMk cId="1191438269" sldId="328"/>
+            <ac:spMk id="21" creationId="{04D672C4-DEC4-481A-9124-340155F75CF4}"/>
+          </ac:spMkLst>
+        </pc:spChg>
+        <pc:spChg chg="del">
+          <ac:chgData name="Alejandro Carrión" userId="757439b461449c9e" providerId="LiveId" clId="{ECF2C08A-1D63-4443-908D-B3C4743D2FCA}" dt="2021-09-04T09:41:58.804" v="5859" actId="478"/>
+          <ac:spMkLst>
+            <pc:docMk/>
+            <pc:sldMk cId="1191438269" sldId="328"/>
+            <ac:spMk id="23" creationId="{13D80241-D689-4636-89D9-A361CC437869}"/>
+          </ac:spMkLst>
+        </pc:spChg>
+        <pc:spChg chg="add mod">
+          <ac:chgData name="Alejandro Carrión" userId="757439b461449c9e" providerId="LiveId" clId="{ECF2C08A-1D63-4443-908D-B3C4743D2FCA}" dt="2021-09-04T09:48:03.634" v="6102" actId="1076"/>
+          <ac:spMkLst>
+            <pc:docMk/>
+            <pc:sldMk cId="1191438269" sldId="328"/>
+            <ac:spMk id="25" creationId="{17B83928-1B30-4DB8-A4C9-8EE65C74D6A2}"/>
+          </ac:spMkLst>
+        </pc:spChg>
+        <pc:spChg chg="add mod">
+          <ac:chgData name="Alejandro Carrión" userId="757439b461449c9e" providerId="LiveId" clId="{ECF2C08A-1D63-4443-908D-B3C4743D2FCA}" dt="2021-09-04T09:48:03.634" v="6102" actId="1076"/>
+          <ac:spMkLst>
+            <pc:docMk/>
+            <pc:sldMk cId="1191438269" sldId="328"/>
+            <ac:spMk id="27" creationId="{C47D9E60-9409-417E-9089-5A1FC3F64711}"/>
+          </ac:spMkLst>
+        </pc:spChg>
+        <pc:spChg chg="add mod">
+          <ac:chgData name="Alejandro Carrión" userId="757439b461449c9e" providerId="LiveId" clId="{ECF2C08A-1D63-4443-908D-B3C4743D2FCA}" dt="2021-09-04T09:48:03.634" v="6102" actId="1076"/>
+          <ac:spMkLst>
+            <pc:docMk/>
+            <pc:sldMk cId="1191438269" sldId="328"/>
+            <ac:spMk id="29" creationId="{7CF6E3DF-5B76-4DB3-ADD7-ABEC236C7F81}"/>
+          </ac:spMkLst>
+        </pc:spChg>
+        <pc:spChg chg="del">
+          <ac:chgData name="Alejandro Carrión" userId="757439b461449c9e" providerId="LiveId" clId="{ECF2C08A-1D63-4443-908D-B3C4743D2FCA}" dt="2021-09-04T09:41:57.002" v="5858" actId="478"/>
+          <ac:spMkLst>
+            <pc:docMk/>
+            <pc:sldMk cId="1191438269" sldId="328"/>
+            <ac:spMk id="31" creationId="{D75C1EA0-423E-425A-BC8E-B07FD8C19E7D}"/>
+          </ac:spMkLst>
+        </pc:spChg>
+        <pc:spChg chg="del">
+          <ac:chgData name="Alejandro Carrión" userId="757439b461449c9e" providerId="LiveId" clId="{ECF2C08A-1D63-4443-908D-B3C4743D2FCA}" dt="2021-09-04T09:41:57.002" v="5858" actId="478"/>
+          <ac:spMkLst>
+            <pc:docMk/>
+            <pc:sldMk cId="1191438269" sldId="328"/>
+            <ac:spMk id="33" creationId="{CCE07770-7643-4C77-96E1-200FE361A00A}"/>
+          </ac:spMkLst>
+        </pc:spChg>
+        <pc:spChg chg="del">
+          <ac:chgData name="Alejandro Carrión" userId="757439b461449c9e" providerId="LiveId" clId="{ECF2C08A-1D63-4443-908D-B3C4743D2FCA}" dt="2021-09-04T09:41:57.002" v="5858" actId="478"/>
+          <ac:spMkLst>
+            <pc:docMk/>
+            <pc:sldMk cId="1191438269" sldId="328"/>
+            <ac:spMk id="35" creationId="{4F3B4FA6-1366-41A0-9B24-636373A82789}"/>
+          </ac:spMkLst>
+        </pc:spChg>
+        <pc:spChg chg="add mod">
+          <ac:chgData name="Alejandro Carrión" userId="757439b461449c9e" providerId="LiveId" clId="{ECF2C08A-1D63-4443-908D-B3C4743D2FCA}" dt="2021-09-04T09:48:03.634" v="6102" actId="1076"/>
+          <ac:spMkLst>
+            <pc:docMk/>
+            <pc:sldMk cId="1191438269" sldId="328"/>
+            <ac:spMk id="37" creationId="{2BD3DD83-01DE-480C-9410-0B76BBE252DC}"/>
+          </ac:spMkLst>
+        </pc:spChg>
+        <pc:spChg chg="add mod">
+          <ac:chgData name="Alejandro Carrión" userId="757439b461449c9e" providerId="LiveId" clId="{ECF2C08A-1D63-4443-908D-B3C4743D2FCA}" dt="2021-09-04T09:48:03.634" v="6102" actId="1076"/>
+          <ac:spMkLst>
+            <pc:docMk/>
+            <pc:sldMk cId="1191438269" sldId="328"/>
+            <ac:spMk id="39" creationId="{0331AC53-1D73-45F0-B490-8A1E20E46D5E}"/>
+          </ac:spMkLst>
+        </pc:spChg>
+        <pc:spChg chg="add mod">
+          <ac:chgData name="Alejandro Carrión" userId="757439b461449c9e" providerId="LiveId" clId="{ECF2C08A-1D63-4443-908D-B3C4743D2FCA}" dt="2021-09-04T09:48:03.634" v="6102" actId="1076"/>
+          <ac:spMkLst>
+            <pc:docMk/>
+            <pc:sldMk cId="1191438269" sldId="328"/>
+            <ac:spMk id="41" creationId="{2D3C34DE-C8F6-4B76-B4E7-3F71D06DDEEF}"/>
+          </ac:spMkLst>
+        </pc:spChg>
+        <pc:spChg chg="mod">
+          <ac:chgData name="Alejandro Carrión" userId="757439b461449c9e" providerId="LiveId" clId="{ECF2C08A-1D63-4443-908D-B3C4743D2FCA}" dt="2021-09-04T09:48:03.634" v="6102" actId="1076"/>
+          <ac:spMkLst>
+            <pc:docMk/>
+            <pc:sldMk cId="1191438269" sldId="328"/>
+            <ac:spMk id="42" creationId="{DBEC68AC-D140-4811-868C-4FE6DA0843EB}"/>
+          </ac:spMkLst>
+        </pc:spChg>
+        <pc:spChg chg="mod">
+          <ac:chgData name="Alejandro Carrión" userId="757439b461449c9e" providerId="LiveId" clId="{ECF2C08A-1D63-4443-908D-B3C4743D2FCA}" dt="2021-09-04T09:48:03.634" v="6102" actId="1076"/>
+          <ac:spMkLst>
+            <pc:docMk/>
+            <pc:sldMk cId="1191438269" sldId="328"/>
+            <ac:spMk id="43" creationId="{5C7A3052-3E88-450C-86E8-1A80D381E97E}"/>
+          </ac:spMkLst>
+        </pc:spChg>
+        <pc:spChg chg="mod">
+          <ac:chgData name="Alejandro Carrión" userId="757439b461449c9e" providerId="LiveId" clId="{ECF2C08A-1D63-4443-908D-B3C4743D2FCA}" dt="2021-09-04T09:48:03.634" v="6102" actId="1076"/>
+          <ac:spMkLst>
+            <pc:docMk/>
+            <pc:sldMk cId="1191438269" sldId="328"/>
+            <ac:spMk id="44" creationId="{30312589-568A-460D-AA81-D78C174E7293}"/>
+          </ac:spMkLst>
+        </pc:spChg>
+        <pc:spChg chg="mod">
+          <ac:chgData name="Alejandro Carrión" userId="757439b461449c9e" providerId="LiveId" clId="{ECF2C08A-1D63-4443-908D-B3C4743D2FCA}" dt="2021-09-04T09:48:03.634" v="6102" actId="1076"/>
+          <ac:spMkLst>
+            <pc:docMk/>
+            <pc:sldMk cId="1191438269" sldId="328"/>
+            <ac:spMk id="45" creationId="{DBD1F82C-53EA-42C3-B1D7-CDD6B7806EA7}"/>
+          </ac:spMkLst>
+        </pc:spChg>
+        <pc:spChg chg="mod">
+          <ac:chgData name="Alejandro Carrión" userId="757439b461449c9e" providerId="LiveId" clId="{ECF2C08A-1D63-4443-908D-B3C4743D2FCA}" dt="2021-09-04T09:48:03.634" v="6102" actId="1076"/>
+          <ac:spMkLst>
+            <pc:docMk/>
+            <pc:sldMk cId="1191438269" sldId="328"/>
+            <ac:spMk id="46" creationId="{2629B164-F50E-4DD9-BDDF-E56C8B751D84}"/>
+          </ac:spMkLst>
+        </pc:spChg>
+        <pc:spChg chg="add mod">
+          <ac:chgData name="Alejandro Carrión" userId="757439b461449c9e" providerId="LiveId" clId="{ECF2C08A-1D63-4443-908D-B3C4743D2FCA}" dt="2021-09-04T09:49:21.390" v="6142" actId="6559"/>
+          <ac:spMkLst>
+            <pc:docMk/>
+            <pc:sldMk cId="1191438269" sldId="328"/>
+            <ac:spMk id="47" creationId="{6AA69242-A17D-4BFA-8CDF-FC87F6D77628}"/>
+          </ac:spMkLst>
+        </pc:spChg>
+        <pc:cxnChg chg="del">
+          <ac:chgData name="Alejandro Carrión" userId="757439b461449c9e" providerId="LiveId" clId="{ECF2C08A-1D63-4443-908D-B3C4743D2FCA}" dt="2021-09-04T09:41:58.804" v="5859" actId="478"/>
+          <ac:cxnSpMkLst>
+            <pc:docMk/>
+            <pc:sldMk cId="1191438269" sldId="328"/>
+            <ac:cxnSpMk id="18" creationId="{0ACDEAFF-98B5-427A-9F48-A7A34C5E557E}"/>
+          </ac:cxnSpMkLst>
+        </pc:cxnChg>
+        <pc:cxnChg chg="del">
+          <ac:chgData name="Alejandro Carrión" userId="757439b461449c9e" providerId="LiveId" clId="{ECF2C08A-1D63-4443-908D-B3C4743D2FCA}" dt="2021-09-04T09:41:58.804" v="5859" actId="478"/>
+          <ac:cxnSpMkLst>
+            <pc:docMk/>
+            <pc:sldMk cId="1191438269" sldId="328"/>
+            <ac:cxnSpMk id="20" creationId="{7A61DE52-F6DB-4EA9-9782-9328958A1AC6}"/>
+          </ac:cxnSpMkLst>
+        </pc:cxnChg>
+        <pc:cxnChg chg="del">
+          <ac:chgData name="Alejandro Carrión" userId="757439b461449c9e" providerId="LiveId" clId="{ECF2C08A-1D63-4443-908D-B3C4743D2FCA}" dt="2021-09-04T09:41:58.804" v="5859" actId="478"/>
+          <ac:cxnSpMkLst>
+            <pc:docMk/>
+            <pc:sldMk cId="1191438269" sldId="328"/>
+            <ac:cxnSpMk id="22" creationId="{C6CEC6F6-4587-4594-B731-9703163624D7}"/>
+          </ac:cxnSpMkLst>
+        </pc:cxnChg>
+        <pc:cxnChg chg="add mod ord">
+          <ac:chgData name="Alejandro Carrión" userId="757439b461449c9e" providerId="LiveId" clId="{ECF2C08A-1D63-4443-908D-B3C4743D2FCA}" dt="2021-09-04T09:48:03.634" v="6102" actId="1076"/>
+          <ac:cxnSpMkLst>
+            <pc:docMk/>
+            <pc:sldMk cId="1191438269" sldId="328"/>
+            <ac:cxnSpMk id="24" creationId="{95324B09-1BAC-4FB5-8218-1EE71BE70C94}"/>
+          </ac:cxnSpMkLst>
+        </pc:cxnChg>
+        <pc:cxnChg chg="add mod ord">
+          <ac:chgData name="Alejandro Carrión" userId="757439b461449c9e" providerId="LiveId" clId="{ECF2C08A-1D63-4443-908D-B3C4743D2FCA}" dt="2021-09-04T09:48:03.634" v="6102" actId="1076"/>
+          <ac:cxnSpMkLst>
+            <pc:docMk/>
+            <pc:sldMk cId="1191438269" sldId="328"/>
+            <ac:cxnSpMk id="26" creationId="{D570CEB9-ACA9-442B-8F6B-B7B47FEE6895}"/>
+          </ac:cxnSpMkLst>
+        </pc:cxnChg>
+        <pc:cxnChg chg="add mod ord">
+          <ac:chgData name="Alejandro Carrión" userId="757439b461449c9e" providerId="LiveId" clId="{ECF2C08A-1D63-4443-908D-B3C4743D2FCA}" dt="2021-09-04T09:48:03.634" v="6102" actId="1076"/>
+          <ac:cxnSpMkLst>
+            <pc:docMk/>
+            <pc:sldMk cId="1191438269" sldId="328"/>
+            <ac:cxnSpMk id="28" creationId="{237A1039-66FD-4796-B867-7EC50758B9B9}"/>
+          </ac:cxnSpMkLst>
+        </pc:cxnChg>
+        <pc:cxnChg chg="del">
+          <ac:chgData name="Alejandro Carrión" userId="757439b461449c9e" providerId="LiveId" clId="{ECF2C08A-1D63-4443-908D-B3C4743D2FCA}" dt="2021-09-04T09:42:02.892" v="5862" actId="478"/>
+          <ac:cxnSpMkLst>
+            <pc:docMk/>
+            <pc:sldMk cId="1191438269" sldId="328"/>
+            <ac:cxnSpMk id="30" creationId="{2EC73D98-E435-40B7-B4EB-C5D5E9DE64D0}"/>
+          </ac:cxnSpMkLst>
+        </pc:cxnChg>
+        <pc:cxnChg chg="del">
+          <ac:chgData name="Alejandro Carrión" userId="757439b461449c9e" providerId="LiveId" clId="{ECF2C08A-1D63-4443-908D-B3C4743D2FCA}" dt="2021-09-04T09:42:02.234" v="5861" actId="478"/>
+          <ac:cxnSpMkLst>
+            <pc:docMk/>
+            <pc:sldMk cId="1191438269" sldId="328"/>
+            <ac:cxnSpMk id="32" creationId="{3A37662F-3B3D-41FC-81AD-93B111C1F545}"/>
+          </ac:cxnSpMkLst>
+        </pc:cxnChg>
+        <pc:cxnChg chg="del">
+          <ac:chgData name="Alejandro Carrión" userId="757439b461449c9e" providerId="LiveId" clId="{ECF2C08A-1D63-4443-908D-B3C4743D2FCA}" dt="2021-09-04T09:42:00.770" v="5860" actId="478"/>
+          <ac:cxnSpMkLst>
+            <pc:docMk/>
+            <pc:sldMk cId="1191438269" sldId="328"/>
+            <ac:cxnSpMk id="34" creationId="{2952BCBC-4AB6-42D5-BCF6-329CC93CF14A}"/>
+          </ac:cxnSpMkLst>
+        </pc:cxnChg>
+        <pc:cxnChg chg="add mod ord">
+          <ac:chgData name="Alejandro Carrión" userId="757439b461449c9e" providerId="LiveId" clId="{ECF2C08A-1D63-4443-908D-B3C4743D2FCA}" dt="2021-09-04T09:48:03.634" v="6102" actId="1076"/>
+          <ac:cxnSpMkLst>
+            <pc:docMk/>
+            <pc:sldMk cId="1191438269" sldId="328"/>
+            <ac:cxnSpMk id="36" creationId="{562B8A6D-A9E3-4FFD-86F1-BA55ADF6E8DE}"/>
+          </ac:cxnSpMkLst>
+        </pc:cxnChg>
+        <pc:cxnChg chg="add mod ord">
+          <ac:chgData name="Alejandro Carrión" userId="757439b461449c9e" providerId="LiveId" clId="{ECF2C08A-1D63-4443-908D-B3C4743D2FCA}" dt="2021-09-04T09:48:03.634" v="6102" actId="1076"/>
+          <ac:cxnSpMkLst>
+            <pc:docMk/>
+            <pc:sldMk cId="1191438269" sldId="328"/>
+            <ac:cxnSpMk id="38" creationId="{DA728EA3-D86F-4D2B-ADD5-43D87A18F831}"/>
+          </ac:cxnSpMkLst>
+        </pc:cxnChg>
+        <pc:cxnChg chg="add mod ord">
+          <ac:chgData name="Alejandro Carrión" userId="757439b461449c9e" providerId="LiveId" clId="{ECF2C08A-1D63-4443-908D-B3C4743D2FCA}" dt="2021-09-04T09:48:03.634" v="6102" actId="1076"/>
+          <ac:cxnSpMkLst>
+            <pc:docMk/>
+            <pc:sldMk cId="1191438269" sldId="328"/>
+            <ac:cxnSpMk id="40" creationId="{1EF72E91-FFFC-4463-A7BC-454EB58E8872}"/>
+          </ac:cxnSpMkLst>
+        </pc:cxnChg>
       </pc:sldChg>
       <pc:sldMasterChg chg="delSldLayout">
         <pc:chgData name="Alejandro Carrión" userId="757439b461449c9e" providerId="LiveId" clId="{ECF2C08A-1D63-4443-908D-B3C4743D2FCA}" dt="2021-09-02T19:03:58.817" v="5691" actId="47"/>
@@ -19948,6 +20554,216 @@
           <a:chExt cx="0" cy="0"/>
         </a:xfrm>
       </p:grpSpPr>
+      <p:cxnSp>
+        <p:nvCxnSpPr>
+          <p:cNvPr id="40" name="Google Shape;559;p38">
+            <a:extLst>
+              <a:ext uri="{FF2B5EF4-FFF2-40B4-BE49-F238E27FC236}">
+                <a16:creationId xmlns:a16="http://schemas.microsoft.com/office/drawing/2014/main" id="{1EF72E91-FFFC-4463-A7BC-454EB58E8872}"/>
+              </a:ext>
+            </a:extLst>
+          </p:cNvPr>
+          <p:cNvCxnSpPr/>
+          <p:nvPr/>
+        </p:nvCxnSpPr>
+        <p:spPr>
+          <a:xfrm rot="10800000">
+            <a:off x="7439943" y="3565296"/>
+            <a:ext cx="0" cy="498600"/>
+          </a:xfrm>
+          <a:prstGeom prst="straightConnector1">
+            <a:avLst/>
+          </a:prstGeom>
+          <a:noFill/>
+          <a:ln w="9525" cap="flat" cmpd="sng">
+            <a:solidFill>
+              <a:schemeClr val="tx1">
+                <a:lumMod val="50000"/>
+                <a:lumOff val="50000"/>
+              </a:schemeClr>
+            </a:solidFill>
+            <a:prstDash val="solid"/>
+            <a:round/>
+            <a:headEnd type="oval" w="med" len="med"/>
+            <a:tailEnd type="oval" w="med" len="med"/>
+          </a:ln>
+        </p:spPr>
+      </p:cxnSp>
+      <p:cxnSp>
+        <p:nvCxnSpPr>
+          <p:cNvPr id="38" name="Google Shape;559;p38">
+            <a:extLst>
+              <a:ext uri="{FF2B5EF4-FFF2-40B4-BE49-F238E27FC236}">
+                <a16:creationId xmlns:a16="http://schemas.microsoft.com/office/drawing/2014/main" id="{DA728EA3-D86F-4D2B-ADD5-43D87A18F831}"/>
+              </a:ext>
+            </a:extLst>
+          </p:cNvPr>
+          <p:cNvCxnSpPr/>
+          <p:nvPr/>
+        </p:nvCxnSpPr>
+        <p:spPr>
+          <a:xfrm rot="10800000">
+            <a:off x="5040210" y="3565296"/>
+            <a:ext cx="0" cy="498600"/>
+          </a:xfrm>
+          <a:prstGeom prst="straightConnector1">
+            <a:avLst/>
+          </a:prstGeom>
+          <a:noFill/>
+          <a:ln w="9525" cap="flat" cmpd="sng">
+            <a:solidFill>
+              <a:schemeClr val="tx1">
+                <a:lumMod val="50000"/>
+                <a:lumOff val="50000"/>
+              </a:schemeClr>
+            </a:solidFill>
+            <a:prstDash val="solid"/>
+            <a:round/>
+            <a:headEnd type="oval" w="med" len="med"/>
+            <a:tailEnd type="oval" w="med" len="med"/>
+          </a:ln>
+        </p:spPr>
+      </p:cxnSp>
+      <p:cxnSp>
+        <p:nvCxnSpPr>
+          <p:cNvPr id="28" name="Google Shape;559;p38">
+            <a:extLst>
+              <a:ext uri="{FF2B5EF4-FFF2-40B4-BE49-F238E27FC236}">
+                <a16:creationId xmlns:a16="http://schemas.microsoft.com/office/drawing/2014/main" id="{237A1039-66FD-4796-B867-7EC50758B9B9}"/>
+              </a:ext>
+            </a:extLst>
+          </p:cNvPr>
+          <p:cNvCxnSpPr/>
+          <p:nvPr/>
+        </p:nvCxnSpPr>
+        <p:spPr>
+          <a:xfrm rot="10800000">
+            <a:off x="6276749" y="2498101"/>
+            <a:ext cx="0" cy="498600"/>
+          </a:xfrm>
+          <a:prstGeom prst="straightConnector1">
+            <a:avLst/>
+          </a:prstGeom>
+          <a:noFill/>
+          <a:ln w="9525" cap="flat" cmpd="sng">
+            <a:solidFill>
+              <a:schemeClr val="tx1">
+                <a:lumMod val="50000"/>
+                <a:lumOff val="50000"/>
+              </a:schemeClr>
+            </a:solidFill>
+            <a:prstDash val="solid"/>
+            <a:round/>
+            <a:headEnd type="oval" w="med" len="med"/>
+            <a:tailEnd type="oval" w="med" len="med"/>
+          </a:ln>
+        </p:spPr>
+      </p:cxnSp>
+      <p:cxnSp>
+        <p:nvCxnSpPr>
+          <p:cNvPr id="26" name="Google Shape;559;p38">
+            <a:extLst>
+              <a:ext uri="{FF2B5EF4-FFF2-40B4-BE49-F238E27FC236}">
+                <a16:creationId xmlns:a16="http://schemas.microsoft.com/office/drawing/2014/main" id="{D570CEB9-ACA9-442B-8F6B-B7B47FEE6895}"/>
+              </a:ext>
+            </a:extLst>
+          </p:cNvPr>
+          <p:cNvCxnSpPr/>
+          <p:nvPr/>
+        </p:nvCxnSpPr>
+        <p:spPr>
+          <a:xfrm rot="10800000">
+            <a:off x="3855350" y="2498101"/>
+            <a:ext cx="0" cy="498600"/>
+          </a:xfrm>
+          <a:prstGeom prst="straightConnector1">
+            <a:avLst/>
+          </a:prstGeom>
+          <a:noFill/>
+          <a:ln w="9525" cap="flat" cmpd="sng">
+            <a:solidFill>
+              <a:schemeClr val="tx1">
+                <a:lumMod val="50000"/>
+                <a:lumOff val="50000"/>
+              </a:schemeClr>
+            </a:solidFill>
+            <a:prstDash val="solid"/>
+            <a:round/>
+            <a:headEnd type="oval" w="med" len="med"/>
+            <a:tailEnd type="oval" w="med" len="med"/>
+          </a:ln>
+        </p:spPr>
+      </p:cxnSp>
+      <p:cxnSp>
+        <p:nvCxnSpPr>
+          <p:cNvPr id="36" name="Google Shape;559;p38">
+            <a:extLst>
+              <a:ext uri="{FF2B5EF4-FFF2-40B4-BE49-F238E27FC236}">
+                <a16:creationId xmlns:a16="http://schemas.microsoft.com/office/drawing/2014/main" id="{562B8A6D-A9E3-4FFD-86F1-BA55ADF6E8DE}"/>
+              </a:ext>
+            </a:extLst>
+          </p:cNvPr>
+          <p:cNvCxnSpPr/>
+          <p:nvPr/>
+        </p:nvCxnSpPr>
+        <p:spPr>
+          <a:xfrm rot="10800000">
+            <a:off x="2628190" y="3565296"/>
+            <a:ext cx="0" cy="498600"/>
+          </a:xfrm>
+          <a:prstGeom prst="straightConnector1">
+            <a:avLst/>
+          </a:prstGeom>
+          <a:noFill/>
+          <a:ln w="9525" cap="flat" cmpd="sng">
+            <a:solidFill>
+              <a:schemeClr val="tx1">
+                <a:lumMod val="50000"/>
+                <a:lumOff val="50000"/>
+              </a:schemeClr>
+            </a:solidFill>
+            <a:prstDash val="solid"/>
+            <a:round/>
+            <a:headEnd type="oval" w="med" len="med"/>
+            <a:tailEnd type="oval" w="med" len="med"/>
+          </a:ln>
+        </p:spPr>
+      </p:cxnSp>
+      <p:cxnSp>
+        <p:nvCxnSpPr>
+          <p:cNvPr id="24" name="Google Shape;559;p38">
+            <a:extLst>
+              <a:ext uri="{FF2B5EF4-FFF2-40B4-BE49-F238E27FC236}">
+                <a16:creationId xmlns:a16="http://schemas.microsoft.com/office/drawing/2014/main" id="{95324B09-1BAC-4FB5-8218-1EE71BE70C94}"/>
+              </a:ext>
+            </a:extLst>
+          </p:cNvPr>
+          <p:cNvCxnSpPr/>
+          <p:nvPr/>
+        </p:nvCxnSpPr>
+        <p:spPr>
+          <a:xfrm rot="10800000">
+            <a:off x="1427257" y="2498101"/>
+            <a:ext cx="0" cy="498600"/>
+          </a:xfrm>
+          <a:prstGeom prst="straightConnector1">
+            <a:avLst/>
+          </a:prstGeom>
+          <a:noFill/>
+          <a:ln w="9525" cap="flat" cmpd="sng">
+            <a:solidFill>
+              <a:schemeClr val="tx1">
+                <a:lumMod val="50000"/>
+                <a:lumOff val="50000"/>
+              </a:schemeClr>
+            </a:solidFill>
+            <a:prstDash val="solid"/>
+            <a:round/>
+            <a:headEnd type="oval" w="med" len="med"/>
+            <a:tailEnd type="oval" w="med" len="med"/>
+          </a:ln>
+        </p:spPr>
+      </p:cxnSp>
       <p:sp>
         <p:nvSpPr>
           <p:cNvPr id="4" name="Título 3">
@@ -19987,83 +20803,6 @@
       </p:sp>
       <p:sp>
         <p:nvSpPr>
-          <p:cNvPr id="2" name="Marcador de texto 1">
-            <a:extLst>
-              <a:ext uri="{FF2B5EF4-FFF2-40B4-BE49-F238E27FC236}">
-                <a16:creationId xmlns:a16="http://schemas.microsoft.com/office/drawing/2014/main" id="{00E721FB-67D7-4442-B14A-9203B4ACCB73}"/>
-              </a:ext>
-            </a:extLst>
-          </p:cNvPr>
-          <p:cNvSpPr>
-            <a:spLocks noGrp="1"/>
-          </p:cNvSpPr>
-          <p:nvPr>
-            <p:ph type="body" idx="1"/>
-          </p:nvPr>
-        </p:nvSpPr>
-        <p:spPr>
-          <a:xfrm>
-            <a:off x="779099" y="1503550"/>
-            <a:ext cx="7437053" cy="2884200"/>
-          </a:xfrm>
-        </p:spPr>
-        <p:txBody>
-          <a:bodyPr/>
-          <a:lstStyle/>
-          <a:p>
-            <a:r>
-              <a:rPr lang="es-ES" dirty="0"/>
-              <a:t>Estudio de tecnologías</a:t>
-            </a:r>
-          </a:p>
-          <a:p>
-            <a:r>
-              <a:rPr lang="es-ES" dirty="0"/>
-              <a:t>Programación</a:t>
-            </a:r>
-          </a:p>
-          <a:p>
-            <a:pPr lvl="1">
-              <a:lnSpc>
-                <a:spcPct val="100000"/>
-              </a:lnSpc>
-            </a:pPr>
-            <a:r>
-              <a:rPr lang="es-ES" dirty="0"/>
-              <a:t>Construcción de prototipos</a:t>
-            </a:r>
-          </a:p>
-          <a:p>
-            <a:pPr lvl="1"/>
-            <a:r>
-              <a:rPr lang="es-ES" dirty="0"/>
-              <a:t>Consolidación del microservicio autogenerado</a:t>
-            </a:r>
-          </a:p>
-          <a:p>
-            <a:pPr lvl="1"/>
-            <a:r>
-              <a:rPr lang="es-ES" dirty="0"/>
-              <a:t>Primeros despliegues</a:t>
-            </a:r>
-          </a:p>
-          <a:p>
-            <a:pPr lvl="1"/>
-            <a:r>
-              <a:rPr lang="es-ES" dirty="0"/>
-              <a:t>Producto final</a:t>
-            </a:r>
-          </a:p>
-          <a:p>
-            <a:r>
-              <a:rPr lang="es-ES" dirty="0"/>
-              <a:t>Revisión de la memoria</a:t>
-            </a:r>
-          </a:p>
-        </p:txBody>
-      </p:sp>
-      <p:sp>
-        <p:nvSpPr>
           <p:cNvPr id="6" name="Google Shape;342;p24">
             <a:extLst>
               <a:ext uri="{FF2B5EF4-FFF2-40B4-BE49-F238E27FC236}">
@@ -20106,10 +20845,917 @@
           </a:p>
         </p:txBody>
       </p:sp>
+      <p:sp>
+        <p:nvSpPr>
+          <p:cNvPr id="12" name="Google Shape;552;p38">
+            <a:extLst>
+              <a:ext uri="{FF2B5EF4-FFF2-40B4-BE49-F238E27FC236}">
+                <a16:creationId xmlns:a16="http://schemas.microsoft.com/office/drawing/2014/main" id="{8CFDED87-45B8-45FC-A4E5-2BD13CE62230}"/>
+              </a:ext>
+            </a:extLst>
+          </p:cNvPr>
+          <p:cNvSpPr/>
+          <p:nvPr/>
+        </p:nvSpPr>
+        <p:spPr>
+          <a:xfrm>
+            <a:off x="6929281" y="2821102"/>
+            <a:ext cx="1340659" cy="917762"/>
+          </a:xfrm>
+          <a:prstGeom prst="homePlate">
+            <a:avLst>
+              <a:gd name="adj" fmla="val 32030"/>
+            </a:avLst>
+          </a:prstGeom>
+          <a:solidFill>
+            <a:schemeClr val="accent2">
+              <a:lumMod val="60000"/>
+              <a:lumOff val="40000"/>
+            </a:schemeClr>
+          </a:solidFill>
+          <a:ln>
+            <a:noFill/>
+          </a:ln>
+          <a:effectLst>
+            <a:outerShdw blurRad="28575" dist="9525" algn="bl" rotWithShape="0">
+              <a:srgbClr val="000000">
+                <a:alpha val="20000"/>
+              </a:srgbClr>
+            </a:outerShdw>
+          </a:effectLst>
+        </p:spPr>
+        <p:txBody>
+          <a:bodyPr spcFirstLastPara="1" wrap="square" lIns="274300" tIns="0" rIns="0" bIns="0" anchor="ctr" anchorCtr="0">
+            <a:noAutofit/>
+          </a:bodyPr>
+          <a:lstStyle/>
+          <a:p>
+            <a:pPr marL="0" marR="0" lvl="0" indent="0" algn="l" rtl="0">
+              <a:lnSpc>
+                <a:spcPct val="100000"/>
+              </a:lnSpc>
+              <a:spcBef>
+                <a:spcPts val="0"/>
+              </a:spcBef>
+              <a:spcAft>
+                <a:spcPts val="0"/>
+              </a:spcAft>
+              <a:buNone/>
+            </a:pPr>
+            <a:endParaRPr sz="1200" dirty="0">
+              <a:solidFill>
+                <a:schemeClr val="lt1"/>
+              </a:solidFill>
+              <a:latin typeface="Catamaran"/>
+              <a:ea typeface="Catamaran"/>
+              <a:cs typeface="Catamaran"/>
+              <a:sym typeface="Catamaran"/>
+            </a:endParaRPr>
+          </a:p>
+        </p:txBody>
+      </p:sp>
+      <p:sp>
+        <p:nvSpPr>
+          <p:cNvPr id="42" name="Google Shape;552;p38">
+            <a:extLst>
+              <a:ext uri="{FF2B5EF4-FFF2-40B4-BE49-F238E27FC236}">
+                <a16:creationId xmlns:a16="http://schemas.microsoft.com/office/drawing/2014/main" id="{DBEC68AC-D140-4811-868C-4FE6DA0843EB}"/>
+              </a:ext>
+            </a:extLst>
+          </p:cNvPr>
+          <p:cNvSpPr/>
+          <p:nvPr/>
+        </p:nvSpPr>
+        <p:spPr>
+          <a:xfrm>
+            <a:off x="5723548" y="2826662"/>
+            <a:ext cx="1340659" cy="917762"/>
+          </a:xfrm>
+          <a:prstGeom prst="homePlate">
+            <a:avLst>
+              <a:gd name="adj" fmla="val 32030"/>
+            </a:avLst>
+          </a:prstGeom>
+          <a:solidFill>
+            <a:schemeClr val="accent1">
+              <a:lumMod val="60000"/>
+              <a:lumOff val="40000"/>
+            </a:schemeClr>
+          </a:solidFill>
+          <a:ln>
+            <a:noFill/>
+          </a:ln>
+          <a:effectLst>
+            <a:outerShdw blurRad="28575" dist="9525" algn="bl" rotWithShape="0">
+              <a:srgbClr val="000000">
+                <a:alpha val="20000"/>
+              </a:srgbClr>
+            </a:outerShdw>
+          </a:effectLst>
+        </p:spPr>
+        <p:txBody>
+          <a:bodyPr spcFirstLastPara="1" wrap="square" lIns="274300" tIns="0" rIns="0" bIns="0" anchor="ctr" anchorCtr="0">
+            <a:noAutofit/>
+          </a:bodyPr>
+          <a:lstStyle/>
+          <a:p>
+            <a:pPr marL="0" marR="0" lvl="0" indent="0" algn="l" rtl="0">
+              <a:lnSpc>
+                <a:spcPct val="100000"/>
+              </a:lnSpc>
+              <a:spcBef>
+                <a:spcPts val="0"/>
+              </a:spcBef>
+              <a:spcAft>
+                <a:spcPts val="0"/>
+              </a:spcAft>
+              <a:buNone/>
+            </a:pPr>
+            <a:endParaRPr sz="1200" dirty="0">
+              <a:solidFill>
+                <a:schemeClr val="lt1"/>
+              </a:solidFill>
+              <a:latin typeface="Catamaran"/>
+              <a:ea typeface="Catamaran"/>
+              <a:cs typeface="Catamaran"/>
+              <a:sym typeface="Catamaran"/>
+            </a:endParaRPr>
+          </a:p>
+        </p:txBody>
+      </p:sp>
+      <p:sp>
+        <p:nvSpPr>
+          <p:cNvPr id="43" name="Google Shape;552;p38">
+            <a:extLst>
+              <a:ext uri="{FF2B5EF4-FFF2-40B4-BE49-F238E27FC236}">
+                <a16:creationId xmlns:a16="http://schemas.microsoft.com/office/drawing/2014/main" id="{5C7A3052-3E88-450C-86E8-1A80D381E97E}"/>
+              </a:ext>
+            </a:extLst>
+          </p:cNvPr>
+          <p:cNvSpPr/>
+          <p:nvPr/>
+        </p:nvSpPr>
+        <p:spPr>
+          <a:xfrm>
+            <a:off x="4507884" y="2832222"/>
+            <a:ext cx="1340659" cy="917762"/>
+          </a:xfrm>
+          <a:prstGeom prst="homePlate">
+            <a:avLst>
+              <a:gd name="adj" fmla="val 32030"/>
+            </a:avLst>
+          </a:prstGeom>
+          <a:solidFill>
+            <a:schemeClr val="accent1">
+              <a:lumMod val="60000"/>
+              <a:lumOff val="40000"/>
+            </a:schemeClr>
+          </a:solidFill>
+          <a:ln>
+            <a:noFill/>
+          </a:ln>
+          <a:effectLst>
+            <a:outerShdw blurRad="28575" dist="9525" algn="bl" rotWithShape="0">
+              <a:srgbClr val="000000">
+                <a:alpha val="20000"/>
+              </a:srgbClr>
+            </a:outerShdw>
+          </a:effectLst>
+        </p:spPr>
+        <p:txBody>
+          <a:bodyPr spcFirstLastPara="1" wrap="square" lIns="274300" tIns="0" rIns="0" bIns="0" anchor="ctr" anchorCtr="0">
+            <a:noAutofit/>
+          </a:bodyPr>
+          <a:lstStyle/>
+          <a:p>
+            <a:pPr marL="0" marR="0" lvl="0" indent="0" algn="l" rtl="0">
+              <a:lnSpc>
+                <a:spcPct val="100000"/>
+              </a:lnSpc>
+              <a:spcBef>
+                <a:spcPts val="0"/>
+              </a:spcBef>
+              <a:spcAft>
+                <a:spcPts val="0"/>
+              </a:spcAft>
+              <a:buNone/>
+            </a:pPr>
+            <a:endParaRPr sz="1200" dirty="0">
+              <a:solidFill>
+                <a:schemeClr val="lt1"/>
+              </a:solidFill>
+              <a:latin typeface="Catamaran"/>
+              <a:ea typeface="Catamaran"/>
+              <a:cs typeface="Catamaran"/>
+              <a:sym typeface="Catamaran"/>
+            </a:endParaRPr>
+          </a:p>
+        </p:txBody>
+      </p:sp>
+      <p:sp>
+        <p:nvSpPr>
+          <p:cNvPr id="44" name="Google Shape;552;p38">
+            <a:extLst>
+              <a:ext uri="{FF2B5EF4-FFF2-40B4-BE49-F238E27FC236}">
+                <a16:creationId xmlns:a16="http://schemas.microsoft.com/office/drawing/2014/main" id="{30312589-568A-460D-AA81-D78C174E7293}"/>
+              </a:ext>
+            </a:extLst>
+          </p:cNvPr>
+          <p:cNvSpPr/>
+          <p:nvPr/>
+        </p:nvSpPr>
+        <p:spPr>
+          <a:xfrm>
+            <a:off x="3302149" y="2832222"/>
+            <a:ext cx="1340659" cy="917762"/>
+          </a:xfrm>
+          <a:prstGeom prst="homePlate">
+            <a:avLst>
+              <a:gd name="adj" fmla="val 32030"/>
+            </a:avLst>
+          </a:prstGeom>
+          <a:solidFill>
+            <a:schemeClr val="accent1">
+              <a:lumMod val="60000"/>
+              <a:lumOff val="40000"/>
+            </a:schemeClr>
+          </a:solidFill>
+          <a:ln>
+            <a:noFill/>
+          </a:ln>
+          <a:effectLst>
+            <a:outerShdw blurRad="28575" dist="9525" algn="bl" rotWithShape="0">
+              <a:srgbClr val="000000">
+                <a:alpha val="20000"/>
+              </a:srgbClr>
+            </a:outerShdw>
+          </a:effectLst>
+        </p:spPr>
+        <p:txBody>
+          <a:bodyPr spcFirstLastPara="1" wrap="square" lIns="274300" tIns="0" rIns="0" bIns="0" anchor="ctr" anchorCtr="0">
+            <a:noAutofit/>
+          </a:bodyPr>
+          <a:lstStyle/>
+          <a:p>
+            <a:pPr marL="0" marR="0" lvl="0" indent="0" algn="l" rtl="0">
+              <a:lnSpc>
+                <a:spcPct val="100000"/>
+              </a:lnSpc>
+              <a:spcBef>
+                <a:spcPts val="0"/>
+              </a:spcBef>
+              <a:spcAft>
+                <a:spcPts val="0"/>
+              </a:spcAft>
+              <a:buNone/>
+            </a:pPr>
+            <a:endParaRPr sz="1200" dirty="0">
+              <a:solidFill>
+                <a:schemeClr val="lt1"/>
+              </a:solidFill>
+              <a:latin typeface="Catamaran"/>
+              <a:ea typeface="Catamaran"/>
+              <a:cs typeface="Catamaran"/>
+              <a:sym typeface="Catamaran"/>
+            </a:endParaRPr>
+          </a:p>
+        </p:txBody>
+      </p:sp>
+      <p:sp>
+        <p:nvSpPr>
+          <p:cNvPr id="45" name="Google Shape;552;p38">
+            <a:extLst>
+              <a:ext uri="{FF2B5EF4-FFF2-40B4-BE49-F238E27FC236}">
+                <a16:creationId xmlns:a16="http://schemas.microsoft.com/office/drawing/2014/main" id="{DBD1F82C-53EA-42C3-B1D7-CDD6B7806EA7}"/>
+              </a:ext>
+            </a:extLst>
+          </p:cNvPr>
+          <p:cNvSpPr/>
+          <p:nvPr/>
+        </p:nvSpPr>
+        <p:spPr>
+          <a:xfrm>
+            <a:off x="2091450" y="2832222"/>
+            <a:ext cx="1340659" cy="917762"/>
+          </a:xfrm>
+          <a:prstGeom prst="homePlate">
+            <a:avLst>
+              <a:gd name="adj" fmla="val 32030"/>
+            </a:avLst>
+          </a:prstGeom>
+          <a:solidFill>
+            <a:schemeClr val="accent1">
+              <a:lumMod val="60000"/>
+              <a:lumOff val="40000"/>
+            </a:schemeClr>
+          </a:solidFill>
+          <a:ln>
+            <a:noFill/>
+          </a:ln>
+          <a:effectLst>
+            <a:outerShdw blurRad="28575" dist="9525" algn="bl" rotWithShape="0">
+              <a:srgbClr val="000000">
+                <a:alpha val="20000"/>
+              </a:srgbClr>
+            </a:outerShdw>
+          </a:effectLst>
+        </p:spPr>
+        <p:txBody>
+          <a:bodyPr spcFirstLastPara="1" wrap="square" lIns="274300" tIns="0" rIns="0" bIns="0" anchor="ctr" anchorCtr="0">
+            <a:noAutofit/>
+          </a:bodyPr>
+          <a:lstStyle/>
+          <a:p>
+            <a:pPr marL="0" marR="0" lvl="0" indent="0" algn="l" rtl="0">
+              <a:lnSpc>
+                <a:spcPct val="100000"/>
+              </a:lnSpc>
+              <a:spcBef>
+                <a:spcPts val="0"/>
+              </a:spcBef>
+              <a:spcAft>
+                <a:spcPts val="0"/>
+              </a:spcAft>
+              <a:buNone/>
+            </a:pPr>
+            <a:endParaRPr sz="1200" dirty="0">
+              <a:solidFill>
+                <a:schemeClr val="lt1"/>
+              </a:solidFill>
+              <a:latin typeface="Catamaran"/>
+              <a:ea typeface="Catamaran"/>
+              <a:cs typeface="Catamaran"/>
+              <a:sym typeface="Catamaran"/>
+            </a:endParaRPr>
+          </a:p>
+        </p:txBody>
+      </p:sp>
+      <p:sp>
+        <p:nvSpPr>
+          <p:cNvPr id="46" name="Google Shape;552;p38">
+            <a:extLst>
+              <a:ext uri="{FF2B5EF4-FFF2-40B4-BE49-F238E27FC236}">
+                <a16:creationId xmlns:a16="http://schemas.microsoft.com/office/drawing/2014/main" id="{2629B164-F50E-4DD9-BDDF-E56C8B751D84}"/>
+              </a:ext>
+            </a:extLst>
+          </p:cNvPr>
+          <p:cNvSpPr/>
+          <p:nvPr/>
+        </p:nvSpPr>
+        <p:spPr>
+          <a:xfrm>
+            <a:off x="883233" y="2832222"/>
+            <a:ext cx="1340659" cy="917762"/>
+          </a:xfrm>
+          <a:prstGeom prst="homePlate">
+            <a:avLst>
+              <a:gd name="adj" fmla="val 32030"/>
+            </a:avLst>
+          </a:prstGeom>
+          <a:solidFill>
+            <a:schemeClr val="accent1">
+              <a:lumMod val="40000"/>
+              <a:lumOff val="60000"/>
+            </a:schemeClr>
+          </a:solidFill>
+          <a:ln>
+            <a:noFill/>
+          </a:ln>
+          <a:effectLst>
+            <a:outerShdw blurRad="28575" dist="9525" algn="bl" rotWithShape="0">
+              <a:srgbClr val="000000">
+                <a:alpha val="20000"/>
+              </a:srgbClr>
+            </a:outerShdw>
+          </a:effectLst>
+        </p:spPr>
+        <p:txBody>
+          <a:bodyPr spcFirstLastPara="1" wrap="square" lIns="274300" tIns="0" rIns="0" bIns="0" anchor="ctr" anchorCtr="0">
+            <a:noAutofit/>
+          </a:bodyPr>
+          <a:lstStyle/>
+          <a:p>
+            <a:pPr marL="0" marR="0" lvl="0" indent="0" algn="l" rtl="0">
+              <a:lnSpc>
+                <a:spcPct val="100000"/>
+              </a:lnSpc>
+              <a:spcBef>
+                <a:spcPts val="0"/>
+              </a:spcBef>
+              <a:spcAft>
+                <a:spcPts val="0"/>
+              </a:spcAft>
+              <a:buNone/>
+            </a:pPr>
+            <a:endParaRPr sz="1200" dirty="0">
+              <a:solidFill>
+                <a:schemeClr val="lt1"/>
+              </a:solidFill>
+              <a:latin typeface="Catamaran"/>
+              <a:ea typeface="Catamaran"/>
+              <a:cs typeface="Catamaran"/>
+              <a:sym typeface="Catamaran"/>
+            </a:endParaRPr>
+          </a:p>
+        </p:txBody>
+      </p:sp>
+      <p:sp>
+        <p:nvSpPr>
+          <p:cNvPr id="25" name="Google Shape;560;p38">
+            <a:extLst>
+              <a:ext uri="{FF2B5EF4-FFF2-40B4-BE49-F238E27FC236}">
+                <a16:creationId xmlns:a16="http://schemas.microsoft.com/office/drawing/2014/main" id="{17B83928-1B30-4DB8-A4C9-8EE65C74D6A2}"/>
+              </a:ext>
+            </a:extLst>
+          </p:cNvPr>
+          <p:cNvSpPr txBox="1"/>
+          <p:nvPr/>
+        </p:nvSpPr>
+        <p:spPr>
+          <a:xfrm>
+            <a:off x="874056" y="1865062"/>
+            <a:ext cx="1106400" cy="533400"/>
+          </a:xfrm>
+          <a:prstGeom prst="rect">
+            <a:avLst/>
+          </a:prstGeom>
+          <a:noFill/>
+          <a:ln>
+            <a:noFill/>
+          </a:ln>
+        </p:spPr>
+        <p:txBody>
+          <a:bodyPr spcFirstLastPara="1" wrap="square" lIns="0" tIns="0" rIns="0" bIns="0" anchor="b" anchorCtr="0">
+            <a:noAutofit/>
+          </a:bodyPr>
+          <a:lstStyle/>
+          <a:p>
+            <a:pPr marL="0" marR="0" lvl="0" indent="0" algn="ctr" rtl="0">
+              <a:lnSpc>
+                <a:spcPct val="100000"/>
+              </a:lnSpc>
+              <a:spcBef>
+                <a:spcPts val="0"/>
+              </a:spcBef>
+              <a:spcAft>
+                <a:spcPts val="0"/>
+              </a:spcAft>
+              <a:buNone/>
+            </a:pPr>
+            <a:r>
+              <a:rPr lang="en" sz="1800" dirty="0">
+                <a:solidFill>
+                  <a:schemeClr val="dk2"/>
+                </a:solidFill>
+                <a:latin typeface="Catamaran"/>
+                <a:ea typeface="Catamaran"/>
+                <a:cs typeface="Catamaran"/>
+                <a:sym typeface="Catamaran"/>
+              </a:rPr>
+              <a:t>Estudio de tecnologías</a:t>
+            </a:r>
+            <a:endParaRPr sz="1800" dirty="0">
+              <a:solidFill>
+                <a:schemeClr val="dk2"/>
+              </a:solidFill>
+              <a:latin typeface="Catamaran"/>
+              <a:ea typeface="Catamaran"/>
+              <a:cs typeface="Catamaran"/>
+              <a:sym typeface="Catamaran"/>
+            </a:endParaRPr>
+          </a:p>
+        </p:txBody>
+      </p:sp>
+      <p:sp>
+        <p:nvSpPr>
+          <p:cNvPr id="27" name="Google Shape;560;p38">
+            <a:extLst>
+              <a:ext uri="{FF2B5EF4-FFF2-40B4-BE49-F238E27FC236}">
+                <a16:creationId xmlns:a16="http://schemas.microsoft.com/office/drawing/2014/main" id="{C47D9E60-9409-417E-9089-5A1FC3F64711}"/>
+              </a:ext>
+            </a:extLst>
+          </p:cNvPr>
+          <p:cNvSpPr txBox="1"/>
+          <p:nvPr/>
+        </p:nvSpPr>
+        <p:spPr>
+          <a:xfrm>
+            <a:off x="3039037" y="1865062"/>
+            <a:ext cx="1603770" cy="533400"/>
+          </a:xfrm>
+          <a:prstGeom prst="rect">
+            <a:avLst/>
+          </a:prstGeom>
+          <a:noFill/>
+          <a:ln>
+            <a:noFill/>
+          </a:ln>
+        </p:spPr>
+        <p:txBody>
+          <a:bodyPr spcFirstLastPara="1" wrap="square" lIns="0" tIns="0" rIns="0" bIns="0" anchor="b" anchorCtr="0">
+            <a:noAutofit/>
+          </a:bodyPr>
+          <a:lstStyle/>
+          <a:p>
+            <a:pPr marL="0" marR="0" lvl="0" indent="0" algn="ctr" rtl="0">
+              <a:lnSpc>
+                <a:spcPct val="100000"/>
+              </a:lnSpc>
+              <a:spcBef>
+                <a:spcPts val="0"/>
+              </a:spcBef>
+              <a:spcAft>
+                <a:spcPts val="0"/>
+              </a:spcAft>
+              <a:buNone/>
+            </a:pPr>
+            <a:r>
+              <a:rPr lang="en" sz="1800" dirty="0">
+                <a:solidFill>
+                  <a:schemeClr val="dk2"/>
+                </a:solidFill>
+                <a:latin typeface="Catamaran"/>
+                <a:ea typeface="Catamaran"/>
+                <a:cs typeface="Catamaran"/>
+                <a:sym typeface="Catamaran"/>
+              </a:rPr>
+              <a:t>Consolidación del microservicio autogenerado</a:t>
+            </a:r>
+            <a:endParaRPr sz="1800" dirty="0">
+              <a:solidFill>
+                <a:schemeClr val="dk2"/>
+              </a:solidFill>
+              <a:latin typeface="Catamaran"/>
+              <a:ea typeface="Catamaran"/>
+              <a:cs typeface="Catamaran"/>
+              <a:sym typeface="Catamaran"/>
+            </a:endParaRPr>
+          </a:p>
+        </p:txBody>
+      </p:sp>
+      <p:sp>
+        <p:nvSpPr>
+          <p:cNvPr id="29" name="Google Shape;560;p38">
+            <a:extLst>
+              <a:ext uri="{FF2B5EF4-FFF2-40B4-BE49-F238E27FC236}">
+                <a16:creationId xmlns:a16="http://schemas.microsoft.com/office/drawing/2014/main" id="{7CF6E3DF-5B76-4DB3-ADD7-ABEC236C7F81}"/>
+              </a:ext>
+            </a:extLst>
+          </p:cNvPr>
+          <p:cNvSpPr txBox="1"/>
+          <p:nvPr/>
+        </p:nvSpPr>
+        <p:spPr>
+          <a:xfrm>
+            <a:off x="5674658" y="1865062"/>
+            <a:ext cx="1155290" cy="533400"/>
+          </a:xfrm>
+          <a:prstGeom prst="rect">
+            <a:avLst/>
+          </a:prstGeom>
+          <a:noFill/>
+          <a:ln>
+            <a:noFill/>
+          </a:ln>
+        </p:spPr>
+        <p:txBody>
+          <a:bodyPr spcFirstLastPara="1" wrap="square" lIns="0" tIns="0" rIns="0" bIns="0" anchor="b" anchorCtr="0">
+            <a:noAutofit/>
+          </a:bodyPr>
+          <a:lstStyle/>
+          <a:p>
+            <a:pPr marL="0" marR="0" lvl="0" indent="0" algn="ctr" rtl="0">
+              <a:lnSpc>
+                <a:spcPct val="100000"/>
+              </a:lnSpc>
+              <a:spcBef>
+                <a:spcPts val="0"/>
+              </a:spcBef>
+              <a:spcAft>
+                <a:spcPts val="0"/>
+              </a:spcAft>
+              <a:buNone/>
+            </a:pPr>
+            <a:r>
+              <a:rPr lang="en" sz="1800" dirty="0">
+                <a:solidFill>
+                  <a:schemeClr val="dk2"/>
+                </a:solidFill>
+                <a:latin typeface="Catamaran"/>
+                <a:ea typeface="Catamaran"/>
+                <a:cs typeface="Catamaran"/>
+                <a:sym typeface="Catamaran"/>
+              </a:rPr>
+              <a:t>Producto final</a:t>
+            </a:r>
+            <a:endParaRPr sz="1800" dirty="0">
+              <a:solidFill>
+                <a:schemeClr val="dk2"/>
+              </a:solidFill>
+              <a:latin typeface="Catamaran"/>
+              <a:ea typeface="Catamaran"/>
+              <a:cs typeface="Catamaran"/>
+              <a:sym typeface="Catamaran"/>
+            </a:endParaRPr>
+          </a:p>
+        </p:txBody>
+      </p:sp>
+      <p:sp>
+        <p:nvSpPr>
+          <p:cNvPr id="37" name="Google Shape;560;p38">
+            <a:extLst>
+              <a:ext uri="{FF2B5EF4-FFF2-40B4-BE49-F238E27FC236}">
+                <a16:creationId xmlns:a16="http://schemas.microsoft.com/office/drawing/2014/main" id="{2BD3DD83-01DE-480C-9410-0B76BBE252DC}"/>
+              </a:ext>
+            </a:extLst>
+          </p:cNvPr>
+          <p:cNvSpPr txBox="1"/>
+          <p:nvPr/>
+        </p:nvSpPr>
+        <p:spPr>
+          <a:xfrm>
+            <a:off x="2037229" y="4216451"/>
+            <a:ext cx="1264917" cy="533400"/>
+          </a:xfrm>
+          <a:prstGeom prst="rect">
+            <a:avLst/>
+          </a:prstGeom>
+          <a:noFill/>
+          <a:ln>
+            <a:noFill/>
+          </a:ln>
+        </p:spPr>
+        <p:txBody>
+          <a:bodyPr spcFirstLastPara="1" wrap="square" lIns="0" tIns="0" rIns="0" bIns="0" anchor="b" anchorCtr="0">
+            <a:noAutofit/>
+          </a:bodyPr>
+          <a:lstStyle/>
+          <a:p>
+            <a:pPr marL="0" marR="0" lvl="0" indent="0" algn="ctr" rtl="0">
+              <a:lnSpc>
+                <a:spcPct val="100000"/>
+              </a:lnSpc>
+              <a:spcBef>
+                <a:spcPts val="0"/>
+              </a:spcBef>
+              <a:spcAft>
+                <a:spcPts val="0"/>
+              </a:spcAft>
+              <a:buNone/>
+            </a:pPr>
+            <a:r>
+              <a:rPr lang="en" sz="1800" dirty="0">
+                <a:solidFill>
+                  <a:schemeClr val="dk2"/>
+                </a:solidFill>
+                <a:latin typeface="Catamaran"/>
+                <a:ea typeface="Catamaran"/>
+                <a:cs typeface="Catamaran"/>
+                <a:sym typeface="Catamaran"/>
+              </a:rPr>
+              <a:t>Construcción de prototipos</a:t>
+            </a:r>
+            <a:endParaRPr sz="1800" dirty="0">
+              <a:solidFill>
+                <a:schemeClr val="dk2"/>
+              </a:solidFill>
+              <a:latin typeface="Catamaran"/>
+              <a:ea typeface="Catamaran"/>
+              <a:cs typeface="Catamaran"/>
+              <a:sym typeface="Catamaran"/>
+            </a:endParaRPr>
+          </a:p>
+        </p:txBody>
+      </p:sp>
+      <p:sp>
+        <p:nvSpPr>
+          <p:cNvPr id="39" name="Google Shape;560;p38">
+            <a:extLst>
+              <a:ext uri="{FF2B5EF4-FFF2-40B4-BE49-F238E27FC236}">
+                <a16:creationId xmlns:a16="http://schemas.microsoft.com/office/drawing/2014/main" id="{0331AC53-1D73-45F0-B490-8A1E20E46D5E}"/>
+              </a:ext>
+            </a:extLst>
+          </p:cNvPr>
+          <p:cNvSpPr txBox="1"/>
+          <p:nvPr/>
+        </p:nvSpPr>
+        <p:spPr>
+          <a:xfrm>
+            <a:off x="4409741" y="4216451"/>
+            <a:ext cx="1264917" cy="533400"/>
+          </a:xfrm>
+          <a:prstGeom prst="rect">
+            <a:avLst/>
+          </a:prstGeom>
+          <a:noFill/>
+          <a:ln>
+            <a:noFill/>
+          </a:ln>
+        </p:spPr>
+        <p:txBody>
+          <a:bodyPr spcFirstLastPara="1" wrap="square" lIns="0" tIns="0" rIns="0" bIns="0" anchor="b" anchorCtr="0">
+            <a:noAutofit/>
+          </a:bodyPr>
+          <a:lstStyle/>
+          <a:p>
+            <a:pPr marL="0" marR="0" lvl="0" indent="0" algn="ctr" rtl="0">
+              <a:lnSpc>
+                <a:spcPct val="100000"/>
+              </a:lnSpc>
+              <a:spcBef>
+                <a:spcPts val="0"/>
+              </a:spcBef>
+              <a:spcAft>
+                <a:spcPts val="0"/>
+              </a:spcAft>
+              <a:buNone/>
+            </a:pPr>
+            <a:r>
+              <a:rPr lang="en" sz="1800" dirty="0">
+                <a:solidFill>
+                  <a:schemeClr val="dk2"/>
+                </a:solidFill>
+                <a:latin typeface="Catamaran"/>
+                <a:ea typeface="Catamaran"/>
+                <a:cs typeface="Catamaran"/>
+                <a:sym typeface="Catamaran"/>
+              </a:rPr>
+              <a:t>Primeros despliegues</a:t>
+            </a:r>
+            <a:endParaRPr sz="1800" dirty="0">
+              <a:solidFill>
+                <a:schemeClr val="dk2"/>
+              </a:solidFill>
+              <a:latin typeface="Catamaran"/>
+              <a:ea typeface="Catamaran"/>
+              <a:cs typeface="Catamaran"/>
+              <a:sym typeface="Catamaran"/>
+            </a:endParaRPr>
+          </a:p>
+        </p:txBody>
+      </p:sp>
+      <p:sp>
+        <p:nvSpPr>
+          <p:cNvPr id="41" name="Google Shape;560;p38">
+            <a:extLst>
+              <a:ext uri="{FF2B5EF4-FFF2-40B4-BE49-F238E27FC236}">
+                <a16:creationId xmlns:a16="http://schemas.microsoft.com/office/drawing/2014/main" id="{2D3C34DE-C8F6-4B76-B4E7-3F71D06DDEEF}"/>
+              </a:ext>
+            </a:extLst>
+          </p:cNvPr>
+          <p:cNvSpPr txBox="1"/>
+          <p:nvPr/>
+        </p:nvSpPr>
+        <p:spPr>
+          <a:xfrm>
+            <a:off x="6900189" y="4216451"/>
+            <a:ext cx="1106400" cy="533400"/>
+          </a:xfrm>
+          <a:prstGeom prst="rect">
+            <a:avLst/>
+          </a:prstGeom>
+          <a:noFill/>
+          <a:ln>
+            <a:noFill/>
+          </a:ln>
+        </p:spPr>
+        <p:txBody>
+          <a:bodyPr spcFirstLastPara="1" wrap="square" lIns="0" tIns="0" rIns="0" bIns="0" anchor="b" anchorCtr="0">
+            <a:noAutofit/>
+          </a:bodyPr>
+          <a:lstStyle/>
+          <a:p>
+            <a:pPr marL="0" marR="0" lvl="0" indent="0" algn="ctr" rtl="0">
+              <a:lnSpc>
+                <a:spcPct val="100000"/>
+              </a:lnSpc>
+              <a:spcBef>
+                <a:spcPts val="0"/>
+              </a:spcBef>
+              <a:spcAft>
+                <a:spcPts val="0"/>
+              </a:spcAft>
+              <a:buNone/>
+            </a:pPr>
+            <a:r>
+              <a:rPr lang="en" sz="1800" dirty="0">
+                <a:solidFill>
+                  <a:schemeClr val="dk2"/>
+                </a:solidFill>
+                <a:latin typeface="Catamaran"/>
+                <a:ea typeface="Catamaran"/>
+                <a:cs typeface="Catamaran"/>
+                <a:sym typeface="Catamaran"/>
+              </a:rPr>
+              <a:t>R</a:t>
+            </a:r>
+            <a:r>
+              <a:rPr lang="es-ES" sz="1800" dirty="0">
+                <a:solidFill>
+                  <a:schemeClr val="dk2"/>
+                </a:solidFill>
+                <a:latin typeface="Catamaran"/>
+                <a:ea typeface="Catamaran"/>
+                <a:cs typeface="Catamaran"/>
+                <a:sym typeface="Catamaran"/>
+              </a:rPr>
+              <a:t>e</a:t>
+            </a:r>
+            <a:r>
+              <a:rPr lang="en" sz="1800" dirty="0">
+                <a:solidFill>
+                  <a:schemeClr val="dk2"/>
+                </a:solidFill>
+                <a:latin typeface="Catamaran"/>
+                <a:ea typeface="Catamaran"/>
+                <a:cs typeface="Catamaran"/>
+                <a:sym typeface="Catamaran"/>
+              </a:rPr>
+              <a:t>visión de la memoria</a:t>
+            </a:r>
+            <a:endParaRPr sz="1800" dirty="0">
+              <a:solidFill>
+                <a:schemeClr val="dk2"/>
+              </a:solidFill>
+              <a:latin typeface="Catamaran"/>
+              <a:ea typeface="Catamaran"/>
+              <a:cs typeface="Catamaran"/>
+              <a:sym typeface="Catamaran"/>
+            </a:endParaRPr>
+          </a:p>
+        </p:txBody>
+      </p:sp>
+      <p:sp>
+        <p:nvSpPr>
+          <p:cNvPr id="47" name="Google Shape;560;p38">
+            <a:extLst>
+              <a:ext uri="{FF2B5EF4-FFF2-40B4-BE49-F238E27FC236}">
+                <a16:creationId xmlns:a16="http://schemas.microsoft.com/office/drawing/2014/main" id="{6AA69242-A17D-4BFA-8CDF-FC87F6D77628}"/>
+              </a:ext>
+            </a:extLst>
+          </p:cNvPr>
+          <p:cNvSpPr txBox="1"/>
+          <p:nvPr/>
+        </p:nvSpPr>
+        <p:spPr>
+          <a:xfrm>
+            <a:off x="2185822" y="3111291"/>
+            <a:ext cx="4714367" cy="533400"/>
+          </a:xfrm>
+          <a:prstGeom prst="rect">
+            <a:avLst/>
+          </a:prstGeom>
+          <a:noFill/>
+          <a:ln>
+            <a:noFill/>
+          </a:ln>
+        </p:spPr>
+        <p:txBody>
+          <a:bodyPr spcFirstLastPara="1" wrap="square" lIns="0" tIns="0" rIns="0" bIns="0" anchor="b" anchorCtr="0">
+            <a:noAutofit/>
+          </a:bodyPr>
+          <a:lstStyle/>
+          <a:p>
+            <a:pPr marL="0" marR="0" lvl="0" indent="0" algn="ctr" rtl="0">
+              <a:lnSpc>
+                <a:spcPct val="100000"/>
+              </a:lnSpc>
+              <a:spcBef>
+                <a:spcPts val="0"/>
+              </a:spcBef>
+              <a:spcAft>
+                <a:spcPts val="0"/>
+              </a:spcAft>
+              <a:buNone/>
+            </a:pPr>
+            <a:r>
+              <a:rPr lang="en" sz="3600" spc="600" dirty="0">
+                <a:solidFill>
+                  <a:schemeClr val="bg1"/>
+                </a:solidFill>
+                <a:latin typeface="Catamaran"/>
+                <a:ea typeface="Catamaran"/>
+                <a:cs typeface="Catamaran"/>
+                <a:sym typeface="Catamaran"/>
+              </a:rPr>
+              <a:t>PROGRAMACIÓN</a:t>
+            </a:r>
+            <a:endParaRPr sz="3600" spc="600" dirty="0">
+              <a:solidFill>
+                <a:schemeClr val="bg1"/>
+              </a:solidFill>
+              <a:latin typeface="Catamaran"/>
+              <a:ea typeface="Catamaran"/>
+              <a:cs typeface="Catamaran"/>
+              <a:sym typeface="Catamaran"/>
+            </a:endParaRPr>
+          </a:p>
+        </p:txBody>
+      </p:sp>
     </p:spTree>
     <p:extLst>
       <p:ext uri="{BB962C8B-B14F-4D97-AF65-F5344CB8AC3E}">
-        <p14:creationId xmlns:p14="http://schemas.microsoft.com/office/powerpoint/2010/main" val="2415125095"/>
+        <p14:creationId xmlns:p14="http://schemas.microsoft.com/office/powerpoint/2010/main" val="1191438269"/>
       </p:ext>
     </p:extLst>
   </p:cSld>

</xml_diff>

<commit_message>
Acortar más la presentación y retoques.
</commit_message>
<xml_diff>
--- a/TFG_AlejandroCarrion.pptx
+++ b/TFG_AlejandroCarrion.pptx
@@ -298,7 +298,7 @@
 <file path=ppt/revisionInfo.xml><?xml version="1.0" encoding="utf-8"?>
 <p1510:revInfo xmlns:a="http://schemas.openxmlformats.org/drawingml/2006/main" xmlns:r="http://schemas.openxmlformats.org/officeDocument/2006/relationships" xmlns:p1510="http://schemas.microsoft.com/office/powerpoint/2015/10/main">
   <p1510:revLst>
-    <p1510:client id="{ECF2C08A-1D63-4443-908D-B3C4743D2FCA}" v="94" dt="2021-09-06T14:07:19.559"/>
+    <p1510:client id="{ECF2C08A-1D63-4443-908D-B3C4743D2FCA}" v="95" dt="2021-09-06T14:53:08.678"/>
   </p1510:revLst>
 </p1510:revInfo>
 </file>
@@ -308,7 +308,7 @@
   <pc:docChgLst>
     <pc:chgData name="Alejandro Carrión" userId="757439b461449c9e" providerId="LiveId" clId="{ECF2C08A-1D63-4443-908D-B3C4743D2FCA}"/>
     <pc:docChg chg="undo redo custSel addSld delSld modSld sldOrd">
-      <pc:chgData name="Alejandro Carrión" userId="757439b461449c9e" providerId="LiveId" clId="{ECF2C08A-1D63-4443-908D-B3C4743D2FCA}" dt="2021-09-06T14:50:01.205" v="6841" actId="478"/>
+      <pc:chgData name="Alejandro Carrión" userId="757439b461449c9e" providerId="LiveId" clId="{ECF2C08A-1D63-4443-908D-B3C4743D2FCA}" dt="2021-09-06T14:58:40.677" v="6872" actId="20577"/>
       <pc:docMkLst>
         <pc:docMk/>
       </pc:docMkLst>
@@ -342,13 +342,13 @@
         </pc:sldMkLst>
       </pc:sldChg>
       <pc:sldChg chg="addSp delSp modSp mod">
-        <pc:chgData name="Alejandro Carrión" userId="757439b461449c9e" providerId="LiveId" clId="{ECF2C08A-1D63-4443-908D-B3C4743D2FCA}" dt="2021-09-06T14:49:45.738" v="6839" actId="478"/>
+        <pc:chgData name="Alejandro Carrión" userId="757439b461449c9e" providerId="LiveId" clId="{ECF2C08A-1D63-4443-908D-B3C4743D2FCA}" dt="2021-09-06T14:51:08.467" v="6842" actId="478"/>
         <pc:sldMkLst>
           <pc:docMk/>
           <pc:sldMk cId="0" sldId="259"/>
         </pc:sldMkLst>
-        <pc:spChg chg="add mod">
-          <ac:chgData name="Alejandro Carrión" userId="757439b461449c9e" providerId="LiveId" clId="{ECF2C08A-1D63-4443-908D-B3C4743D2FCA}" dt="2021-09-06T14:49:45.738" v="6839" actId="478"/>
+        <pc:spChg chg="add del mod">
+          <ac:chgData name="Alejandro Carrión" userId="757439b461449c9e" providerId="LiveId" clId="{ECF2C08A-1D63-4443-908D-B3C4743D2FCA}" dt="2021-09-06T14:51:08.467" v="6842" actId="478"/>
           <ac:spMkLst>
             <pc:docMk/>
             <pc:sldMk cId="0" sldId="259"/>
@@ -722,13 +722,13 @@
         </pc:sldMkLst>
       </pc:sldChg>
       <pc:sldChg chg="addSp delSp modSp add del mod">
-        <pc:chgData name="Alejandro Carrión" userId="757439b461449c9e" providerId="LiveId" clId="{ECF2C08A-1D63-4443-908D-B3C4743D2FCA}" dt="2021-09-06T14:49:49.687" v="6840" actId="478"/>
+        <pc:chgData name="Alejandro Carrión" userId="757439b461449c9e" providerId="LiveId" clId="{ECF2C08A-1D63-4443-908D-B3C4743D2FCA}" dt="2021-09-06T14:51:12.039" v="6843" actId="478"/>
         <pc:sldMkLst>
           <pc:docMk/>
           <pc:sldMk cId="3346505560" sldId="294"/>
         </pc:sldMkLst>
-        <pc:spChg chg="add mod">
-          <ac:chgData name="Alejandro Carrión" userId="757439b461449c9e" providerId="LiveId" clId="{ECF2C08A-1D63-4443-908D-B3C4743D2FCA}" dt="2021-09-06T14:49:49.687" v="6840" actId="478"/>
+        <pc:spChg chg="add del mod">
+          <ac:chgData name="Alejandro Carrión" userId="757439b461449c9e" providerId="LiveId" clId="{ECF2C08A-1D63-4443-908D-B3C4743D2FCA}" dt="2021-09-06T14:51:12.039" v="6843" actId="478"/>
           <ac:spMkLst>
             <pc:docMk/>
             <pc:sldMk cId="3346505560" sldId="294"/>
@@ -800,13 +800,13 @@
         </pc:spChg>
       </pc:sldChg>
       <pc:sldChg chg="addSp delSp modSp add mod">
-        <pc:chgData name="Alejandro Carrión" userId="757439b461449c9e" providerId="LiveId" clId="{ECF2C08A-1D63-4443-908D-B3C4743D2FCA}" dt="2021-09-06T14:50:01.205" v="6841" actId="478"/>
+        <pc:chgData name="Alejandro Carrión" userId="757439b461449c9e" providerId="LiveId" clId="{ECF2C08A-1D63-4443-908D-B3C4743D2FCA}" dt="2021-09-06T14:51:16.448" v="6844" actId="478"/>
         <pc:sldMkLst>
           <pc:docMk/>
           <pc:sldMk cId="3606591171" sldId="296"/>
         </pc:sldMkLst>
-        <pc:spChg chg="add mod">
-          <ac:chgData name="Alejandro Carrión" userId="757439b461449c9e" providerId="LiveId" clId="{ECF2C08A-1D63-4443-908D-B3C4743D2FCA}" dt="2021-09-06T14:50:01.205" v="6841" actId="478"/>
+        <pc:spChg chg="add del mod">
+          <ac:chgData name="Alejandro Carrión" userId="757439b461449c9e" providerId="LiveId" clId="{ECF2C08A-1D63-4443-908D-B3C4743D2FCA}" dt="2021-09-06T14:51:16.448" v="6844" actId="478"/>
           <ac:spMkLst>
             <pc:docMk/>
             <pc:sldMk cId="3606591171" sldId="296"/>
@@ -2108,7 +2108,7 @@
         </pc:picChg>
       </pc:sldChg>
       <pc:sldChg chg="addSp delSp modSp add del mod chgLayout">
-        <pc:chgData name="Alejandro Carrión" userId="757439b461449c9e" providerId="LiveId" clId="{ECF2C08A-1D63-4443-908D-B3C4743D2FCA}" dt="2021-08-31T17:25:29.412" v="2834" actId="115"/>
+        <pc:chgData name="Alejandro Carrión" userId="757439b461449c9e" providerId="LiveId" clId="{ECF2C08A-1D63-4443-908D-B3C4743D2FCA}" dt="2021-09-06T14:54:12.897" v="6855" actId="2710"/>
         <pc:sldMkLst>
           <pc:docMk/>
           <pc:sldMk cId="1003742140" sldId="308"/>
@@ -2138,7 +2138,7 @@
           </ac:spMkLst>
         </pc:spChg>
         <pc:spChg chg="add mod ord">
-          <ac:chgData name="Alejandro Carrión" userId="757439b461449c9e" providerId="LiveId" clId="{ECF2C08A-1D63-4443-908D-B3C4743D2FCA}" dt="2021-08-31T17:25:29.412" v="2834" actId="115"/>
+          <ac:chgData name="Alejandro Carrión" userId="757439b461449c9e" providerId="LiveId" clId="{ECF2C08A-1D63-4443-908D-B3C4743D2FCA}" dt="2021-09-06T14:54:12.897" v="6855" actId="2710"/>
           <ac:spMkLst>
             <pc:docMk/>
             <pc:sldMk cId="1003742140" sldId="308"/>
@@ -2193,8 +2193,8 @@
             <ac:picMk id="32770" creationId="{650D476E-B592-47E9-9DA4-D04C4F6EFF0C}"/>
           </ac:picMkLst>
         </pc:picChg>
-        <pc:picChg chg="mod">
-          <ac:chgData name="Alejandro Carrión" userId="757439b461449c9e" providerId="LiveId" clId="{ECF2C08A-1D63-4443-908D-B3C4743D2FCA}" dt="2021-08-30T19:23:55.732" v="2613" actId="14100"/>
+        <pc:picChg chg="add del mod modCrop">
+          <ac:chgData name="Alejandro Carrión" userId="757439b461449c9e" providerId="LiveId" clId="{ECF2C08A-1D63-4443-908D-B3C4743D2FCA}" dt="2021-09-06T14:53:54.229" v="6854" actId="1076"/>
           <ac:picMkLst>
             <pc:docMk/>
             <pc:sldMk cId="1003742140" sldId="308"/>
@@ -2240,7 +2240,7 @@
         </pc:picChg>
       </pc:sldChg>
       <pc:sldChg chg="addSp delSp modSp add mod">
-        <pc:chgData name="Alejandro Carrión" userId="757439b461449c9e" providerId="LiveId" clId="{ECF2C08A-1D63-4443-908D-B3C4743D2FCA}" dt="2021-09-06T14:43:05.315" v="6838" actId="2710"/>
+        <pc:chgData name="Alejandro Carrión" userId="757439b461449c9e" providerId="LiveId" clId="{ECF2C08A-1D63-4443-908D-B3C4743D2FCA}" dt="2021-09-06T14:56:40.585" v="6864" actId="20577"/>
         <pc:sldMkLst>
           <pc:docMk/>
           <pc:sldMk cId="1817353308" sldId="309"/>
@@ -2254,7 +2254,7 @@
           </ac:spMkLst>
         </pc:spChg>
         <pc:spChg chg="mod">
-          <ac:chgData name="Alejandro Carrión" userId="757439b461449c9e" providerId="LiveId" clId="{ECF2C08A-1D63-4443-908D-B3C4743D2FCA}" dt="2021-09-06T14:43:05.315" v="6838" actId="2710"/>
+          <ac:chgData name="Alejandro Carrión" userId="757439b461449c9e" providerId="LiveId" clId="{ECF2C08A-1D63-4443-908D-B3C4743D2FCA}" dt="2021-09-06T14:56:40.585" v="6864" actId="20577"/>
           <ac:spMkLst>
             <pc:docMk/>
             <pc:sldMk cId="1817353308" sldId="309"/>
@@ -2371,8 +2371,8 @@
           </ac:picMkLst>
         </pc:picChg>
       </pc:sldChg>
-      <pc:sldChg chg="delSp modSp add mod">
-        <pc:chgData name="Alejandro Carrión" userId="757439b461449c9e" providerId="LiveId" clId="{ECF2C08A-1D63-4443-908D-B3C4743D2FCA}" dt="2021-08-30T19:20:32.876" v="2524" actId="2710"/>
+      <pc:sldChg chg="addSp delSp modSp add mod">
+        <pc:chgData name="Alejandro Carrión" userId="757439b461449c9e" providerId="LiveId" clId="{ECF2C08A-1D63-4443-908D-B3C4743D2FCA}" dt="2021-09-06T14:55:02.405" v="6863" actId="1076"/>
         <pc:sldMkLst>
           <pc:docMk/>
           <pc:sldMk cId="3146919481" sldId="313"/>
@@ -2386,13 +2386,21 @@
           </ac:spMkLst>
         </pc:spChg>
         <pc:spChg chg="mod">
-          <ac:chgData name="Alejandro Carrión" userId="757439b461449c9e" providerId="LiveId" clId="{ECF2C08A-1D63-4443-908D-B3C4743D2FCA}" dt="2021-08-30T19:20:32.876" v="2524" actId="2710"/>
+          <ac:chgData name="Alejandro Carrión" userId="757439b461449c9e" providerId="LiveId" clId="{ECF2C08A-1D63-4443-908D-B3C4743D2FCA}" dt="2021-09-06T14:54:54.087" v="6862" actId="1076"/>
           <ac:spMkLst>
             <pc:docMk/>
             <pc:sldMk cId="3146919481" sldId="313"/>
             <ac:spMk id="15" creationId="{6B6259AF-1D2A-4AB1-9BFB-5370E1EE3AEE}"/>
           </ac:spMkLst>
         </pc:spChg>
+        <pc:picChg chg="add mod">
+          <ac:chgData name="Alejandro Carrión" userId="757439b461449c9e" providerId="LiveId" clId="{ECF2C08A-1D63-4443-908D-B3C4743D2FCA}" dt="2021-09-06T14:55:02.405" v="6863" actId="1076"/>
+          <ac:picMkLst>
+            <pc:docMk/>
+            <pc:sldMk cId="3146919481" sldId="313"/>
+            <ac:picMk id="5" creationId="{7181042F-0D23-4362-AAE8-0C6F5619470C}"/>
+          </ac:picMkLst>
+        </pc:picChg>
         <pc:picChg chg="del">
           <ac:chgData name="Alejandro Carrión" userId="757439b461449c9e" providerId="LiveId" clId="{ECF2C08A-1D63-4443-908D-B3C4743D2FCA}" dt="2021-08-30T19:19:10.311" v="2393" actId="478"/>
           <ac:picMkLst>
@@ -2607,13 +2615,13 @@
         </pc:picChg>
       </pc:sldChg>
       <pc:sldChg chg="modSp add mod ord">
-        <pc:chgData name="Alejandro Carrión" userId="757439b461449c9e" providerId="LiveId" clId="{ECF2C08A-1D63-4443-908D-B3C4743D2FCA}" dt="2021-09-06T14:16:53.754" v="6794" actId="2710"/>
+        <pc:chgData name="Alejandro Carrión" userId="757439b461449c9e" providerId="LiveId" clId="{ECF2C08A-1D63-4443-908D-B3C4743D2FCA}" dt="2021-09-06T14:58:40.677" v="6872" actId="20577"/>
         <pc:sldMkLst>
           <pc:docMk/>
           <pc:sldMk cId="1083794317" sldId="318"/>
         </pc:sldMkLst>
         <pc:spChg chg="mod">
-          <ac:chgData name="Alejandro Carrión" userId="757439b461449c9e" providerId="LiveId" clId="{ECF2C08A-1D63-4443-908D-B3C4743D2FCA}" dt="2021-09-06T14:16:53.754" v="6794" actId="2710"/>
+          <ac:chgData name="Alejandro Carrión" userId="757439b461449c9e" providerId="LiveId" clId="{ECF2C08A-1D63-4443-908D-B3C4743D2FCA}" dt="2021-09-06T14:58:40.677" v="6872" actId="20577"/>
           <ac:spMkLst>
             <pc:docMk/>
             <pc:sldMk cId="1083794317" sldId="318"/>
@@ -15630,31 +15638,6 @@
           </a:p>
         </p:txBody>
       </p:sp>
-      <p:sp>
-        <p:nvSpPr>
-          <p:cNvPr id="3" name="Subtítulo 2">
-            <a:extLst>
-              <a:ext uri="{FF2B5EF4-FFF2-40B4-BE49-F238E27FC236}">
-                <a16:creationId xmlns:a16="http://schemas.microsoft.com/office/drawing/2014/main" id="{0FA5CD11-A5C4-49C8-A640-55BBCCD78AE1}"/>
-              </a:ext>
-            </a:extLst>
-          </p:cNvPr>
-          <p:cNvSpPr>
-            <a:spLocks noGrp="1"/>
-          </p:cNvSpPr>
-          <p:nvPr>
-            <p:ph type="subTitle" idx="1"/>
-          </p:nvPr>
-        </p:nvSpPr>
-        <p:spPr/>
-        <p:txBody>
-          <a:bodyPr/>
-          <a:lstStyle/>
-          <a:p>
-            <a:endParaRPr lang="es-ES"/>
-          </a:p>
-        </p:txBody>
-      </p:sp>
     </p:spTree>
     <p:extLst>
       <p:ext uri="{BB962C8B-B14F-4D97-AF65-F5344CB8AC3E}">
@@ -17663,31 +17646,6 @@
               <a:cs typeface="Catamaran"/>
               <a:sym typeface="Catamaran"/>
             </a:endParaRPr>
-          </a:p>
-        </p:txBody>
-      </p:sp>
-      <p:sp>
-        <p:nvSpPr>
-          <p:cNvPr id="3" name="Subtítulo 2">
-            <a:extLst>
-              <a:ext uri="{FF2B5EF4-FFF2-40B4-BE49-F238E27FC236}">
-                <a16:creationId xmlns:a16="http://schemas.microsoft.com/office/drawing/2014/main" id="{D1DE0A49-A108-466B-A3D1-A22CDEC11D83}"/>
-              </a:ext>
-            </a:extLst>
-          </p:cNvPr>
-          <p:cNvSpPr>
-            <a:spLocks noGrp="1"/>
-          </p:cNvSpPr>
-          <p:nvPr>
-            <p:ph type="subTitle" idx="1"/>
-          </p:nvPr>
-        </p:nvSpPr>
-        <p:spPr/>
-        <p:txBody>
-          <a:bodyPr/>
-          <a:lstStyle/>
-          <a:p>
-            <a:endParaRPr lang="es-ES"/>
           </a:p>
         </p:txBody>
       </p:sp>
@@ -20967,7 +20925,15 @@
             </a:pPr>
             <a:r>
               <a:rPr lang="es-ES" sz="2200" dirty="0"/>
-              <a:t>Nuevos: C#, YARP</a:t>
+              <a:t>Nuevos</a:t>
+            </a:r>
+            <a:r>
+              <a:rPr lang="es-ES" sz="2200"/>
+              <a:t>: .NET, </a:t>
+            </a:r>
+            <a:r>
+              <a:rPr lang="es-ES" sz="2200" dirty="0"/>
+              <a:t>YARP</a:t>
             </a:r>
           </a:p>
           <a:p>
@@ -21978,31 +21944,6 @@
           </a:p>
         </p:txBody>
       </p:sp>
-      <p:sp>
-        <p:nvSpPr>
-          <p:cNvPr id="3" name="Subtítulo 2">
-            <a:extLst>
-              <a:ext uri="{FF2B5EF4-FFF2-40B4-BE49-F238E27FC236}">
-                <a16:creationId xmlns:a16="http://schemas.microsoft.com/office/drawing/2014/main" id="{78339C63-36B6-48B8-8C86-65A3CBC71F26}"/>
-              </a:ext>
-            </a:extLst>
-          </p:cNvPr>
-          <p:cNvSpPr>
-            <a:spLocks noGrp="1"/>
-          </p:cNvSpPr>
-          <p:nvPr>
-            <p:ph type="subTitle" idx="1"/>
-          </p:nvPr>
-        </p:nvSpPr>
-        <p:spPr/>
-        <p:txBody>
-          <a:bodyPr/>
-          <a:lstStyle/>
-          <a:p>
-            <a:endParaRPr lang="es-ES"/>
-          </a:p>
-        </p:txBody>
-      </p:sp>
     </p:spTree>
   </p:cSld>
   <p:clrMapOvr>
@@ -22083,7 +22024,7 @@
           <a:p>
             <a:pPr>
               <a:lnSpc>
-                <a:spcPct val="150000"/>
+                <a:spcPct val="200000"/>
               </a:lnSpc>
             </a:pPr>
             <a:r>
@@ -22094,7 +22035,7 @@
           <a:p>
             <a:pPr>
               <a:lnSpc>
-                <a:spcPct val="150000"/>
+                <a:spcPct val="200000"/>
               </a:lnSpc>
             </a:pPr>
             <a:r>
@@ -22105,7 +22046,7 @@
           <a:p>
             <a:pPr>
               <a:lnSpc>
-                <a:spcPct val="150000"/>
+                <a:spcPct val="200000"/>
               </a:lnSpc>
             </a:pPr>
             <a:r>
@@ -22173,7 +22114,7 @@
           </p:cNvPicPr>
           <p:nvPr/>
         </p:nvPicPr>
-        <p:blipFill>
+        <p:blipFill rotWithShape="1">
           <a:blip r:embed="rId2">
             <a:extLst>
               <a:ext uri="{28A0092B-C50C-407E-A947-70E740481C1C}">
@@ -22181,15 +22122,13 @@
               </a:ext>
             </a:extLst>
           </a:blip>
-          <a:srcRect/>
-          <a:stretch>
-            <a:fillRect/>
-          </a:stretch>
+          <a:srcRect l="36165"/>
+          <a:stretch/>
         </p:blipFill>
         <p:spPr bwMode="auto">
           <a:xfrm>
-            <a:off x="3907084" y="2245659"/>
-            <a:ext cx="4914186" cy="2643935"/>
+            <a:off x="4810835" y="1689224"/>
+            <a:ext cx="3753135" cy="3163251"/>
           </a:xfrm>
           <a:prstGeom prst="rect">
             <a:avLst/>
@@ -22280,7 +22219,12 @@
             <p:ph type="body" idx="1"/>
           </p:nvPr>
         </p:nvSpPr>
-        <p:spPr/>
+        <p:spPr>
+          <a:xfrm>
+            <a:off x="5562641" y="2003330"/>
+            <a:ext cx="3417587" cy="2884200"/>
+          </a:xfrm>
+        </p:spPr>
         <p:txBody>
           <a:bodyPr/>
           <a:lstStyle/>
@@ -22303,17 +22247,6 @@
             </a:pPr>
             <a:r>
               <a:rPr lang="es-ES" dirty="0"/>
-              <a:t>Maniobrabilidad en los despliegues</a:t>
-            </a:r>
-          </a:p>
-          <a:p>
-            <a:pPr>
-              <a:lnSpc>
-                <a:spcPct val="200000"/>
-              </a:lnSpc>
-            </a:pPr>
-            <a:r>
-              <a:rPr lang="es-ES" dirty="0"/>
               <a:t>Tolerancia a fallos</a:t>
             </a:r>
           </a:p>
@@ -22325,7 +22258,7 @@
             </a:pPr>
             <a:r>
               <a:rPr lang="es-ES" dirty="0"/>
-              <a:t>Escalabilidad y mantenibilidad</a:t>
+              <a:t>Escalabilidad</a:t>
             </a:r>
           </a:p>
         </p:txBody>
@@ -22374,6 +22307,44 @@
           </a:p>
         </p:txBody>
       </p:sp>
+      <p:pic>
+        <p:nvPicPr>
+          <p:cNvPr id="5" name="Picture 2" descr="Diagrama, Esquemático&#10;&#10;Descripción generada automáticamente">
+            <a:extLst>
+              <a:ext uri="{FF2B5EF4-FFF2-40B4-BE49-F238E27FC236}">
+                <a16:creationId xmlns:a16="http://schemas.microsoft.com/office/drawing/2014/main" id="{7181042F-0D23-4362-AAE8-0C6F5619470C}"/>
+              </a:ext>
+            </a:extLst>
+          </p:cNvPr>
+          <p:cNvPicPr>
+            <a:picLocks noChangeAspect="1" noChangeArrowheads="1"/>
+          </p:cNvPicPr>
+          <p:nvPr/>
+        </p:nvPicPr>
+        <p:blipFill>
+          <a:blip r:embed="rId2">
+            <a:extLst>
+              <a:ext uri="{28A0092B-C50C-407E-A947-70E740481C1C}">
+                <a14:useLocalDpi xmlns:a14="http://schemas.microsoft.com/office/drawing/2010/main" val="0"/>
+              </a:ext>
+            </a:extLst>
+          </a:blip>
+          <a:srcRect/>
+          <a:stretch>
+            <a:fillRect/>
+          </a:stretch>
+        </p:blipFill>
+        <p:spPr bwMode="auto">
+          <a:xfrm>
+            <a:off x="385961" y="1815756"/>
+            <a:ext cx="4914186" cy="2643935"/>
+          </a:xfrm>
+          <a:prstGeom prst="rect">
+            <a:avLst/>
+          </a:prstGeom>
+          <a:noFill/>
+        </p:spPr>
+      </p:pic>
     </p:spTree>
     <p:extLst>
       <p:ext uri="{BB962C8B-B14F-4D97-AF65-F5344CB8AC3E}">
@@ -23043,7 +23014,7 @@
             </a:r>
             <a:r>
               <a:rPr lang="es-ES" dirty="0"/>
-              <a:t> inverso:</a:t>
+              <a:t> inverso</a:t>
             </a:r>
           </a:p>
           <a:p>

</xml_diff>

<commit_message>
Retoques y foto Middleware.
</commit_message>
<xml_diff>
--- a/TFG_AlejandroCarrion.pptx
+++ b/TFG_AlejandroCarrion.pptx
@@ -5,7 +5,7 @@
     <p:sldMasterId id="2147483658" r:id="rId1"/>
   </p:sldMasterIdLst>
   <p:notesMasterIdLst>
-    <p:notesMasterId r:id="rId30"/>
+    <p:notesMasterId r:id="rId31"/>
   </p:notesMasterIdLst>
   <p:sldIdLst>
     <p:sldId id="256" r:id="rId2"/>
@@ -27,35 +27,36 @@
     <p:sldId id="296" r:id="rId18"/>
     <p:sldId id="306" r:id="rId19"/>
     <p:sldId id="315" r:id="rId20"/>
-    <p:sldId id="326" r:id="rId21"/>
-    <p:sldId id="317" r:id="rId22"/>
-    <p:sldId id="328" r:id="rId23"/>
-    <p:sldId id="297" r:id="rId24"/>
-    <p:sldId id="277" r:id="rId25"/>
-    <p:sldId id="298" r:id="rId26"/>
-    <p:sldId id="318" r:id="rId27"/>
-    <p:sldId id="320" r:id="rId28"/>
-    <p:sldId id="319" r:id="rId29"/>
+    <p:sldId id="329" r:id="rId21"/>
+    <p:sldId id="326" r:id="rId22"/>
+    <p:sldId id="317" r:id="rId23"/>
+    <p:sldId id="328" r:id="rId24"/>
+    <p:sldId id="297" r:id="rId25"/>
+    <p:sldId id="277" r:id="rId26"/>
+    <p:sldId id="298" r:id="rId27"/>
+    <p:sldId id="318" r:id="rId28"/>
+    <p:sldId id="320" r:id="rId29"/>
+    <p:sldId id="319" r:id="rId30"/>
   </p:sldIdLst>
   <p:sldSz cx="9144000" cy="5143500" type="screen16x9"/>
   <p:notesSz cx="6858000" cy="9144000"/>
   <p:embeddedFontLst>
     <p:embeddedFont>
       <p:font typeface="Calibri" panose="020F0502020204030204" pitchFamily="34" charset="0"/>
-      <p:regular r:id="rId31"/>
-      <p:bold r:id="rId32"/>
-      <p:italic r:id="rId33"/>
-      <p:boldItalic r:id="rId34"/>
+      <p:regular r:id="rId32"/>
+      <p:bold r:id="rId33"/>
+      <p:italic r:id="rId34"/>
+      <p:boldItalic r:id="rId35"/>
     </p:embeddedFont>
     <p:embeddedFont>
       <p:font typeface="Catamaran" panose="020B0604020202020204" charset="0"/>
-      <p:regular r:id="rId35"/>
-      <p:bold r:id="rId36"/>
+      <p:regular r:id="rId36"/>
+      <p:bold r:id="rId37"/>
     </p:embeddedFont>
     <p:embeddedFont>
       <p:font typeface="Catamaran Thin" panose="020B0604020202020204" charset="0"/>
-      <p:regular r:id="rId37"/>
-      <p:bold r:id="rId38"/>
+      <p:regular r:id="rId38"/>
+      <p:bold r:id="rId39"/>
     </p:embeddedFont>
   </p:embeddedFontLst>
   <p:defaultTextStyle>
@@ -298,7 +299,7 @@
 <file path=ppt/revisionInfo.xml><?xml version="1.0" encoding="utf-8"?>
 <p1510:revInfo xmlns:a="http://schemas.openxmlformats.org/drawingml/2006/main" xmlns:r="http://schemas.openxmlformats.org/officeDocument/2006/relationships" xmlns:p1510="http://schemas.microsoft.com/office/powerpoint/2015/10/main">
   <p1510:revLst>
-    <p1510:client id="{ECF2C08A-1D63-4443-908D-B3C4743D2FCA}" v="95" dt="2021-09-06T14:53:08.678"/>
+    <p1510:client id="{ECF2C08A-1D63-4443-908D-B3C4743D2FCA}" v="116" dt="2021-09-08T14:19:26.921"/>
   </p1510:revLst>
 </p1510:revInfo>
 </file>
@@ -308,7 +309,7 @@
   <pc:docChgLst>
     <pc:chgData name="Alejandro Carrión" userId="757439b461449c9e" providerId="LiveId" clId="{ECF2C08A-1D63-4443-908D-B3C4743D2FCA}"/>
     <pc:docChg chg="undo redo custSel addSld delSld modSld sldOrd">
-      <pc:chgData name="Alejandro Carrión" userId="757439b461449c9e" providerId="LiveId" clId="{ECF2C08A-1D63-4443-908D-B3C4743D2FCA}" dt="2021-09-06T14:58:40.677" v="6872" actId="20577"/>
+      <pc:chgData name="Alejandro Carrión" userId="757439b461449c9e" providerId="LiveId" clId="{ECF2C08A-1D63-4443-908D-B3C4743D2FCA}" dt="2021-09-08T14:21:18.794" v="6991" actId="1076"/>
       <pc:docMkLst>
         <pc:docMk/>
       </pc:docMkLst>
@@ -1467,7 +1468,7 @@
         </pc:picChg>
       </pc:sldChg>
       <pc:sldChg chg="addSp delSp modSp add mod modClrScheme chgLayout">
-        <pc:chgData name="Alejandro Carrión" userId="757439b461449c9e" providerId="LiveId" clId="{ECF2C08A-1D63-4443-908D-B3C4743D2FCA}" dt="2021-08-30T17:54:32.509" v="1619" actId="1076"/>
+        <pc:chgData name="Alejandro Carrión" userId="757439b461449c9e" providerId="LiveId" clId="{ECF2C08A-1D63-4443-908D-B3C4743D2FCA}" dt="2021-09-08T13:48:37.548" v="6938" actId="1076"/>
         <pc:sldMkLst>
           <pc:docMk/>
           <pc:sldMk cId="570694341" sldId="304"/>
@@ -1481,7 +1482,7 @@
           </ac:spMkLst>
         </pc:spChg>
         <pc:spChg chg="add mod">
-          <ac:chgData name="Alejandro Carrión" userId="757439b461449c9e" providerId="LiveId" clId="{ECF2C08A-1D63-4443-908D-B3C4743D2FCA}" dt="2021-08-30T17:54:11.163" v="1617" actId="1076"/>
+          <ac:chgData name="Alejandro Carrión" userId="757439b461449c9e" providerId="LiveId" clId="{ECF2C08A-1D63-4443-908D-B3C4743D2FCA}" dt="2021-09-08T13:48:32.652" v="6937" actId="1076"/>
           <ac:spMkLst>
             <pc:docMk/>
             <pc:sldMk cId="570694341" sldId="304"/>
@@ -1513,7 +1514,7 @@
           </ac:graphicFrameMkLst>
         </pc:graphicFrameChg>
         <pc:picChg chg="add mod">
-          <ac:chgData name="Alejandro Carrión" userId="757439b461449c9e" providerId="LiveId" clId="{ECF2C08A-1D63-4443-908D-B3C4743D2FCA}" dt="2021-08-30T17:54:32.509" v="1619" actId="1076"/>
+          <ac:chgData name="Alejandro Carrión" userId="757439b461449c9e" providerId="LiveId" clId="{ECF2C08A-1D63-4443-908D-B3C4743D2FCA}" dt="2021-09-08T13:48:37.548" v="6938" actId="1076"/>
           <ac:picMkLst>
             <pc:docMk/>
             <pc:sldMk cId="570694341" sldId="304"/>
@@ -2466,7 +2467,7 @@
         </pc:picChg>
       </pc:sldChg>
       <pc:sldChg chg="addSp delSp modSp add mod modNotesTx">
-        <pc:chgData name="Alejandro Carrión" userId="757439b461449c9e" providerId="LiveId" clId="{ECF2C08A-1D63-4443-908D-B3C4743D2FCA}" dt="2021-09-06T14:14:33.855" v="6787" actId="20577"/>
+        <pc:chgData name="Alejandro Carrión" userId="757439b461449c9e" providerId="LiveId" clId="{ECF2C08A-1D63-4443-908D-B3C4743D2FCA}" dt="2021-09-06T15:50:23.727" v="6909" actId="20577"/>
         <pc:sldMkLst>
           <pc:docMk/>
           <pc:sldMk cId="468109639" sldId="315"/>
@@ -2480,7 +2481,7 @@
           </ac:spMkLst>
         </pc:spChg>
         <pc:spChg chg="mod">
-          <ac:chgData name="Alejandro Carrión" userId="757439b461449c9e" providerId="LiveId" clId="{ECF2C08A-1D63-4443-908D-B3C4743D2FCA}" dt="2021-09-06T14:14:33.855" v="6787" actId="20577"/>
+          <ac:chgData name="Alejandro Carrión" userId="757439b461449c9e" providerId="LiveId" clId="{ECF2C08A-1D63-4443-908D-B3C4743D2FCA}" dt="2021-09-06T15:49:32.752" v="6881" actId="20577"/>
           <ac:spMkLst>
             <pc:docMk/>
             <pc:sldMk cId="468109639" sldId="315"/>
@@ -2638,7 +2639,7 @@
         </pc:spChg>
       </pc:sldChg>
       <pc:sldChg chg="addSp delSp modSp add mod modAnim">
-        <pc:chgData name="Alejandro Carrión" userId="757439b461449c9e" providerId="LiveId" clId="{ECF2C08A-1D63-4443-908D-B3C4743D2FCA}" dt="2021-09-02T19:05:01.713" v="5692"/>
+        <pc:chgData name="Alejandro Carrión" userId="757439b461449c9e" providerId="LiveId" clId="{ECF2C08A-1D63-4443-908D-B3C4743D2FCA}" dt="2021-09-06T16:10:00.170" v="6933" actId="1076"/>
         <pc:sldMkLst>
           <pc:docMk/>
           <pc:sldMk cId="1294296652" sldId="319"/>
@@ -2652,7 +2653,7 @@
           </ac:spMkLst>
         </pc:spChg>
         <pc:spChg chg="add mod">
-          <ac:chgData name="Alejandro Carrión" userId="757439b461449c9e" providerId="LiveId" clId="{ECF2C08A-1D63-4443-908D-B3C4743D2FCA}" dt="2021-08-31T17:58:35.272" v="3454" actId="1076"/>
+          <ac:chgData name="Alejandro Carrión" userId="757439b461449c9e" providerId="LiveId" clId="{ECF2C08A-1D63-4443-908D-B3C4743D2FCA}" dt="2021-09-06T16:10:00.170" v="6933" actId="1076"/>
           <ac:spMkLst>
             <pc:docMk/>
             <pc:sldMk cId="1294296652" sldId="319"/>
@@ -2661,13 +2662,13 @@
         </pc:spChg>
       </pc:sldChg>
       <pc:sldChg chg="addSp delSp modSp add mod modClrScheme chgLayout">
-        <pc:chgData name="Alejandro Carrión" userId="757439b461449c9e" providerId="LiveId" clId="{ECF2C08A-1D63-4443-908D-B3C4743D2FCA}" dt="2021-08-31T18:11:51.120" v="3890" actId="2710"/>
+        <pc:chgData name="Alejandro Carrión" userId="757439b461449c9e" providerId="LiveId" clId="{ECF2C08A-1D63-4443-908D-B3C4743D2FCA}" dt="2021-09-06T16:37:03.675" v="6935" actId="2710"/>
         <pc:sldMkLst>
           <pc:docMk/>
           <pc:sldMk cId="2337873510" sldId="320"/>
         </pc:sldMkLst>
         <pc:spChg chg="mod ord">
-          <ac:chgData name="Alejandro Carrión" userId="757439b461449c9e" providerId="LiveId" clId="{ECF2C08A-1D63-4443-908D-B3C4743D2FCA}" dt="2021-08-31T18:11:51.120" v="3890" actId="2710"/>
+          <ac:chgData name="Alejandro Carrión" userId="757439b461449c9e" providerId="LiveId" clId="{ECF2C08A-1D63-4443-908D-B3C4743D2FCA}" dt="2021-09-06T16:37:03.675" v="6935" actId="2710"/>
           <ac:spMkLst>
             <pc:docMk/>
             <pc:sldMk cId="2337873510" sldId="320"/>
@@ -2831,7 +2832,7 @@
         </pc:spChg>
       </pc:sldChg>
       <pc:sldChg chg="addSp delSp modSp add mod">
-        <pc:chgData name="Alejandro Carrión" userId="757439b461449c9e" providerId="LiveId" clId="{ECF2C08A-1D63-4443-908D-B3C4743D2FCA}" dt="2021-09-06T14:14:56.814" v="6791" actId="20577"/>
+        <pc:chgData name="Alejandro Carrión" userId="757439b461449c9e" providerId="LiveId" clId="{ECF2C08A-1D63-4443-908D-B3C4743D2FCA}" dt="2021-09-08T13:49:25.375" v="6944" actId="20577"/>
         <pc:sldMkLst>
           <pc:docMk/>
           <pc:sldMk cId="2446058371" sldId="326"/>
@@ -2845,7 +2846,7 @@
           </ac:spMkLst>
         </pc:spChg>
         <pc:spChg chg="mod">
-          <ac:chgData name="Alejandro Carrión" userId="757439b461449c9e" providerId="LiveId" clId="{ECF2C08A-1D63-4443-908D-B3C4743D2FCA}" dt="2021-09-06T14:14:56.814" v="6791" actId="20577"/>
+          <ac:chgData name="Alejandro Carrión" userId="757439b461449c9e" providerId="LiveId" clId="{ECF2C08A-1D63-4443-908D-B3C4743D2FCA}" dt="2021-09-08T13:49:25.375" v="6944" actId="20577"/>
           <ac:spMkLst>
             <pc:docMk/>
             <pc:sldMk cId="2446058371" sldId="326"/>
@@ -3213,13 +3214,13 @@
         </pc:cxnChg>
       </pc:sldChg>
       <pc:sldChg chg="addSp delSp modSp add mod">
-        <pc:chgData name="Alejandro Carrión" userId="757439b461449c9e" providerId="LiveId" clId="{ECF2C08A-1D63-4443-908D-B3C4743D2FCA}" dt="2021-09-06T14:40:28.973" v="6833" actId="20577"/>
+        <pc:chgData name="Alejandro Carrión" userId="757439b461449c9e" providerId="LiveId" clId="{ECF2C08A-1D63-4443-908D-B3C4743D2FCA}" dt="2021-09-08T13:50:26.508" v="6964" actId="20577"/>
         <pc:sldMkLst>
           <pc:docMk/>
           <pc:sldMk cId="1191438269" sldId="328"/>
         </pc:sldMkLst>
         <pc:spChg chg="mod">
-          <ac:chgData name="Alejandro Carrión" userId="757439b461449c9e" providerId="LiveId" clId="{ECF2C08A-1D63-4443-908D-B3C4743D2FCA}" dt="2021-09-06T14:40:28.973" v="6833" actId="20577"/>
+          <ac:chgData name="Alejandro Carrión" userId="757439b461449c9e" providerId="LiveId" clId="{ECF2C08A-1D63-4443-908D-B3C4743D2FCA}" dt="2021-09-08T13:50:26.508" v="6964" actId="20577"/>
           <ac:spMkLst>
             <pc:docMk/>
             <pc:sldMk cId="1191438269" sldId="328"/>
@@ -3481,6 +3482,45 @@
           <pc:docMk/>
           <pc:sldMk cId="2012193475" sldId="329"/>
         </pc:sldMkLst>
+      </pc:sldChg>
+      <pc:sldChg chg="addSp delSp modSp add mod ord">
+        <pc:chgData name="Alejandro Carrión" userId="757439b461449c9e" providerId="LiveId" clId="{ECF2C08A-1D63-4443-908D-B3C4743D2FCA}" dt="2021-09-08T14:21:18.794" v="6991" actId="1076"/>
+        <pc:sldMkLst>
+          <pc:docMk/>
+          <pc:sldMk cId="3007503540" sldId="329"/>
+        </pc:sldMkLst>
+        <pc:spChg chg="mod">
+          <ac:chgData name="Alejandro Carrión" userId="757439b461449c9e" providerId="LiveId" clId="{ECF2C08A-1D63-4443-908D-B3C4743D2FCA}" dt="2021-09-08T13:49:22.201" v="6942" actId="20577"/>
+          <ac:spMkLst>
+            <pc:docMk/>
+            <pc:sldMk cId="3007503540" sldId="329"/>
+            <ac:spMk id="4" creationId="{BF52B7DE-5887-4E0E-A1E2-39957FD5F9FF}"/>
+          </ac:spMkLst>
+        </pc:spChg>
+        <pc:picChg chg="add mod">
+          <ac:chgData name="Alejandro Carrión" userId="757439b461449c9e" providerId="LiveId" clId="{ECF2C08A-1D63-4443-908D-B3C4743D2FCA}" dt="2021-09-08T14:21:18.794" v="6991" actId="1076"/>
+          <ac:picMkLst>
+            <pc:docMk/>
+            <pc:sldMk cId="3007503540" sldId="329"/>
+            <ac:picMk id="3" creationId="{3E063A78-3514-4E4C-89F3-1F59A31B8D4F}"/>
+          </ac:picMkLst>
+        </pc:picChg>
+        <pc:picChg chg="add mod">
+          <ac:chgData name="Alejandro Carrión" userId="757439b461449c9e" providerId="LiveId" clId="{ECF2C08A-1D63-4443-908D-B3C4743D2FCA}" dt="2021-09-08T14:21:16.835" v="6990" actId="1076"/>
+          <ac:picMkLst>
+            <pc:docMk/>
+            <pc:sldMk cId="3007503540" sldId="329"/>
+            <ac:picMk id="5" creationId="{3804636D-8DDA-4035-B8D7-3FEAA10A2CA8}"/>
+          </ac:picMkLst>
+        </pc:picChg>
+        <pc:picChg chg="del">
+          <ac:chgData name="Alejandro Carrión" userId="757439b461449c9e" providerId="LiveId" clId="{ECF2C08A-1D63-4443-908D-B3C4743D2FCA}" dt="2021-09-06T15:49:42.814" v="6900" actId="478"/>
+          <ac:picMkLst>
+            <pc:docMk/>
+            <pc:sldMk cId="3007503540" sldId="329"/>
+            <ac:picMk id="5" creationId="{BEB1A286-BACF-4DA3-B599-9FE8E34525E6}"/>
+          </ac:picMkLst>
+        </pc:picChg>
       </pc:sldChg>
       <pc:sldMasterChg chg="delSldLayout">
         <pc:chgData name="Alejandro Carrión" userId="757439b461449c9e" providerId="LiveId" clId="{ECF2C08A-1D63-4443-908D-B3C4743D2FCA}" dt="2021-09-02T19:03:58.817" v="5691" actId="47"/>
@@ -5384,7 +5424,7 @@
           <a:p>
             <a:r>
               <a:rPr lang="es-ES" dirty="0"/>
-              <a:t>2 – Flecos generación, normalizar ruta base peticiones</a:t>
+              <a:t>2 – Flecos generación</a:t>
             </a:r>
           </a:p>
           <a:p>
@@ -16770,7 +16810,7 @@
         </p:nvSpPr>
         <p:spPr>
           <a:xfrm>
-            <a:off x="4422503" y="1663506"/>
+            <a:off x="4571999" y="1663506"/>
             <a:ext cx="3402935" cy="1588274"/>
           </a:xfrm>
           <a:prstGeom prst="rect">
@@ -17089,7 +17129,7 @@
         </p:blipFill>
         <p:spPr>
           <a:xfrm>
-            <a:off x="2610470" y="3459824"/>
+            <a:off x="2412577" y="3459824"/>
             <a:ext cx="3923059" cy="1392878"/>
           </a:xfrm>
           <a:prstGeom prst="rect">
@@ -17852,7 +17892,7 @@
           <a:p>
             <a:r>
               <a:rPr lang="es-ES" dirty="0"/>
-              <a:t>Programación (1/2) </a:t>
+              <a:t>Programación (1/3) </a:t>
             </a:r>
             <a:r>
               <a:rPr lang="es-ES" b="0" dirty="0"/>
@@ -18535,6 +18575,177 @@
         <p:spPr>
           <a:xfrm>
             <a:off x="779100" y="836000"/>
+            <a:ext cx="7701484" cy="396300"/>
+          </a:xfrm>
+        </p:spPr>
+        <p:txBody>
+          <a:bodyPr anchor="t"/>
+          <a:lstStyle/>
+          <a:p>
+            <a:r>
+              <a:rPr lang="es-ES" dirty="0"/>
+              <a:t>Programación (2/3)</a:t>
+            </a:r>
+            <a:r>
+              <a:rPr lang="es-ES" b="0" dirty="0"/>
+              <a:t> – Pipeline de YARP</a:t>
+            </a:r>
+          </a:p>
+        </p:txBody>
+      </p:sp>
+      <p:sp>
+        <p:nvSpPr>
+          <p:cNvPr id="6" name="Google Shape;342;p24">
+            <a:extLst>
+              <a:ext uri="{FF2B5EF4-FFF2-40B4-BE49-F238E27FC236}">
+                <a16:creationId xmlns:a16="http://schemas.microsoft.com/office/drawing/2014/main" id="{57CD6963-C021-4F2A-B2B3-BC2173F77F80}"/>
+              </a:ext>
+            </a:extLst>
+          </p:cNvPr>
+          <p:cNvSpPr txBox="1">
+            <a:spLocks noGrp="1"/>
+          </p:cNvSpPr>
+          <p:nvPr>
+            <p:ph type="sldNum" idx="12"/>
+          </p:nvPr>
+        </p:nvSpPr>
+        <p:spPr>
+          <a:prstGeom prst="rect">
+            <a:avLst/>
+          </a:prstGeom>
+        </p:spPr>
+        <p:txBody>
+          <a:bodyPr spcFirstLastPara="1" wrap="square" lIns="0" tIns="0" rIns="0" bIns="0" anchor="ctr" anchorCtr="0">
+            <a:noAutofit/>
+          </a:bodyPr>
+          <a:lstStyle/>
+          <a:p>
+            <a:pPr marL="0" lvl="0" indent="0" algn="r" rtl="0">
+              <a:spcBef>
+                <a:spcPts val="0"/>
+              </a:spcBef>
+              <a:spcAft>
+                <a:spcPts val="0"/>
+              </a:spcAft>
+              <a:buNone/>
+            </a:pPr>
+            <a:fld id="{00000000-1234-1234-1234-123412341234}" type="slidenum">
+              <a:rPr lang="en"/>
+              <a:t>20</a:t>
+            </a:fld>
+            <a:endParaRPr dirty="0"/>
+          </a:p>
+        </p:txBody>
+      </p:sp>
+      <p:pic>
+        <p:nvPicPr>
+          <p:cNvPr id="3" name="Imagen 2" descr="Texto&#10;&#10;Descripción generada automáticamente">
+            <a:extLst>
+              <a:ext uri="{FF2B5EF4-FFF2-40B4-BE49-F238E27FC236}">
+                <a16:creationId xmlns:a16="http://schemas.microsoft.com/office/drawing/2014/main" id="{3E063A78-3514-4E4C-89F3-1F59A31B8D4F}"/>
+              </a:ext>
+            </a:extLst>
+          </p:cNvPr>
+          <p:cNvPicPr>
+            <a:picLocks noChangeAspect="1"/>
+          </p:cNvPicPr>
+          <p:nvPr/>
+        </p:nvPicPr>
+        <p:blipFill>
+          <a:blip r:embed="rId2"/>
+          <a:stretch>
+            <a:fillRect/>
+          </a:stretch>
+        </p:blipFill>
+        <p:spPr>
+          <a:xfrm>
+            <a:off x="3098630" y="1387319"/>
+            <a:ext cx="2946738" cy="1069171"/>
+          </a:xfrm>
+          <a:prstGeom prst="rect">
+            <a:avLst/>
+          </a:prstGeom>
+        </p:spPr>
+      </p:pic>
+      <p:pic>
+        <p:nvPicPr>
+          <p:cNvPr id="5" name="Imagen 4">
+            <a:extLst>
+              <a:ext uri="{FF2B5EF4-FFF2-40B4-BE49-F238E27FC236}">
+                <a16:creationId xmlns:a16="http://schemas.microsoft.com/office/drawing/2014/main" id="{3804636D-8DDA-4035-B8D7-3FEAA10A2CA8}"/>
+              </a:ext>
+            </a:extLst>
+          </p:cNvPr>
+          <p:cNvPicPr>
+            <a:picLocks noChangeAspect="1"/>
+          </p:cNvPicPr>
+          <p:nvPr/>
+        </p:nvPicPr>
+        <p:blipFill>
+          <a:blip r:embed="rId3"/>
+          <a:stretch>
+            <a:fillRect/>
+          </a:stretch>
+        </p:blipFill>
+        <p:spPr>
+          <a:xfrm>
+            <a:off x="1673237" y="2654490"/>
+            <a:ext cx="5797525" cy="2189803"/>
+          </a:xfrm>
+          <a:prstGeom prst="rect">
+            <a:avLst/>
+          </a:prstGeom>
+        </p:spPr>
+      </p:pic>
+    </p:spTree>
+    <p:extLst>
+      <p:ext uri="{BB962C8B-B14F-4D97-AF65-F5344CB8AC3E}">
+        <p14:creationId xmlns:p14="http://schemas.microsoft.com/office/powerpoint/2010/main" val="3007503540"/>
+      </p:ext>
+    </p:extLst>
+  </p:cSld>
+  <p:clrMapOvr>
+    <a:masterClrMapping/>
+  </p:clrMapOvr>
+</p:sld>
+</file>
+
+<file path=ppt/slides/slide21.xml><?xml version="1.0" encoding="utf-8"?>
+<p:sld xmlns:a="http://schemas.openxmlformats.org/drawingml/2006/main" xmlns:r="http://schemas.openxmlformats.org/officeDocument/2006/relationships" xmlns:p="http://schemas.openxmlformats.org/presentationml/2006/main">
+  <p:cSld>
+    <p:spTree>
+      <p:nvGrpSpPr>
+        <p:cNvPr id="1" name=""/>
+        <p:cNvGrpSpPr/>
+        <p:nvPr/>
+      </p:nvGrpSpPr>
+      <p:grpSpPr>
+        <a:xfrm>
+          <a:off x="0" y="0"/>
+          <a:ext cx="0" cy="0"/>
+          <a:chOff x="0" y="0"/>
+          <a:chExt cx="0" cy="0"/>
+        </a:xfrm>
+      </p:grpSpPr>
+      <p:sp>
+        <p:nvSpPr>
+          <p:cNvPr id="4" name="Título 3">
+            <a:extLst>
+              <a:ext uri="{FF2B5EF4-FFF2-40B4-BE49-F238E27FC236}">
+                <a16:creationId xmlns:a16="http://schemas.microsoft.com/office/drawing/2014/main" id="{BF52B7DE-5887-4E0E-A1E2-39957FD5F9FF}"/>
+              </a:ext>
+            </a:extLst>
+          </p:cNvPr>
+          <p:cNvSpPr>
+            <a:spLocks noGrp="1"/>
+          </p:cNvSpPr>
+          <p:nvPr>
+            <p:ph type="title"/>
+          </p:nvPr>
+        </p:nvSpPr>
+        <p:spPr>
+          <a:xfrm>
+            <a:off x="779100" y="836000"/>
             <a:ext cx="2918841" cy="396300"/>
           </a:xfrm>
         </p:spPr>
@@ -18544,7 +18755,7 @@
           <a:p>
             <a:r>
               <a:rPr lang="es-ES" dirty="0"/>
-              <a:t>Programación (2/2)</a:t>
+              <a:t>Programación (3/3)</a:t>
             </a:r>
             <a:r>
               <a:rPr lang="es-ES" b="0" dirty="0"/>
@@ -18599,7 +18810,7 @@
             </a:pPr>
             <a:fld id="{00000000-1234-1234-1234-123412341234}" type="slidenum">
               <a:rPr lang="en"/>
-              <a:t>20</a:t>
+              <a:t>21</a:t>
             </a:fld>
             <a:endParaRPr dirty="0"/>
           </a:p>
@@ -18648,7 +18859,7 @@
 </p:sld>
 </file>
 
-<file path=ppt/slides/slide21.xml><?xml version="1.0" encoding="utf-8"?>
+<file path=ppt/slides/slide22.xml><?xml version="1.0" encoding="utf-8"?>
 <p:sld xmlns:a="http://schemas.openxmlformats.org/drawingml/2006/main" xmlns:r="http://schemas.openxmlformats.org/officeDocument/2006/relationships" xmlns:p="http://schemas.openxmlformats.org/presentationml/2006/main">
   <p:cSld>
     <p:spTree>
@@ -18797,7 +19008,7 @@
             </a:pPr>
             <a:fld id="{00000000-1234-1234-1234-123412341234}" type="slidenum">
               <a:rPr lang="en"/>
-              <a:t>21</a:t>
+              <a:t>22</a:t>
             </a:fld>
             <a:endParaRPr dirty="0"/>
           </a:p>
@@ -18846,7 +19057,7 @@
 </p:sld>
 </file>
 
-<file path=ppt/slides/slide22.xml><?xml version="1.0" encoding="utf-8"?>
+<file path=ppt/slides/slide23.xml><?xml version="1.0" encoding="utf-8"?>
 <p:sld xmlns:a="http://schemas.openxmlformats.org/drawingml/2006/main" xmlns:r="http://schemas.openxmlformats.org/officeDocument/2006/relationships" xmlns:p="http://schemas.openxmlformats.org/presentationml/2006/main">
   <p:cSld>
     <p:spTree>
@@ -19145,7 +19356,7 @@
             </a:pPr>
             <a:fld id="{00000000-1234-1234-1234-123412341234}" type="slidenum">
               <a:rPr lang="en"/>
-              <a:t>22</a:t>
+              <a:t>23</a:t>
             </a:fld>
             <a:endParaRPr dirty="0"/>
           </a:p>
@@ -20071,7 +20282,7 @@
 </p:sld>
 </file>
 
-<file path=ppt/slides/slide23.xml><?xml version="1.0" encoding="utf-8"?>
+<file path=ppt/slides/slide24.xml><?xml version="1.0" encoding="utf-8"?>
 <p:sld xmlns:a="http://schemas.openxmlformats.org/drawingml/2006/main" xmlns:r="http://schemas.openxmlformats.org/officeDocument/2006/relationships" xmlns:p="http://schemas.openxmlformats.org/presentationml/2006/main">
   <p:cSld>
     <p:spTree>
@@ -20204,7 +20415,7 @@
 </p:sld>
 </file>
 
-<file path=ppt/slides/slide24.xml><?xml version="1.0" encoding="utf-8"?>
+<file path=ppt/slides/slide25.xml><?xml version="1.0" encoding="utf-8"?>
 <p:sld xmlns:a="http://schemas.openxmlformats.org/drawingml/2006/main" xmlns:r="http://schemas.openxmlformats.org/officeDocument/2006/relationships" xmlns:p="http://schemas.openxmlformats.org/presentationml/2006/main">
   <p:cSld>
     <p:bg>
@@ -20269,7 +20480,7 @@
                   <a:schemeClr val="lt1"/>
                 </a:solidFill>
               </a:rPr>
-              <a:t>24</a:t>
+              <a:t>25</a:t>
             </a:fld>
             <a:endParaRPr>
               <a:solidFill>
@@ -20658,7 +20869,7 @@
 </p:sld>
 </file>
 
-<file path=ppt/slides/slide25.xml><?xml version="1.0" encoding="utf-8"?>
+<file path=ppt/slides/slide26.xml><?xml version="1.0" encoding="utf-8"?>
 <p:sld xmlns:a="http://schemas.openxmlformats.org/drawingml/2006/main" xmlns:r="http://schemas.openxmlformats.org/officeDocument/2006/relationships" xmlns:p="http://schemas.openxmlformats.org/presentationml/2006/main">
   <p:cSld>
     <p:spTree>
@@ -20798,7 +21009,7 @@
 </p:sld>
 </file>
 
-<file path=ppt/slides/slide26.xml><?xml version="1.0" encoding="utf-8"?>
+<file path=ppt/slides/slide27.xml><?xml version="1.0" encoding="utf-8"?>
 <p:sld xmlns:a="http://schemas.openxmlformats.org/drawingml/2006/main" xmlns:r="http://schemas.openxmlformats.org/officeDocument/2006/relationships" xmlns:p="http://schemas.openxmlformats.org/presentationml/2006/main">
   <p:cSld>
     <p:spTree>
@@ -20987,7 +21198,7 @@
             </a:pPr>
             <a:fld id="{00000000-1234-1234-1234-123412341234}" type="slidenum">
               <a:rPr lang="en"/>
-              <a:t>26</a:t>
+              <a:t>27</a:t>
             </a:fld>
             <a:endParaRPr dirty="0"/>
           </a:p>
@@ -21006,7 +21217,7 @@
 </p:sld>
 </file>
 
-<file path=ppt/slides/slide27.xml><?xml version="1.0" encoding="utf-8"?>
+<file path=ppt/slides/slide28.xml><?xml version="1.0" encoding="utf-8"?>
 <p:sld xmlns:a="http://schemas.openxmlformats.org/drawingml/2006/main" xmlns:r="http://schemas.openxmlformats.org/officeDocument/2006/relationships" xmlns:p="http://schemas.openxmlformats.org/presentationml/2006/main">
   <p:cSld>
     <p:spTree>
@@ -21072,12 +21283,22 @@
           <a:bodyPr/>
           <a:lstStyle/>
           <a:p>
+            <a:pPr>
+              <a:lnSpc>
+                <a:spcPct val="150000"/>
+              </a:lnSpc>
+            </a:pPr>
             <a:r>
               <a:rPr lang="es-ES" dirty="0"/>
               <a:t>Aplicación en desarrollo</a:t>
             </a:r>
           </a:p>
           <a:p>
+            <a:pPr>
+              <a:lnSpc>
+                <a:spcPct val="150000"/>
+              </a:lnSpc>
+            </a:pPr>
             <a:r>
               <a:rPr lang="es-ES" dirty="0"/>
               <a:t>Nuevas características</a:t>
@@ -21086,7 +21307,7 @@
           <a:p>
             <a:pPr>
               <a:lnSpc>
-                <a:spcPct val="200000"/>
+                <a:spcPct val="250000"/>
               </a:lnSpc>
             </a:pPr>
             <a:r>
@@ -21156,7 +21377,7 @@
             </a:pPr>
             <a:fld id="{00000000-1234-1234-1234-123412341234}" type="slidenum">
               <a:rPr lang="en"/>
-              <a:t>27</a:t>
+              <a:t>28</a:t>
             </a:fld>
             <a:endParaRPr dirty="0"/>
           </a:p>
@@ -21175,7 +21396,7 @@
 </p:sld>
 </file>
 
-<file path=ppt/slides/slide28.xml><?xml version="1.0" encoding="utf-8"?>
+<file path=ppt/slides/slide29.xml><?xml version="1.0" encoding="utf-8"?>
 <p:sld xmlns:a="http://schemas.openxmlformats.org/drawingml/2006/main" xmlns:r="http://schemas.openxmlformats.org/officeDocument/2006/relationships" xmlns:p="http://schemas.openxmlformats.org/presentationml/2006/main">
   <p:cSld>
     <p:spTree>
@@ -21455,8 +21676,8 @@
         </p:nvSpPr>
         <p:spPr>
           <a:xfrm>
-            <a:off x="627912" y="3877606"/>
-            <a:ext cx="4239722" cy="915729"/>
+            <a:off x="202186" y="3421758"/>
+            <a:ext cx="4239722" cy="1644436"/>
           </a:xfrm>
           <a:prstGeom prst="rect">
             <a:avLst/>
@@ -21728,7 +21949,7 @@
                   </a:schemeClr>
                 </a:solidFill>
               </a:rPr>
-              <a:t>¿Preguntas?</a:t>
+              <a:t>Gracias, ¿Preguntas?</a:t>
             </a:r>
           </a:p>
         </p:txBody>

</xml_diff>